<commit_message>
DeveloperGuide: Update to reflect current v1.4 changes
</commit_message>
<xml_diff>
--- a/docs/diagrams/LogicComponentSequenceDiagram.pptx
+++ b/docs/diagrams/LogicComponentSequenceDiagram.pptx
@@ -214,7 +214,7 @@
           <a:p>
             <a:fld id="{F5CC4B3F-88C1-4FFA-B1B6-F41C21DC6924}" type="datetimeFigureOut">
               <a:rPr lang="en-US" smtClean="0"/>
-              <a:t>10/26/2017</a:t>
+              <a:t>10/30/2017</a:t>
             </a:fld>
             <a:endParaRPr lang="en-US"/>
           </a:p>
@@ -660,7 +660,7 @@
           <a:p>
             <a:fld id="{78C97017-6FC3-485B-9764-EAC9E56C1D49}" type="datetimeFigureOut">
               <a:rPr lang="en-US" smtClean="0"/>
-              <a:t>10/26/2017</a:t>
+              <a:t>10/30/2017</a:t>
             </a:fld>
             <a:endParaRPr lang="en-US"/>
           </a:p>
@@ -828,7 +828,7 @@
           <a:p>
             <a:fld id="{78C97017-6FC3-485B-9764-EAC9E56C1D49}" type="datetimeFigureOut">
               <a:rPr lang="en-US" smtClean="0"/>
-              <a:t>10/26/2017</a:t>
+              <a:t>10/30/2017</a:t>
             </a:fld>
             <a:endParaRPr lang="en-US"/>
           </a:p>
@@ -1006,7 +1006,7 @@
           <a:p>
             <a:fld id="{78C97017-6FC3-485B-9764-EAC9E56C1D49}" type="datetimeFigureOut">
               <a:rPr lang="en-US" smtClean="0"/>
-              <a:t>10/26/2017</a:t>
+              <a:t>10/30/2017</a:t>
             </a:fld>
             <a:endParaRPr lang="en-US"/>
           </a:p>
@@ -1174,7 +1174,7 @@
           <a:p>
             <a:fld id="{78C97017-6FC3-485B-9764-EAC9E56C1D49}" type="datetimeFigureOut">
               <a:rPr lang="en-US" smtClean="0"/>
-              <a:t>10/26/2017</a:t>
+              <a:t>10/30/2017</a:t>
             </a:fld>
             <a:endParaRPr lang="en-US"/>
           </a:p>
@@ -1419,7 +1419,7 @@
           <a:p>
             <a:fld id="{78C97017-6FC3-485B-9764-EAC9E56C1D49}" type="datetimeFigureOut">
               <a:rPr lang="en-US" smtClean="0"/>
-              <a:t>10/26/2017</a:t>
+              <a:t>10/30/2017</a:t>
             </a:fld>
             <a:endParaRPr lang="en-US"/>
           </a:p>
@@ -1704,7 +1704,7 @@
           <a:p>
             <a:fld id="{78C97017-6FC3-485B-9764-EAC9E56C1D49}" type="datetimeFigureOut">
               <a:rPr lang="en-US" smtClean="0"/>
-              <a:t>10/26/2017</a:t>
+              <a:t>10/30/2017</a:t>
             </a:fld>
             <a:endParaRPr lang="en-US"/>
           </a:p>
@@ -2123,7 +2123,7 @@
           <a:p>
             <a:fld id="{78C97017-6FC3-485B-9764-EAC9E56C1D49}" type="datetimeFigureOut">
               <a:rPr lang="en-US" smtClean="0"/>
-              <a:t>10/26/2017</a:t>
+              <a:t>10/30/2017</a:t>
             </a:fld>
             <a:endParaRPr lang="en-US"/>
           </a:p>
@@ -2240,7 +2240,7 @@
           <a:p>
             <a:fld id="{78C97017-6FC3-485B-9764-EAC9E56C1D49}" type="datetimeFigureOut">
               <a:rPr lang="en-US" smtClean="0"/>
-              <a:t>10/26/2017</a:t>
+              <a:t>10/30/2017</a:t>
             </a:fld>
             <a:endParaRPr lang="en-US"/>
           </a:p>
@@ -2335,7 +2335,7 @@
           <a:p>
             <a:fld id="{78C97017-6FC3-485B-9764-EAC9E56C1D49}" type="datetimeFigureOut">
               <a:rPr lang="en-US" smtClean="0"/>
-              <a:t>10/26/2017</a:t>
+              <a:t>10/30/2017</a:t>
             </a:fld>
             <a:endParaRPr lang="en-US"/>
           </a:p>
@@ -2610,7 +2610,7 @@
           <a:p>
             <a:fld id="{78C97017-6FC3-485B-9764-EAC9E56C1D49}" type="datetimeFigureOut">
               <a:rPr lang="en-US" smtClean="0"/>
-              <a:t>10/26/2017</a:t>
+              <a:t>10/30/2017</a:t>
             </a:fld>
             <a:endParaRPr lang="en-US"/>
           </a:p>
@@ -2862,7 +2862,7 @@
           <a:p>
             <a:fld id="{78C97017-6FC3-485B-9764-EAC9E56C1D49}" type="datetimeFigureOut">
               <a:rPr lang="en-US" smtClean="0"/>
-              <a:t>10/26/2017</a:t>
+              <a:t>10/30/2017</a:t>
             </a:fld>
             <a:endParaRPr lang="en-US"/>
           </a:p>
@@ -3073,7 +3073,7 @@
           <a:p>
             <a:fld id="{78C97017-6FC3-485B-9764-EAC9E56C1D49}" type="datetimeFigureOut">
               <a:rPr lang="en-US" smtClean="0"/>
-              <a:t>10/26/2017</a:t>
+              <a:t>10/30/2017</a:t>
             </a:fld>
             <a:endParaRPr lang="en-US"/>
           </a:p>
@@ -4673,7 +4673,7 @@
                   <a:srgbClr val="7030A0"/>
                 </a:solidFill>
               </a:rPr>
-              <a:t>deletePerson</a:t>
+              <a:t>deletePersons</a:t>
             </a:r>
             <a:r>
               <a:rPr lang="en-US" dirty="0">

</xml_diff>

<commit_message>
Edit pre-existing diagrams for User and Developer Guide.
</commit_message>
<xml_diff>
--- a/docs/diagrams/LogicComponentSequenceDiagram.pptx
+++ b/docs/diagrams/LogicComponentSequenceDiagram.pptx
@@ -5,13 +5,15 @@
     <p:sldMasterId id="2147483648" r:id="rId1"/>
   </p:sldMasterIdLst>
   <p:notesMasterIdLst>
-    <p:notesMasterId r:id="rId6"/>
+    <p:notesMasterId r:id="rId8"/>
   </p:notesMasterIdLst>
   <p:sldIdLst>
     <p:sldId id="267" r:id="rId2"/>
     <p:sldId id="270" r:id="rId3"/>
     <p:sldId id="268" r:id="rId4"/>
     <p:sldId id="269" r:id="rId5"/>
+    <p:sldId id="271" r:id="rId6"/>
+    <p:sldId id="272" r:id="rId7"/>
   </p:sldIdLst>
   <p:sldSz cx="9144000" cy="6858000" type="screen4x3"/>
   <p:notesSz cx="6858000" cy="9144000"/>
@@ -215,7 +217,7 @@
           <a:p>
             <a:fld id="{F5CC4B3F-88C1-4FFA-B1B6-F41C21DC6924}" type="datetimeFigureOut">
               <a:rPr lang="en-US" smtClean="0"/>
-              <a:t>10/30/2017</a:t>
+              <a:t>11/2/2017</a:t>
             </a:fld>
             <a:endParaRPr lang="en-US"/>
           </a:p>
@@ -661,7 +663,7 @@
           <a:p>
             <a:fld id="{78C97017-6FC3-485B-9764-EAC9E56C1D49}" type="datetimeFigureOut">
               <a:rPr lang="en-US" smtClean="0"/>
-              <a:t>10/30/2017</a:t>
+              <a:t>11/2/2017</a:t>
             </a:fld>
             <a:endParaRPr lang="en-US"/>
           </a:p>
@@ -829,7 +831,7 @@
           <a:p>
             <a:fld id="{78C97017-6FC3-485B-9764-EAC9E56C1D49}" type="datetimeFigureOut">
               <a:rPr lang="en-US" smtClean="0"/>
-              <a:t>10/30/2017</a:t>
+              <a:t>11/2/2017</a:t>
             </a:fld>
             <a:endParaRPr lang="en-US"/>
           </a:p>
@@ -1007,7 +1009,7 @@
           <a:p>
             <a:fld id="{78C97017-6FC3-485B-9764-EAC9E56C1D49}" type="datetimeFigureOut">
               <a:rPr lang="en-US" smtClean="0"/>
-              <a:t>10/30/2017</a:t>
+              <a:t>11/2/2017</a:t>
             </a:fld>
             <a:endParaRPr lang="en-US"/>
           </a:p>
@@ -1175,7 +1177,7 @@
           <a:p>
             <a:fld id="{78C97017-6FC3-485B-9764-EAC9E56C1D49}" type="datetimeFigureOut">
               <a:rPr lang="en-US" smtClean="0"/>
-              <a:t>10/30/2017</a:t>
+              <a:t>11/2/2017</a:t>
             </a:fld>
             <a:endParaRPr lang="en-US"/>
           </a:p>
@@ -1420,7 +1422,7 @@
           <a:p>
             <a:fld id="{78C97017-6FC3-485B-9764-EAC9E56C1D49}" type="datetimeFigureOut">
               <a:rPr lang="en-US" smtClean="0"/>
-              <a:t>10/30/2017</a:t>
+              <a:t>11/2/2017</a:t>
             </a:fld>
             <a:endParaRPr lang="en-US"/>
           </a:p>
@@ -1705,7 +1707,7 @@
           <a:p>
             <a:fld id="{78C97017-6FC3-485B-9764-EAC9E56C1D49}" type="datetimeFigureOut">
               <a:rPr lang="en-US" smtClean="0"/>
-              <a:t>10/30/2017</a:t>
+              <a:t>11/2/2017</a:t>
             </a:fld>
             <a:endParaRPr lang="en-US"/>
           </a:p>
@@ -2124,7 +2126,7 @@
           <a:p>
             <a:fld id="{78C97017-6FC3-485B-9764-EAC9E56C1D49}" type="datetimeFigureOut">
               <a:rPr lang="en-US" smtClean="0"/>
-              <a:t>10/30/2017</a:t>
+              <a:t>11/2/2017</a:t>
             </a:fld>
             <a:endParaRPr lang="en-US"/>
           </a:p>
@@ -2241,7 +2243,7 @@
           <a:p>
             <a:fld id="{78C97017-6FC3-485B-9764-EAC9E56C1D49}" type="datetimeFigureOut">
               <a:rPr lang="en-US" smtClean="0"/>
-              <a:t>10/30/2017</a:t>
+              <a:t>11/2/2017</a:t>
             </a:fld>
             <a:endParaRPr lang="en-US"/>
           </a:p>
@@ -2336,7 +2338,7 @@
           <a:p>
             <a:fld id="{78C97017-6FC3-485B-9764-EAC9E56C1D49}" type="datetimeFigureOut">
               <a:rPr lang="en-US" smtClean="0"/>
-              <a:t>10/30/2017</a:t>
+              <a:t>11/2/2017</a:t>
             </a:fld>
             <a:endParaRPr lang="en-US"/>
           </a:p>
@@ -2611,7 +2613,7 @@
           <a:p>
             <a:fld id="{78C97017-6FC3-485B-9764-EAC9E56C1D49}" type="datetimeFigureOut">
               <a:rPr lang="en-US" smtClean="0"/>
-              <a:t>10/30/2017</a:t>
+              <a:t>11/2/2017</a:t>
             </a:fld>
             <a:endParaRPr lang="en-US"/>
           </a:p>
@@ -2863,7 +2865,7 @@
           <a:p>
             <a:fld id="{78C97017-6FC3-485B-9764-EAC9E56C1D49}" type="datetimeFigureOut">
               <a:rPr lang="en-US" smtClean="0"/>
-              <a:t>10/30/2017</a:t>
+              <a:t>11/2/2017</a:t>
             </a:fld>
             <a:endParaRPr lang="en-US"/>
           </a:p>
@@ -3074,7 +3076,7 @@
           <a:p>
             <a:fld id="{78C97017-6FC3-485B-9764-EAC9E56C1D49}" type="datetimeFigureOut">
               <a:rPr lang="en-US" smtClean="0"/>
-              <a:t>10/30/2017</a:t>
+              <a:t>11/2/2017</a:t>
             </a:fld>
             <a:endParaRPr lang="en-US"/>
           </a:p>
@@ -10317,6 +10319,3193 @@
 </p:sld>
 </file>
 
+<file path=ppt/slides/slide5.xml><?xml version="1.0" encoding="utf-8"?>
+<p:sld xmlns:a="http://schemas.openxmlformats.org/drawingml/2006/main" xmlns:r="http://schemas.openxmlformats.org/officeDocument/2006/relationships" xmlns:p="http://schemas.openxmlformats.org/presentationml/2006/main">
+  <p:cSld>
+    <p:spTree>
+      <p:nvGrpSpPr>
+        <p:cNvPr id="1" name=""/>
+        <p:cNvGrpSpPr/>
+        <p:nvPr/>
+      </p:nvGrpSpPr>
+      <p:grpSpPr>
+        <a:xfrm>
+          <a:off x="0" y="0"/>
+          <a:ext cx="0" cy="0"/>
+          <a:chOff x="0" y="0"/>
+          <a:chExt cx="0" cy="0"/>
+        </a:xfrm>
+      </p:grpSpPr>
+      <p:sp>
+        <p:nvSpPr>
+          <p:cNvPr id="2" name="Rectangle 65">
+            <a:extLst/>
+          </p:cNvPr>
+          <p:cNvSpPr/>
+          <p:nvPr/>
+        </p:nvSpPr>
+        <p:spPr>
+          <a:xfrm>
+            <a:off x="1981200" y="1981200"/>
+            <a:ext cx="4953000" cy="4000286"/>
+          </a:xfrm>
+          <a:prstGeom prst="roundRect">
+            <a:avLst>
+              <a:gd name="adj" fmla="val 3484"/>
+            </a:avLst>
+          </a:prstGeom>
+          <a:solidFill>
+            <a:schemeClr val="accent1">
+              <a:lumMod val="20000"/>
+              <a:lumOff val="80000"/>
+            </a:schemeClr>
+          </a:solidFill>
+          <a:ln w="19050">
+            <a:noFill/>
+          </a:ln>
+          <a:effectLst/>
+        </p:spPr>
+        <p:style>
+          <a:lnRef idx="1">
+            <a:schemeClr val="accent2"/>
+          </a:lnRef>
+          <a:fillRef idx="2">
+            <a:schemeClr val="accent2"/>
+          </a:fillRef>
+          <a:effectRef idx="1">
+            <a:schemeClr val="accent2"/>
+          </a:effectRef>
+          <a:fontRef idx="minor">
+            <a:schemeClr val="dk1"/>
+          </a:fontRef>
+        </p:style>
+        <p:txBody>
+          <a:bodyPr rtlCol="0" anchor="t"/>
+          <a:lstStyle/>
+          <a:p>
+            <a:r>
+              <a:rPr lang="en-US" sz="1200" b="1" dirty="0">
+                <a:solidFill>
+                  <a:srgbClr val="0070C0"/>
+                </a:solidFill>
+              </a:rPr>
+              <a:t>Logic</a:t>
+            </a:r>
+            <a:endParaRPr lang="en-SG" sz="1200" b="1" dirty="0">
+              <a:solidFill>
+                <a:srgbClr val="0070C0"/>
+              </a:solidFill>
+            </a:endParaRPr>
+          </a:p>
+        </p:txBody>
+      </p:sp>
+      <p:sp>
+        <p:nvSpPr>
+          <p:cNvPr id="3" name="Rectangle 62">
+            <a:extLst/>
+          </p:cNvPr>
+          <p:cNvSpPr/>
+          <p:nvPr/>
+        </p:nvSpPr>
+        <p:spPr>
+          <a:xfrm>
+            <a:off x="3054845" y="2296546"/>
+            <a:ext cx="1455629" cy="346760"/>
+          </a:xfrm>
+          <a:prstGeom prst="rect">
+            <a:avLst/>
+          </a:prstGeom>
+          <a:solidFill>
+            <a:srgbClr val="0070C0"/>
+          </a:solidFill>
+          <a:ln w="19050">
+            <a:solidFill>
+              <a:srgbClr val="0070C0"/>
+            </a:solidFill>
+          </a:ln>
+          <a:effectLst/>
+        </p:spPr>
+        <p:style>
+          <a:lnRef idx="1">
+            <a:schemeClr val="accent2"/>
+          </a:lnRef>
+          <a:fillRef idx="2">
+            <a:schemeClr val="accent2"/>
+          </a:fillRef>
+          <a:effectRef idx="1">
+            <a:schemeClr val="accent2"/>
+          </a:effectRef>
+          <a:fontRef idx="minor">
+            <a:schemeClr val="dk1"/>
+          </a:fontRef>
+        </p:style>
+        <p:txBody>
+          <a:bodyPr rtlCol="0" anchor="ctr"/>
+          <a:lstStyle/>
+          <a:p>
+            <a:pPr algn="ctr"/>
+            <a:r>
+              <a:rPr lang="en-US" sz="1600" dirty="0">
+                <a:solidFill>
+                  <a:schemeClr val="bg1"/>
+                </a:solidFill>
+              </a:rPr>
+              <a:t>:</a:t>
+            </a:r>
+            <a:r>
+              <a:rPr lang="en-US" sz="1600" dirty="0" err="1">
+                <a:solidFill>
+                  <a:schemeClr val="bg1"/>
+                </a:solidFill>
+              </a:rPr>
+              <a:t>AddressBook</a:t>
+            </a:r>
+            <a:endParaRPr lang="en-SG" sz="1600" dirty="0">
+              <a:solidFill>
+                <a:schemeClr val="bg1"/>
+              </a:solidFill>
+            </a:endParaRPr>
+          </a:p>
+        </p:txBody>
+      </p:sp>
+      <p:cxnSp>
+        <p:nvCxnSpPr>
+          <p:cNvPr id="4" name="Straight Connector 3">
+            <a:extLst/>
+          </p:cNvPr>
+          <p:cNvCxnSpPr/>
+          <p:nvPr/>
+        </p:nvCxnSpPr>
+        <p:spPr>
+          <a:xfrm>
+            <a:off x="3782659" y="2660217"/>
+            <a:ext cx="0" cy="2597583"/>
+          </a:xfrm>
+          <a:prstGeom prst="line">
+            <a:avLst/>
+          </a:prstGeom>
+          <a:ln w="19050">
+            <a:solidFill>
+              <a:srgbClr val="0070C0"/>
+            </a:solidFill>
+            <a:prstDash val="sysDash"/>
+          </a:ln>
+          <a:effectLst/>
+        </p:spPr>
+        <p:style>
+          <a:lnRef idx="1">
+            <a:schemeClr val="accent1"/>
+          </a:lnRef>
+          <a:fillRef idx="2">
+            <a:schemeClr val="accent1"/>
+          </a:fillRef>
+          <a:effectRef idx="1">
+            <a:schemeClr val="accent1"/>
+          </a:effectRef>
+          <a:fontRef idx="minor">
+            <a:schemeClr val="dk1"/>
+          </a:fontRef>
+        </p:style>
+      </p:cxnSp>
+      <p:sp>
+        <p:nvSpPr>
+          <p:cNvPr id="5" name="Rectangle 4">
+            <a:extLst/>
+          </p:cNvPr>
+          <p:cNvSpPr/>
+          <p:nvPr/>
+        </p:nvSpPr>
+        <p:spPr>
+          <a:xfrm>
+            <a:off x="3710651" y="3010911"/>
+            <a:ext cx="152400" cy="2780287"/>
+          </a:xfrm>
+          <a:prstGeom prst="rect">
+            <a:avLst/>
+          </a:prstGeom>
+          <a:solidFill>
+            <a:srgbClr val="0070C0"/>
+          </a:solidFill>
+          <a:ln>
+            <a:solidFill>
+              <a:srgbClr val="0070C0"/>
+            </a:solidFill>
+          </a:ln>
+          <a:effectLst/>
+        </p:spPr>
+        <p:style>
+          <a:lnRef idx="1">
+            <a:schemeClr val="accent3"/>
+          </a:lnRef>
+          <a:fillRef idx="2">
+            <a:schemeClr val="accent3"/>
+          </a:fillRef>
+          <a:effectRef idx="1">
+            <a:schemeClr val="accent3"/>
+          </a:effectRef>
+          <a:fontRef idx="minor">
+            <a:schemeClr val="dk1"/>
+          </a:fontRef>
+        </p:style>
+        <p:txBody>
+          <a:bodyPr rtlCol="0" anchor="ctr"/>
+          <a:lstStyle/>
+          <a:p>
+            <a:pPr algn="ctr"/>
+            <a:endParaRPr lang="en-SG" sz="1400"/>
+          </a:p>
+        </p:txBody>
+      </p:sp>
+      <p:sp>
+        <p:nvSpPr>
+          <p:cNvPr id="6" name="Rectangle 62">
+            <a:extLst/>
+          </p:cNvPr>
+          <p:cNvSpPr/>
+          <p:nvPr/>
+        </p:nvSpPr>
+        <p:spPr>
+          <a:xfrm>
+            <a:off x="4953000" y="2179309"/>
+            <a:ext cx="1219200" cy="467684"/>
+          </a:xfrm>
+          <a:prstGeom prst="rect">
+            <a:avLst/>
+          </a:prstGeom>
+          <a:solidFill>
+            <a:srgbClr val="0070C0"/>
+          </a:solidFill>
+          <a:ln w="19050">
+            <a:solidFill>
+              <a:srgbClr val="0070C0"/>
+            </a:solidFill>
+          </a:ln>
+          <a:effectLst/>
+        </p:spPr>
+        <p:style>
+          <a:lnRef idx="1">
+            <a:schemeClr val="accent2"/>
+          </a:lnRef>
+          <a:fillRef idx="2">
+            <a:schemeClr val="accent2"/>
+          </a:fillRef>
+          <a:effectRef idx="1">
+            <a:schemeClr val="accent2"/>
+          </a:effectRef>
+          <a:fontRef idx="minor">
+            <a:schemeClr val="dk1"/>
+          </a:fontRef>
+        </p:style>
+        <p:txBody>
+          <a:bodyPr rtlCol="0" anchor="ctr"/>
+          <a:lstStyle/>
+          <a:p>
+            <a:pPr algn="ctr"/>
+            <a:r>
+              <a:rPr lang="en-US" sz="1600" dirty="0">
+                <a:solidFill>
+                  <a:schemeClr val="bg1"/>
+                </a:solidFill>
+              </a:rPr>
+              <a:t>:Unique</a:t>
+            </a:r>
+          </a:p>
+          <a:p>
+            <a:pPr algn="ctr"/>
+            <a:r>
+              <a:rPr lang="en-US" sz="1600" dirty="0" err="1">
+                <a:solidFill>
+                  <a:schemeClr val="bg1"/>
+                </a:solidFill>
+              </a:rPr>
+              <a:t>PersonList</a:t>
+            </a:r>
+            <a:endParaRPr lang="en-US" sz="1600" dirty="0">
+              <a:solidFill>
+                <a:schemeClr val="bg1"/>
+              </a:solidFill>
+            </a:endParaRPr>
+          </a:p>
+        </p:txBody>
+      </p:sp>
+      <p:cxnSp>
+        <p:nvCxnSpPr>
+          <p:cNvPr id="7" name="Straight Connector 6">
+            <a:extLst/>
+          </p:cNvPr>
+          <p:cNvCxnSpPr/>
+          <p:nvPr/>
+        </p:nvCxnSpPr>
+        <p:spPr>
+          <a:xfrm>
+            <a:off x="5566399" y="2663904"/>
+            <a:ext cx="0" cy="1695374"/>
+          </a:xfrm>
+          <a:prstGeom prst="line">
+            <a:avLst/>
+          </a:prstGeom>
+          <a:ln w="19050">
+            <a:solidFill>
+              <a:srgbClr val="0070C0"/>
+            </a:solidFill>
+            <a:prstDash val="sysDash"/>
+          </a:ln>
+          <a:effectLst/>
+        </p:spPr>
+        <p:style>
+          <a:lnRef idx="1">
+            <a:schemeClr val="accent1"/>
+          </a:lnRef>
+          <a:fillRef idx="2">
+            <a:schemeClr val="accent1"/>
+          </a:fillRef>
+          <a:effectRef idx="1">
+            <a:schemeClr val="accent1"/>
+          </a:effectRef>
+          <a:fontRef idx="minor">
+            <a:schemeClr val="dk1"/>
+          </a:fontRef>
+        </p:style>
+      </p:cxnSp>
+      <p:sp>
+        <p:nvSpPr>
+          <p:cNvPr id="8" name="Rectangle 7">
+            <a:extLst/>
+          </p:cNvPr>
+          <p:cNvSpPr/>
+          <p:nvPr/>
+        </p:nvSpPr>
+        <p:spPr>
+          <a:xfrm>
+            <a:off x="5494390" y="3122096"/>
+            <a:ext cx="174929" cy="1129459"/>
+          </a:xfrm>
+          <a:prstGeom prst="rect">
+            <a:avLst/>
+          </a:prstGeom>
+          <a:solidFill>
+            <a:srgbClr val="0070C0"/>
+          </a:solidFill>
+          <a:ln>
+            <a:solidFill>
+              <a:srgbClr val="0070C0"/>
+            </a:solidFill>
+          </a:ln>
+          <a:effectLst/>
+        </p:spPr>
+        <p:style>
+          <a:lnRef idx="1">
+            <a:schemeClr val="accent3"/>
+          </a:lnRef>
+          <a:fillRef idx="2">
+            <a:schemeClr val="accent3"/>
+          </a:fillRef>
+          <a:effectRef idx="1">
+            <a:schemeClr val="accent3"/>
+          </a:effectRef>
+          <a:fontRef idx="minor">
+            <a:schemeClr val="dk1"/>
+          </a:fontRef>
+        </p:style>
+        <p:txBody>
+          <a:bodyPr rtlCol="0" anchor="ctr"/>
+          <a:lstStyle/>
+          <a:p>
+            <a:pPr algn="ctr"/>
+            <a:endParaRPr lang="en-SG" sz="1400">
+              <a:solidFill>
+                <a:schemeClr val="dk1"/>
+              </a:solidFill>
+            </a:endParaRPr>
+          </a:p>
+        </p:txBody>
+      </p:sp>
+      <p:cxnSp>
+        <p:nvCxnSpPr>
+          <p:cNvPr id="9" name="Straight Arrow Connector 8">
+            <a:extLst/>
+          </p:cNvPr>
+          <p:cNvCxnSpPr/>
+          <p:nvPr/>
+        </p:nvCxnSpPr>
+        <p:spPr>
+          <a:xfrm>
+            <a:off x="2590800" y="3014599"/>
+            <a:ext cx="1119851" cy="0"/>
+          </a:xfrm>
+          <a:prstGeom prst="straightConnector1">
+            <a:avLst/>
+          </a:prstGeom>
+          <a:ln w="19050">
+            <a:solidFill>
+              <a:srgbClr val="00B050"/>
+            </a:solidFill>
+            <a:tailEnd type="arrow"/>
+          </a:ln>
+        </p:spPr>
+        <p:style>
+          <a:lnRef idx="1">
+            <a:schemeClr val="accent1"/>
+          </a:lnRef>
+          <a:fillRef idx="0">
+            <a:schemeClr val="accent1"/>
+          </a:fillRef>
+          <a:effectRef idx="0">
+            <a:schemeClr val="accent1"/>
+          </a:effectRef>
+          <a:fontRef idx="minor">
+            <a:schemeClr val="tx1"/>
+          </a:fontRef>
+        </p:style>
+      </p:cxnSp>
+      <p:cxnSp>
+        <p:nvCxnSpPr>
+          <p:cNvPr id="10" name="Straight Arrow Connector 9">
+            <a:extLst/>
+          </p:cNvPr>
+          <p:cNvCxnSpPr>
+            <a:cxnSpLocks/>
+          </p:cNvCxnSpPr>
+          <p:nvPr/>
+        </p:nvCxnSpPr>
+        <p:spPr>
+          <a:xfrm flipV="1">
+            <a:off x="3863051" y="3122098"/>
+            <a:ext cx="1613449" cy="1"/>
+          </a:xfrm>
+          <a:prstGeom prst="straightConnector1">
+            <a:avLst/>
+          </a:prstGeom>
+          <a:ln w="19050">
+            <a:solidFill>
+              <a:srgbClr val="0070C0"/>
+            </a:solidFill>
+            <a:tailEnd type="arrow"/>
+          </a:ln>
+        </p:spPr>
+        <p:style>
+          <a:lnRef idx="1">
+            <a:schemeClr val="accent1"/>
+          </a:lnRef>
+          <a:fillRef idx="0">
+            <a:schemeClr val="accent1"/>
+          </a:fillRef>
+          <a:effectRef idx="0">
+            <a:schemeClr val="accent1"/>
+          </a:effectRef>
+          <a:fontRef idx="minor">
+            <a:schemeClr val="tx1"/>
+          </a:fontRef>
+        </p:style>
+      </p:cxnSp>
+      <p:cxnSp>
+        <p:nvCxnSpPr>
+          <p:cNvPr id="11" name="Straight Arrow Connector 10">
+            <a:extLst/>
+          </p:cNvPr>
+          <p:cNvCxnSpPr/>
+          <p:nvPr/>
+        </p:nvCxnSpPr>
+        <p:spPr>
+          <a:xfrm flipV="1">
+            <a:off x="3879986" y="4243231"/>
+            <a:ext cx="1596514" cy="5378"/>
+          </a:xfrm>
+          <a:prstGeom prst="straightConnector1">
+            <a:avLst/>
+          </a:prstGeom>
+          <a:ln w="19050">
+            <a:solidFill>
+              <a:srgbClr val="0070C0"/>
+            </a:solidFill>
+            <a:prstDash val="sysDash"/>
+            <a:headEnd type="arrow" w="med" len="med"/>
+            <a:tailEnd type="none" w="med" len="med"/>
+          </a:ln>
+        </p:spPr>
+        <p:style>
+          <a:lnRef idx="1">
+            <a:schemeClr val="accent1"/>
+          </a:lnRef>
+          <a:fillRef idx="0">
+            <a:schemeClr val="accent1"/>
+          </a:fillRef>
+          <a:effectRef idx="0">
+            <a:schemeClr val="accent1"/>
+          </a:effectRef>
+          <a:fontRef idx="minor">
+            <a:schemeClr val="tx1"/>
+          </a:fontRef>
+        </p:style>
+      </p:cxnSp>
+      <p:cxnSp>
+        <p:nvCxnSpPr>
+          <p:cNvPr id="12" name="Straight Arrow Connector 11">
+            <a:extLst/>
+          </p:cNvPr>
+          <p:cNvCxnSpPr/>
+          <p:nvPr/>
+        </p:nvCxnSpPr>
+        <p:spPr>
+          <a:xfrm>
+            <a:off x="2511308" y="4648200"/>
+            <a:ext cx="1196051" cy="0"/>
+          </a:xfrm>
+          <a:prstGeom prst="straightConnector1">
+            <a:avLst/>
+          </a:prstGeom>
+          <a:ln w="19050">
+            <a:solidFill>
+              <a:schemeClr val="accent1"/>
+            </a:solidFill>
+            <a:prstDash val="sysDash"/>
+            <a:headEnd type="arrow" w="med" len="med"/>
+            <a:tailEnd type="none" w="med" len="med"/>
+          </a:ln>
+        </p:spPr>
+        <p:style>
+          <a:lnRef idx="1">
+            <a:schemeClr val="accent1"/>
+          </a:lnRef>
+          <a:fillRef idx="0">
+            <a:schemeClr val="accent1"/>
+          </a:fillRef>
+          <a:effectRef idx="0">
+            <a:schemeClr val="accent1"/>
+          </a:effectRef>
+          <a:fontRef idx="minor">
+            <a:schemeClr val="tx1"/>
+          </a:fontRef>
+        </p:style>
+      </p:cxnSp>
+      <p:sp>
+        <p:nvSpPr>
+          <p:cNvPr id="13" name="TextBox 12">
+            <a:extLst/>
+          </p:cNvPr>
+          <p:cNvSpPr txBox="1"/>
+          <p:nvPr/>
+        </p:nvSpPr>
+        <p:spPr>
+          <a:xfrm>
+            <a:off x="1900810" y="2819400"/>
+            <a:ext cx="1670973" cy="215444"/>
+          </a:xfrm>
+          <a:prstGeom prst="rect">
+            <a:avLst/>
+          </a:prstGeom>
+          <a:noFill/>
+        </p:spPr>
+        <p:txBody>
+          <a:bodyPr wrap="square" lIns="0" tIns="0" rIns="0" bIns="0" rtlCol="0">
+            <a:spAutoFit/>
+          </a:bodyPr>
+          <a:lstStyle>
+            <a:defPPr>
+              <a:defRPr lang="en-US"/>
+            </a:defPPr>
+            <a:lvl1pPr algn="r">
+              <a:defRPr sz="1400">
+                <a:solidFill>
+                  <a:srgbClr val="0070C0"/>
+                </a:solidFill>
+              </a:defRPr>
+            </a:lvl1pPr>
+          </a:lstStyle>
+          <a:p>
+            <a:r>
+              <a:rPr lang="en-US" dirty="0" err="1"/>
+              <a:t>updatePerson</a:t>
+            </a:r>
+            <a:r>
+              <a:rPr lang="en-US" dirty="0"/>
+              <a:t>(p)</a:t>
+            </a:r>
+          </a:p>
+        </p:txBody>
+      </p:sp>
+      <p:sp>
+        <p:nvSpPr>
+          <p:cNvPr id="14" name="TextBox 13">
+            <a:extLst/>
+          </p:cNvPr>
+          <p:cNvSpPr txBox="1"/>
+          <p:nvPr/>
+        </p:nvSpPr>
+        <p:spPr>
+          <a:xfrm>
+            <a:off x="4121289" y="4038600"/>
+            <a:ext cx="762000" cy="215444"/>
+          </a:xfrm>
+          <a:prstGeom prst="rect">
+            <a:avLst/>
+          </a:prstGeom>
+          <a:noFill/>
+        </p:spPr>
+        <p:txBody>
+          <a:bodyPr wrap="square" lIns="0" tIns="0" rIns="0" bIns="0" rtlCol="0">
+            <a:spAutoFit/>
+          </a:bodyPr>
+          <a:lstStyle>
+            <a:defPPr>
+              <a:defRPr lang="en-US"/>
+            </a:defPPr>
+            <a:lvl1pPr algn="r">
+              <a:defRPr sz="1400">
+                <a:solidFill>
+                  <a:srgbClr val="0070C0"/>
+                </a:solidFill>
+              </a:defRPr>
+            </a:lvl1pPr>
+          </a:lstStyle>
+          <a:p>
+            <a:r>
+              <a:rPr lang="en-US" dirty="0"/>
+              <a:t>return</a:t>
+            </a:r>
+          </a:p>
+        </p:txBody>
+      </p:sp>
+      <p:sp>
+        <p:nvSpPr>
+          <p:cNvPr id="15" name="TextBox 14">
+            <a:extLst/>
+          </p:cNvPr>
+          <p:cNvSpPr txBox="1"/>
+          <p:nvPr/>
+        </p:nvSpPr>
+        <p:spPr>
+          <a:xfrm>
+            <a:off x="3898068" y="2895600"/>
+            <a:ext cx="985221" cy="184666"/>
+          </a:xfrm>
+          <a:prstGeom prst="rect">
+            <a:avLst/>
+          </a:prstGeom>
+          <a:noFill/>
+        </p:spPr>
+        <p:txBody>
+          <a:bodyPr wrap="square" lIns="0" tIns="0" rIns="0" bIns="0" rtlCol="0">
+            <a:spAutoFit/>
+          </a:bodyPr>
+          <a:lstStyle>
+            <a:defPPr>
+              <a:defRPr lang="en-US"/>
+            </a:defPPr>
+            <a:lvl1pPr algn="r">
+              <a:defRPr sz="1400">
+                <a:solidFill>
+                  <a:srgbClr val="0070C0"/>
+                </a:solidFill>
+              </a:defRPr>
+            </a:lvl1pPr>
+          </a:lstStyle>
+          <a:p>
+            <a:r>
+              <a:rPr lang="en-US" sz="1200" dirty="0"/>
+              <a:t>sort()</a:t>
+            </a:r>
+          </a:p>
+        </p:txBody>
+      </p:sp>
+      <p:sp>
+        <p:nvSpPr>
+          <p:cNvPr id="16" name="TextBox 15">
+            <a:extLst/>
+          </p:cNvPr>
+          <p:cNvSpPr txBox="1"/>
+          <p:nvPr/>
+        </p:nvSpPr>
+        <p:spPr>
+          <a:xfrm>
+            <a:off x="2603655" y="4432756"/>
+            <a:ext cx="762000" cy="215444"/>
+          </a:xfrm>
+          <a:prstGeom prst="rect">
+            <a:avLst/>
+          </a:prstGeom>
+          <a:noFill/>
+        </p:spPr>
+        <p:txBody>
+          <a:bodyPr wrap="square" lIns="0" tIns="0" rIns="0" bIns="0" rtlCol="0">
+            <a:spAutoFit/>
+          </a:bodyPr>
+          <a:lstStyle>
+            <a:defPPr>
+              <a:defRPr lang="en-US"/>
+            </a:defPPr>
+            <a:lvl1pPr algn="r">
+              <a:defRPr sz="1400">
+                <a:solidFill>
+                  <a:srgbClr val="0070C0"/>
+                </a:solidFill>
+              </a:defRPr>
+            </a:lvl1pPr>
+          </a:lstStyle>
+          <a:p>
+            <a:r>
+              <a:rPr lang="en-US" dirty="0"/>
+              <a:t>return</a:t>
+            </a:r>
+          </a:p>
+        </p:txBody>
+      </p:sp>
+    </p:spTree>
+    <p:extLst>
+      <p:ext uri="{BB962C8B-B14F-4D97-AF65-F5344CB8AC3E}">
+        <p14:creationId xmlns:p14="http://schemas.microsoft.com/office/powerpoint/2010/main" val="2410466789"/>
+      </p:ext>
+    </p:extLst>
+  </p:cSld>
+  <p:clrMapOvr>
+    <a:masterClrMapping/>
+  </p:clrMapOvr>
+</p:sld>
+</file>
+
+<file path=ppt/slides/slide6.xml><?xml version="1.0" encoding="utf-8"?>
+<p:sld xmlns:a="http://schemas.openxmlformats.org/drawingml/2006/main" xmlns:r="http://schemas.openxmlformats.org/officeDocument/2006/relationships" xmlns:p="http://schemas.openxmlformats.org/presentationml/2006/main">
+  <p:cSld>
+    <p:spTree>
+      <p:nvGrpSpPr>
+        <p:cNvPr id="1" name=""/>
+        <p:cNvGrpSpPr/>
+        <p:nvPr/>
+      </p:nvGrpSpPr>
+      <p:grpSpPr>
+        <a:xfrm>
+          <a:off x="0" y="0"/>
+          <a:ext cx="0" cy="0"/>
+          <a:chOff x="0" y="0"/>
+          <a:chExt cx="0" cy="0"/>
+        </a:xfrm>
+      </p:grpSpPr>
+      <p:sp>
+        <p:nvSpPr>
+          <p:cNvPr id="3" name="Rectangle 65">
+            <a:extLst/>
+          </p:cNvPr>
+          <p:cNvSpPr/>
+          <p:nvPr/>
+        </p:nvSpPr>
+        <p:spPr>
+          <a:xfrm>
+            <a:off x="721766" y="1969767"/>
+            <a:ext cx="5738135" cy="3717955"/>
+          </a:xfrm>
+          <a:prstGeom prst="roundRect">
+            <a:avLst>
+              <a:gd name="adj" fmla="val 3484"/>
+            </a:avLst>
+          </a:prstGeom>
+          <a:solidFill>
+            <a:schemeClr val="accent1">
+              <a:lumMod val="20000"/>
+              <a:lumOff val="80000"/>
+            </a:schemeClr>
+          </a:solidFill>
+          <a:ln w="19050">
+            <a:noFill/>
+          </a:ln>
+          <a:effectLst/>
+        </p:spPr>
+        <p:style>
+          <a:lnRef idx="1">
+            <a:schemeClr val="accent2"/>
+          </a:lnRef>
+          <a:fillRef idx="2">
+            <a:schemeClr val="accent2"/>
+          </a:fillRef>
+          <a:effectRef idx="1">
+            <a:schemeClr val="accent2"/>
+          </a:effectRef>
+          <a:fontRef idx="minor">
+            <a:schemeClr val="dk1"/>
+          </a:fontRef>
+        </p:style>
+        <p:txBody>
+          <a:bodyPr rtlCol="0" anchor="t"/>
+          <a:lstStyle/>
+          <a:p>
+            <a:r>
+              <a:rPr lang="en-US" sz="1200" b="1" dirty="0">
+                <a:solidFill>
+                  <a:srgbClr val="0070C0"/>
+                </a:solidFill>
+              </a:rPr>
+              <a:t>Logic</a:t>
+            </a:r>
+            <a:endParaRPr lang="en-SG" sz="1200" b="1" dirty="0">
+              <a:solidFill>
+                <a:srgbClr val="0070C0"/>
+              </a:solidFill>
+            </a:endParaRPr>
+          </a:p>
+        </p:txBody>
+      </p:sp>
+      <p:sp>
+        <p:nvSpPr>
+          <p:cNvPr id="4" name="Rectangle 62">
+            <a:extLst/>
+          </p:cNvPr>
+          <p:cNvSpPr/>
+          <p:nvPr/>
+        </p:nvSpPr>
+        <p:spPr>
+          <a:xfrm>
+            <a:off x="845045" y="2296546"/>
+            <a:ext cx="1455629" cy="346760"/>
+          </a:xfrm>
+          <a:prstGeom prst="rect">
+            <a:avLst/>
+          </a:prstGeom>
+          <a:solidFill>
+            <a:srgbClr val="0070C0"/>
+          </a:solidFill>
+          <a:ln w="19050">
+            <a:solidFill>
+              <a:srgbClr val="0070C0"/>
+            </a:solidFill>
+          </a:ln>
+          <a:effectLst/>
+        </p:spPr>
+        <p:style>
+          <a:lnRef idx="1">
+            <a:schemeClr val="accent2"/>
+          </a:lnRef>
+          <a:fillRef idx="2">
+            <a:schemeClr val="accent2"/>
+          </a:fillRef>
+          <a:effectRef idx="1">
+            <a:schemeClr val="accent2"/>
+          </a:effectRef>
+          <a:fontRef idx="minor">
+            <a:schemeClr val="dk1"/>
+          </a:fontRef>
+        </p:style>
+        <p:txBody>
+          <a:bodyPr rtlCol="0" anchor="ctr"/>
+          <a:lstStyle/>
+          <a:p>
+            <a:pPr algn="ctr"/>
+            <a:r>
+              <a:rPr lang="en-US" sz="1600" dirty="0">
+                <a:solidFill>
+                  <a:schemeClr val="bg1"/>
+                </a:solidFill>
+              </a:rPr>
+              <a:t>:</a:t>
+            </a:r>
+            <a:r>
+              <a:rPr lang="en-US" sz="1600" dirty="0" err="1">
+                <a:solidFill>
+                  <a:schemeClr val="bg1"/>
+                </a:solidFill>
+              </a:rPr>
+              <a:t>LogicManager</a:t>
+            </a:r>
+            <a:endParaRPr lang="en-SG" sz="1600" dirty="0">
+              <a:solidFill>
+                <a:schemeClr val="bg1"/>
+              </a:solidFill>
+            </a:endParaRPr>
+          </a:p>
+        </p:txBody>
+      </p:sp>
+      <p:cxnSp>
+        <p:nvCxnSpPr>
+          <p:cNvPr id="5" name="Straight Connector 4">
+            <a:extLst/>
+          </p:cNvPr>
+          <p:cNvCxnSpPr>
+            <a:cxnSpLocks/>
+          </p:cNvCxnSpPr>
+          <p:nvPr/>
+        </p:nvCxnSpPr>
+        <p:spPr>
+          <a:xfrm>
+            <a:off x="1572859" y="2660217"/>
+            <a:ext cx="27341" cy="1683183"/>
+          </a:xfrm>
+          <a:prstGeom prst="line">
+            <a:avLst/>
+          </a:prstGeom>
+          <a:ln w="19050">
+            <a:solidFill>
+              <a:srgbClr val="0070C0"/>
+            </a:solidFill>
+            <a:prstDash val="sysDash"/>
+          </a:ln>
+          <a:effectLst/>
+        </p:spPr>
+        <p:style>
+          <a:lnRef idx="1">
+            <a:schemeClr val="accent1"/>
+          </a:lnRef>
+          <a:fillRef idx="2">
+            <a:schemeClr val="accent1"/>
+          </a:fillRef>
+          <a:effectRef idx="1">
+            <a:schemeClr val="accent1"/>
+          </a:effectRef>
+          <a:fontRef idx="minor">
+            <a:schemeClr val="dk1"/>
+          </a:fontRef>
+        </p:style>
+      </p:cxnSp>
+      <p:sp>
+        <p:nvSpPr>
+          <p:cNvPr id="6" name="Rectangle 5">
+            <a:extLst/>
+          </p:cNvPr>
+          <p:cNvSpPr/>
+          <p:nvPr/>
+        </p:nvSpPr>
+        <p:spPr>
+          <a:xfrm>
+            <a:off x="1500851" y="3010911"/>
+            <a:ext cx="152400" cy="1450289"/>
+          </a:xfrm>
+          <a:prstGeom prst="rect">
+            <a:avLst/>
+          </a:prstGeom>
+          <a:solidFill>
+            <a:srgbClr val="0070C0"/>
+          </a:solidFill>
+          <a:ln>
+            <a:solidFill>
+              <a:srgbClr val="0070C0"/>
+            </a:solidFill>
+          </a:ln>
+          <a:effectLst/>
+        </p:spPr>
+        <p:style>
+          <a:lnRef idx="1">
+            <a:schemeClr val="accent3"/>
+          </a:lnRef>
+          <a:fillRef idx="2">
+            <a:schemeClr val="accent3"/>
+          </a:fillRef>
+          <a:effectRef idx="1">
+            <a:schemeClr val="accent3"/>
+          </a:effectRef>
+          <a:fontRef idx="minor">
+            <a:schemeClr val="dk1"/>
+          </a:fontRef>
+        </p:style>
+        <p:txBody>
+          <a:bodyPr rtlCol="0" anchor="ctr"/>
+          <a:lstStyle/>
+          <a:p>
+            <a:pPr algn="ctr"/>
+            <a:endParaRPr lang="en-SG" sz="1400"/>
+          </a:p>
+        </p:txBody>
+      </p:sp>
+      <p:sp>
+        <p:nvSpPr>
+          <p:cNvPr id="7" name="Rectangle 62">
+            <a:extLst/>
+          </p:cNvPr>
+          <p:cNvSpPr/>
+          <p:nvPr/>
+        </p:nvSpPr>
+        <p:spPr>
+          <a:xfrm>
+            <a:off x="2743200" y="2179309"/>
+            <a:ext cx="1219200" cy="467684"/>
+          </a:xfrm>
+          <a:prstGeom prst="rect">
+            <a:avLst/>
+          </a:prstGeom>
+          <a:solidFill>
+            <a:srgbClr val="0070C0"/>
+          </a:solidFill>
+          <a:ln w="19050">
+            <a:solidFill>
+              <a:srgbClr val="0070C0"/>
+            </a:solidFill>
+          </a:ln>
+          <a:effectLst/>
+        </p:spPr>
+        <p:style>
+          <a:lnRef idx="1">
+            <a:schemeClr val="accent2"/>
+          </a:lnRef>
+          <a:fillRef idx="2">
+            <a:schemeClr val="accent2"/>
+          </a:fillRef>
+          <a:effectRef idx="1">
+            <a:schemeClr val="accent2"/>
+          </a:effectRef>
+          <a:fontRef idx="minor">
+            <a:schemeClr val="dk1"/>
+          </a:fontRef>
+        </p:style>
+        <p:txBody>
+          <a:bodyPr rtlCol="0" anchor="ctr"/>
+          <a:lstStyle/>
+          <a:p>
+            <a:pPr algn="ctr"/>
+            <a:r>
+              <a:rPr lang="en-US" sz="1600" dirty="0">
+                <a:solidFill>
+                  <a:schemeClr val="bg1"/>
+                </a:solidFill>
+              </a:rPr>
+              <a:t>:Address</a:t>
+            </a:r>
+          </a:p>
+          <a:p>
+            <a:pPr algn="ctr"/>
+            <a:r>
+              <a:rPr lang="en-US" sz="1600" dirty="0" err="1">
+                <a:solidFill>
+                  <a:schemeClr val="bg1"/>
+                </a:solidFill>
+              </a:rPr>
+              <a:t>BookParser</a:t>
+            </a:r>
+            <a:endParaRPr lang="en-SG" sz="1600" dirty="0">
+              <a:solidFill>
+                <a:schemeClr val="bg1"/>
+              </a:solidFill>
+            </a:endParaRPr>
+          </a:p>
+        </p:txBody>
+      </p:sp>
+      <p:cxnSp>
+        <p:nvCxnSpPr>
+          <p:cNvPr id="8" name="Straight Connector 7">
+            <a:extLst/>
+          </p:cNvPr>
+          <p:cNvCxnSpPr/>
+          <p:nvPr/>
+        </p:nvCxnSpPr>
+        <p:spPr>
+          <a:xfrm>
+            <a:off x="3356599" y="2663904"/>
+            <a:ext cx="0" cy="1695374"/>
+          </a:xfrm>
+          <a:prstGeom prst="line">
+            <a:avLst/>
+          </a:prstGeom>
+          <a:ln w="19050">
+            <a:solidFill>
+              <a:srgbClr val="0070C0"/>
+            </a:solidFill>
+            <a:prstDash val="sysDash"/>
+          </a:ln>
+          <a:effectLst/>
+        </p:spPr>
+        <p:style>
+          <a:lnRef idx="1">
+            <a:schemeClr val="accent1"/>
+          </a:lnRef>
+          <a:fillRef idx="2">
+            <a:schemeClr val="accent1"/>
+          </a:fillRef>
+          <a:effectRef idx="1">
+            <a:schemeClr val="accent1"/>
+          </a:effectRef>
+          <a:fontRef idx="minor">
+            <a:schemeClr val="dk1"/>
+          </a:fontRef>
+        </p:style>
+      </p:cxnSp>
+      <p:sp>
+        <p:nvSpPr>
+          <p:cNvPr id="9" name="Rectangle 8">
+            <a:extLst/>
+          </p:cNvPr>
+          <p:cNvSpPr/>
+          <p:nvPr/>
+        </p:nvSpPr>
+        <p:spPr>
+          <a:xfrm>
+            <a:off x="3284590" y="3122096"/>
+            <a:ext cx="174929" cy="1129459"/>
+          </a:xfrm>
+          <a:prstGeom prst="rect">
+            <a:avLst/>
+          </a:prstGeom>
+          <a:solidFill>
+            <a:srgbClr val="0070C0"/>
+          </a:solidFill>
+          <a:ln>
+            <a:solidFill>
+              <a:srgbClr val="0070C0"/>
+            </a:solidFill>
+          </a:ln>
+          <a:effectLst/>
+        </p:spPr>
+        <p:style>
+          <a:lnRef idx="1">
+            <a:schemeClr val="accent3"/>
+          </a:lnRef>
+          <a:fillRef idx="2">
+            <a:schemeClr val="accent3"/>
+          </a:fillRef>
+          <a:effectRef idx="1">
+            <a:schemeClr val="accent3"/>
+          </a:effectRef>
+          <a:fontRef idx="minor">
+            <a:schemeClr val="dk1"/>
+          </a:fontRef>
+        </p:style>
+        <p:txBody>
+          <a:bodyPr rtlCol="0" anchor="ctr"/>
+          <a:lstStyle/>
+          <a:p>
+            <a:pPr algn="ctr"/>
+            <a:endParaRPr lang="en-SG" sz="1400">
+              <a:solidFill>
+                <a:schemeClr val="dk1"/>
+              </a:solidFill>
+            </a:endParaRPr>
+          </a:p>
+        </p:txBody>
+      </p:sp>
+      <p:cxnSp>
+        <p:nvCxnSpPr>
+          <p:cNvPr id="13" name="Straight Arrow Connector 12">
+            <a:extLst/>
+          </p:cNvPr>
+          <p:cNvCxnSpPr/>
+          <p:nvPr/>
+        </p:nvCxnSpPr>
+        <p:spPr>
+          <a:xfrm>
+            <a:off x="381000" y="3014599"/>
+            <a:ext cx="1119851" cy="0"/>
+          </a:xfrm>
+          <a:prstGeom prst="straightConnector1">
+            <a:avLst/>
+          </a:prstGeom>
+          <a:ln w="19050">
+            <a:solidFill>
+              <a:srgbClr val="00B050"/>
+            </a:solidFill>
+            <a:tailEnd type="arrow"/>
+          </a:ln>
+        </p:spPr>
+        <p:style>
+          <a:lnRef idx="1">
+            <a:schemeClr val="accent1"/>
+          </a:lnRef>
+          <a:fillRef idx="0">
+            <a:schemeClr val="accent1"/>
+          </a:fillRef>
+          <a:effectRef idx="0">
+            <a:schemeClr val="accent1"/>
+          </a:effectRef>
+          <a:fontRef idx="minor">
+            <a:schemeClr val="tx1"/>
+          </a:fontRef>
+        </p:style>
+      </p:cxnSp>
+      <p:cxnSp>
+        <p:nvCxnSpPr>
+          <p:cNvPr id="14" name="Straight Arrow Connector 13">
+            <a:extLst/>
+          </p:cNvPr>
+          <p:cNvCxnSpPr/>
+          <p:nvPr/>
+        </p:nvCxnSpPr>
+        <p:spPr>
+          <a:xfrm flipV="1">
+            <a:off x="1653251" y="3122097"/>
+            <a:ext cx="1596514" cy="1"/>
+          </a:xfrm>
+          <a:prstGeom prst="straightConnector1">
+            <a:avLst/>
+          </a:prstGeom>
+          <a:ln w="19050">
+            <a:solidFill>
+              <a:srgbClr val="0070C0"/>
+            </a:solidFill>
+            <a:tailEnd type="arrow"/>
+          </a:ln>
+        </p:spPr>
+        <p:style>
+          <a:lnRef idx="1">
+            <a:schemeClr val="accent1"/>
+          </a:lnRef>
+          <a:fillRef idx="0">
+            <a:schemeClr val="accent1"/>
+          </a:fillRef>
+          <a:effectRef idx="0">
+            <a:schemeClr val="accent1"/>
+          </a:effectRef>
+          <a:fontRef idx="minor">
+            <a:schemeClr val="tx1"/>
+          </a:fontRef>
+        </p:style>
+      </p:cxnSp>
+      <p:sp>
+        <p:nvSpPr>
+          <p:cNvPr id="15" name="TextBox 14">
+            <a:extLst/>
+          </p:cNvPr>
+          <p:cNvSpPr txBox="1"/>
+          <p:nvPr/>
+        </p:nvSpPr>
+        <p:spPr>
+          <a:xfrm>
+            <a:off x="-417063" y="2743200"/>
+            <a:ext cx="1841909" cy="215444"/>
+          </a:xfrm>
+          <a:prstGeom prst="rect">
+            <a:avLst/>
+          </a:prstGeom>
+          <a:noFill/>
+        </p:spPr>
+        <p:txBody>
+          <a:bodyPr wrap="square" lIns="0" tIns="0" rIns="0" bIns="0" rtlCol="0">
+            <a:spAutoFit/>
+          </a:bodyPr>
+          <a:lstStyle/>
+          <a:p>
+            <a:pPr algn="r"/>
+            <a:r>
+              <a:rPr lang="en-US" sz="1400" dirty="0">
+                <a:solidFill>
+                  <a:srgbClr val="0070C0"/>
+                </a:solidFill>
+              </a:rPr>
+              <a:t>execute(“</a:t>
+            </a:r>
+            <a:r>
+              <a:rPr lang="en-US" sz="1400" dirty="0" err="1">
+                <a:solidFill>
+                  <a:srgbClr val="0070C0"/>
+                </a:solidFill>
+              </a:rPr>
+              <a:t>changetheme</a:t>
+            </a:r>
+            <a:r>
+              <a:rPr lang="en-US" sz="1400" dirty="0">
+                <a:solidFill>
+                  <a:srgbClr val="0070C0"/>
+                </a:solidFill>
+              </a:rPr>
+              <a:t>”)</a:t>
+            </a:r>
+          </a:p>
+        </p:txBody>
+      </p:sp>
+      <p:cxnSp>
+        <p:nvCxnSpPr>
+          <p:cNvPr id="16" name="Straight Arrow Connector 15">
+            <a:extLst/>
+          </p:cNvPr>
+          <p:cNvCxnSpPr>
+            <a:cxnSpLocks/>
+          </p:cNvCxnSpPr>
+          <p:nvPr/>
+        </p:nvCxnSpPr>
+        <p:spPr>
+          <a:xfrm flipV="1">
+            <a:off x="5257218" y="3691354"/>
+            <a:ext cx="1609000" cy="11862"/>
+          </a:xfrm>
+          <a:prstGeom prst="straightConnector1">
+            <a:avLst/>
+          </a:prstGeom>
+          <a:ln w="19050">
+            <a:solidFill>
+              <a:srgbClr val="0070C0"/>
+            </a:solidFill>
+            <a:tailEnd type="arrow"/>
+          </a:ln>
+        </p:spPr>
+        <p:style>
+          <a:lnRef idx="1">
+            <a:schemeClr val="accent1"/>
+          </a:lnRef>
+          <a:fillRef idx="0">
+            <a:schemeClr val="accent1"/>
+          </a:fillRef>
+          <a:effectRef idx="0">
+            <a:schemeClr val="accent1"/>
+          </a:effectRef>
+          <a:fontRef idx="minor">
+            <a:schemeClr val="tx1"/>
+          </a:fontRef>
+        </p:style>
+      </p:cxnSp>
+      <p:sp>
+        <p:nvSpPr>
+          <p:cNvPr id="17" name="TextBox 16">
+            <a:extLst/>
+          </p:cNvPr>
+          <p:cNvSpPr txBox="1"/>
+          <p:nvPr/>
+        </p:nvSpPr>
+        <p:spPr>
+          <a:xfrm>
+            <a:off x="4257582" y="4251556"/>
+            <a:ext cx="855809" cy="215444"/>
+          </a:xfrm>
+          <a:prstGeom prst="rect">
+            <a:avLst/>
+          </a:prstGeom>
+          <a:noFill/>
+        </p:spPr>
+        <p:txBody>
+          <a:bodyPr wrap="square" lIns="0" tIns="0" rIns="0" bIns="0" rtlCol="0">
+            <a:spAutoFit/>
+          </a:bodyPr>
+          <a:lstStyle>
+            <a:defPPr>
+              <a:defRPr lang="en-US"/>
+            </a:defPPr>
+            <a:lvl1pPr algn="r">
+              <a:defRPr sz="1400">
+                <a:solidFill>
+                  <a:srgbClr val="0070C0"/>
+                </a:solidFill>
+              </a:defRPr>
+            </a:lvl1pPr>
+          </a:lstStyle>
+          <a:p>
+            <a:r>
+              <a:rPr lang="en-US" dirty="0"/>
+              <a:t>execute()</a:t>
+            </a:r>
+          </a:p>
+        </p:txBody>
+      </p:sp>
+      <p:cxnSp>
+        <p:nvCxnSpPr>
+          <p:cNvPr id="19" name="Straight Arrow Connector 18">
+            <a:extLst/>
+          </p:cNvPr>
+          <p:cNvCxnSpPr/>
+          <p:nvPr/>
+        </p:nvCxnSpPr>
+        <p:spPr>
+          <a:xfrm flipV="1">
+            <a:off x="1670186" y="4243231"/>
+            <a:ext cx="1596514" cy="5378"/>
+          </a:xfrm>
+          <a:prstGeom prst="straightConnector1">
+            <a:avLst/>
+          </a:prstGeom>
+          <a:ln w="19050">
+            <a:solidFill>
+              <a:srgbClr val="0070C0"/>
+            </a:solidFill>
+            <a:prstDash val="sysDash"/>
+            <a:headEnd type="arrow" w="med" len="med"/>
+            <a:tailEnd type="none" w="med" len="med"/>
+          </a:ln>
+        </p:spPr>
+        <p:style>
+          <a:lnRef idx="1">
+            <a:schemeClr val="accent1"/>
+          </a:lnRef>
+          <a:fillRef idx="0">
+            <a:schemeClr val="accent1"/>
+          </a:fillRef>
+          <a:effectRef idx="0">
+            <a:schemeClr val="accent1"/>
+          </a:effectRef>
+          <a:fontRef idx="minor">
+            <a:schemeClr val="tx1"/>
+          </a:fontRef>
+        </p:style>
+      </p:cxnSp>
+      <p:cxnSp>
+        <p:nvCxnSpPr>
+          <p:cNvPr id="20" name="Straight Arrow Connector 19">
+            <a:extLst/>
+          </p:cNvPr>
+          <p:cNvCxnSpPr/>
+          <p:nvPr/>
+        </p:nvCxnSpPr>
+        <p:spPr>
+          <a:xfrm>
+            <a:off x="291268" y="4452302"/>
+            <a:ext cx="1196051" cy="0"/>
+          </a:xfrm>
+          <a:prstGeom prst="straightConnector1">
+            <a:avLst/>
+          </a:prstGeom>
+          <a:ln w="19050">
+            <a:solidFill>
+              <a:schemeClr val="accent1"/>
+            </a:solidFill>
+            <a:prstDash val="sysDash"/>
+            <a:headEnd type="arrow" w="med" len="med"/>
+            <a:tailEnd type="none" w="med" len="med"/>
+          </a:ln>
+        </p:spPr>
+        <p:style>
+          <a:lnRef idx="1">
+            <a:schemeClr val="accent1"/>
+          </a:lnRef>
+          <a:fillRef idx="0">
+            <a:schemeClr val="accent1"/>
+          </a:fillRef>
+          <a:effectRef idx="0">
+            <a:schemeClr val="accent1"/>
+          </a:effectRef>
+          <a:fontRef idx="minor">
+            <a:schemeClr val="tx1"/>
+          </a:fontRef>
+        </p:style>
+      </p:cxnSp>
+      <p:sp>
+        <p:nvSpPr>
+          <p:cNvPr id="24" name="TextBox 23">
+            <a:extLst/>
+          </p:cNvPr>
+          <p:cNvSpPr txBox="1"/>
+          <p:nvPr/>
+        </p:nvSpPr>
+        <p:spPr>
+          <a:xfrm>
+            <a:off x="3629363" y="3672116"/>
+            <a:ext cx="985221" cy="184666"/>
+          </a:xfrm>
+          <a:prstGeom prst="rect">
+            <a:avLst/>
+          </a:prstGeom>
+          <a:noFill/>
+        </p:spPr>
+        <p:txBody>
+          <a:bodyPr wrap="square" lIns="0" tIns="0" rIns="0" bIns="0" rtlCol="0">
+            <a:spAutoFit/>
+          </a:bodyPr>
+          <a:lstStyle>
+            <a:defPPr>
+              <a:defRPr lang="en-US"/>
+            </a:defPPr>
+            <a:lvl1pPr algn="r">
+              <a:defRPr sz="1400">
+                <a:solidFill>
+                  <a:srgbClr val="0070C0"/>
+                </a:solidFill>
+              </a:defRPr>
+            </a:lvl1pPr>
+          </a:lstStyle>
+          <a:p>
+            <a:endParaRPr lang="en-US" sz="1200" dirty="0"/>
+          </a:p>
+        </p:txBody>
+      </p:sp>
+      <p:sp>
+        <p:nvSpPr>
+          <p:cNvPr id="25" name="TextBox 24">
+            <a:extLst/>
+          </p:cNvPr>
+          <p:cNvSpPr txBox="1"/>
+          <p:nvPr/>
+        </p:nvSpPr>
+        <p:spPr>
+          <a:xfrm>
+            <a:off x="1496855" y="2850922"/>
+            <a:ext cx="1670973" cy="215444"/>
+          </a:xfrm>
+          <a:prstGeom prst="rect">
+            <a:avLst/>
+          </a:prstGeom>
+          <a:noFill/>
+        </p:spPr>
+        <p:txBody>
+          <a:bodyPr wrap="square" lIns="0" tIns="0" rIns="0" bIns="0" rtlCol="0">
+            <a:spAutoFit/>
+          </a:bodyPr>
+          <a:lstStyle>
+            <a:defPPr>
+              <a:defRPr lang="en-US"/>
+            </a:defPPr>
+            <a:lvl1pPr algn="r">
+              <a:defRPr sz="1400">
+                <a:solidFill>
+                  <a:srgbClr val="0070C0"/>
+                </a:solidFill>
+              </a:defRPr>
+            </a:lvl1pPr>
+          </a:lstStyle>
+          <a:p>
+            <a:r>
+              <a:rPr lang="en-US" dirty="0"/>
+              <a:t>parse()</a:t>
+            </a:r>
+          </a:p>
+        </p:txBody>
+      </p:sp>
+      <p:sp>
+        <p:nvSpPr>
+          <p:cNvPr id="27" name="TextBox 26">
+            <a:extLst/>
+          </p:cNvPr>
+          <p:cNvSpPr txBox="1"/>
+          <p:nvPr/>
+        </p:nvSpPr>
+        <p:spPr>
+          <a:xfrm>
+            <a:off x="586451" y="4199590"/>
+            <a:ext cx="762000" cy="215444"/>
+          </a:xfrm>
+          <a:prstGeom prst="rect">
+            <a:avLst/>
+          </a:prstGeom>
+          <a:noFill/>
+        </p:spPr>
+        <p:txBody>
+          <a:bodyPr wrap="square" lIns="0" tIns="0" rIns="0" bIns="0" rtlCol="0">
+            <a:spAutoFit/>
+          </a:bodyPr>
+          <a:lstStyle>
+            <a:defPPr>
+              <a:defRPr lang="en-US"/>
+            </a:defPPr>
+            <a:lvl1pPr algn="r">
+              <a:defRPr sz="1400">
+                <a:solidFill>
+                  <a:srgbClr val="0070C0"/>
+                </a:solidFill>
+              </a:defRPr>
+            </a:lvl1pPr>
+          </a:lstStyle>
+          <a:p>
+            <a:r>
+              <a:rPr lang="en-US" dirty="0"/>
+              <a:t>return</a:t>
+            </a:r>
+          </a:p>
+        </p:txBody>
+      </p:sp>
+      <p:sp>
+        <p:nvSpPr>
+          <p:cNvPr id="31" name="Rectangle 62">
+            <a:extLst/>
+          </p:cNvPr>
+          <p:cNvSpPr/>
+          <p:nvPr/>
+        </p:nvSpPr>
+        <p:spPr>
+          <a:xfrm>
+            <a:off x="4231981" y="2929839"/>
+            <a:ext cx="1778201" cy="432035"/>
+          </a:xfrm>
+          <a:prstGeom prst="rect">
+            <a:avLst/>
+          </a:prstGeom>
+          <a:solidFill>
+            <a:srgbClr val="0070C0"/>
+          </a:solidFill>
+          <a:ln w="19050">
+            <a:solidFill>
+              <a:srgbClr val="0070C0"/>
+            </a:solidFill>
+          </a:ln>
+          <a:effectLst/>
+        </p:spPr>
+        <p:style>
+          <a:lnRef idx="1">
+            <a:schemeClr val="accent2"/>
+          </a:lnRef>
+          <a:fillRef idx="2">
+            <a:schemeClr val="accent2"/>
+          </a:fillRef>
+          <a:effectRef idx="1">
+            <a:schemeClr val="accent2"/>
+          </a:effectRef>
+          <a:fontRef idx="minor">
+            <a:schemeClr val="dk1"/>
+          </a:fontRef>
+        </p:style>
+        <p:txBody>
+          <a:bodyPr rtlCol="0" anchor="ctr"/>
+          <a:lstStyle/>
+          <a:p>
+            <a:pPr algn="ctr"/>
+            <a:r>
+              <a:rPr lang="en-US" sz="1600" dirty="0">
+                <a:solidFill>
+                  <a:schemeClr val="bg1"/>
+                </a:solidFill>
+              </a:rPr>
+              <a:t>d:ThemeCommand</a:t>
+            </a:r>
+          </a:p>
+        </p:txBody>
+      </p:sp>
+      <p:cxnSp>
+        <p:nvCxnSpPr>
+          <p:cNvPr id="32" name="Straight Arrow Connector 31">
+            <a:extLst/>
+          </p:cNvPr>
+          <p:cNvCxnSpPr/>
+          <p:nvPr/>
+        </p:nvCxnSpPr>
+        <p:spPr>
+          <a:xfrm>
+            <a:off x="3462591" y="3657600"/>
+            <a:ext cx="1597356" cy="1"/>
+          </a:xfrm>
+          <a:prstGeom prst="straightConnector1">
+            <a:avLst/>
+          </a:prstGeom>
+          <a:ln w="19050">
+            <a:headEnd type="none" w="med" len="med"/>
+            <a:tailEnd type="arrow" w="med" len="med"/>
+          </a:ln>
+        </p:spPr>
+        <p:style>
+          <a:lnRef idx="1">
+            <a:schemeClr val="accent1"/>
+          </a:lnRef>
+          <a:fillRef idx="0">
+            <a:schemeClr val="accent1"/>
+          </a:fillRef>
+          <a:effectRef idx="0">
+            <a:schemeClr val="accent1"/>
+          </a:effectRef>
+          <a:fontRef idx="minor">
+            <a:schemeClr val="tx1"/>
+          </a:fontRef>
+        </p:style>
+      </p:cxnSp>
+      <p:sp>
+        <p:nvSpPr>
+          <p:cNvPr id="33" name="Rectangle 32">
+            <a:extLst/>
+          </p:cNvPr>
+          <p:cNvSpPr/>
+          <p:nvPr/>
+        </p:nvSpPr>
+        <p:spPr>
+          <a:xfrm>
+            <a:off x="5059947" y="3352800"/>
+            <a:ext cx="205843" cy="123165"/>
+          </a:xfrm>
+          <a:prstGeom prst="rect">
+            <a:avLst/>
+          </a:prstGeom>
+          <a:solidFill>
+            <a:srgbClr val="0070C0"/>
+          </a:solidFill>
+          <a:ln>
+            <a:solidFill>
+              <a:srgbClr val="0070C0"/>
+            </a:solidFill>
+          </a:ln>
+          <a:effectLst/>
+        </p:spPr>
+        <p:style>
+          <a:lnRef idx="1">
+            <a:schemeClr val="accent3"/>
+          </a:lnRef>
+          <a:fillRef idx="2">
+            <a:schemeClr val="accent3"/>
+          </a:fillRef>
+          <a:effectRef idx="1">
+            <a:schemeClr val="accent3"/>
+          </a:effectRef>
+          <a:fontRef idx="minor">
+            <a:schemeClr val="dk1"/>
+          </a:fontRef>
+        </p:style>
+        <p:txBody>
+          <a:bodyPr rtlCol="0" anchor="ctr"/>
+          <a:lstStyle/>
+          <a:p>
+            <a:pPr algn="ctr"/>
+            <a:endParaRPr lang="en-SG" sz="1400"/>
+          </a:p>
+        </p:txBody>
+      </p:sp>
+      <p:cxnSp>
+        <p:nvCxnSpPr>
+          <p:cNvPr id="34" name="Straight Connector 33">
+            <a:extLst/>
+          </p:cNvPr>
+          <p:cNvCxnSpPr>
+            <a:stCxn id="33" idx="0"/>
+          </p:cNvCxnSpPr>
+          <p:nvPr/>
+        </p:nvCxnSpPr>
+        <p:spPr>
+          <a:xfrm>
+            <a:off x="5162869" y="3352800"/>
+            <a:ext cx="0" cy="990600"/>
+          </a:xfrm>
+          <a:prstGeom prst="line">
+            <a:avLst/>
+          </a:prstGeom>
+          <a:ln w="19050">
+            <a:solidFill>
+              <a:srgbClr val="0070C0"/>
+            </a:solidFill>
+            <a:prstDash val="sysDash"/>
+          </a:ln>
+          <a:effectLst/>
+        </p:spPr>
+        <p:style>
+          <a:lnRef idx="1">
+            <a:schemeClr val="accent1"/>
+          </a:lnRef>
+          <a:fillRef idx="2">
+            <a:schemeClr val="accent1"/>
+          </a:fillRef>
+          <a:effectRef idx="1">
+            <a:schemeClr val="accent1"/>
+          </a:effectRef>
+          <a:fontRef idx="minor">
+            <a:schemeClr val="dk1"/>
+          </a:fontRef>
+        </p:style>
+      </p:cxnSp>
+      <p:sp>
+        <p:nvSpPr>
+          <p:cNvPr id="35" name="Rectangle 34">
+            <a:extLst/>
+          </p:cNvPr>
+          <p:cNvSpPr/>
+          <p:nvPr/>
+        </p:nvSpPr>
+        <p:spPr>
+          <a:xfrm>
+            <a:off x="5059947" y="3657601"/>
+            <a:ext cx="205843" cy="533400"/>
+          </a:xfrm>
+          <a:prstGeom prst="rect">
+            <a:avLst/>
+          </a:prstGeom>
+          <a:solidFill>
+            <a:srgbClr val="0070C0"/>
+          </a:solidFill>
+          <a:ln>
+            <a:solidFill>
+              <a:srgbClr val="0070C0"/>
+            </a:solidFill>
+          </a:ln>
+          <a:effectLst/>
+        </p:spPr>
+        <p:style>
+          <a:lnRef idx="1">
+            <a:schemeClr val="accent3"/>
+          </a:lnRef>
+          <a:fillRef idx="2">
+            <a:schemeClr val="accent3"/>
+          </a:fillRef>
+          <a:effectRef idx="1">
+            <a:schemeClr val="accent3"/>
+          </a:effectRef>
+          <a:fontRef idx="minor">
+            <a:schemeClr val="dk1"/>
+          </a:fontRef>
+        </p:style>
+        <p:txBody>
+          <a:bodyPr rtlCol="0" anchor="ctr"/>
+          <a:lstStyle/>
+          <a:p>
+            <a:pPr algn="ctr"/>
+            <a:endParaRPr lang="en-SG" sz="1400"/>
+          </a:p>
+        </p:txBody>
+      </p:sp>
+      <p:cxnSp>
+        <p:nvCxnSpPr>
+          <p:cNvPr id="36" name="Straight Arrow Connector 35">
+            <a:extLst/>
+          </p:cNvPr>
+          <p:cNvCxnSpPr/>
+          <p:nvPr/>
+        </p:nvCxnSpPr>
+        <p:spPr>
+          <a:xfrm>
+            <a:off x="3499382" y="4185073"/>
+            <a:ext cx="1667219" cy="0"/>
+          </a:xfrm>
+          <a:prstGeom prst="straightConnector1">
+            <a:avLst/>
+          </a:prstGeom>
+          <a:ln w="19050">
+            <a:solidFill>
+              <a:srgbClr val="0070C0"/>
+            </a:solidFill>
+            <a:prstDash val="sysDash"/>
+            <a:headEnd type="arrow" w="med" len="med"/>
+            <a:tailEnd type="none" w="med" len="med"/>
+          </a:ln>
+        </p:spPr>
+        <p:style>
+          <a:lnRef idx="1">
+            <a:schemeClr val="accent1"/>
+          </a:lnRef>
+          <a:fillRef idx="0">
+            <a:schemeClr val="accent1"/>
+          </a:fillRef>
+          <a:effectRef idx="0">
+            <a:schemeClr val="accent1"/>
+          </a:effectRef>
+          <a:fontRef idx="minor">
+            <a:schemeClr val="tx1"/>
+          </a:fontRef>
+        </p:style>
+      </p:cxnSp>
+      <p:cxnSp>
+        <p:nvCxnSpPr>
+          <p:cNvPr id="38" name="Straight Arrow Connector 37">
+            <a:extLst/>
+          </p:cNvPr>
+          <p:cNvCxnSpPr/>
+          <p:nvPr/>
+        </p:nvCxnSpPr>
+        <p:spPr>
+          <a:xfrm>
+            <a:off x="3412425" y="3173004"/>
+            <a:ext cx="819556" cy="1"/>
+          </a:xfrm>
+          <a:prstGeom prst="straightConnector1">
+            <a:avLst/>
+          </a:prstGeom>
+          <a:ln w="19050">
+            <a:solidFill>
+              <a:srgbClr val="0070C0"/>
+            </a:solidFill>
+            <a:tailEnd type="arrow"/>
+          </a:ln>
+        </p:spPr>
+        <p:style>
+          <a:lnRef idx="1">
+            <a:schemeClr val="accent1"/>
+          </a:lnRef>
+          <a:fillRef idx="0">
+            <a:schemeClr val="accent1"/>
+          </a:fillRef>
+          <a:effectRef idx="0">
+            <a:schemeClr val="accent1"/>
+          </a:effectRef>
+          <a:fontRef idx="minor">
+            <a:schemeClr val="tx1"/>
+          </a:fontRef>
+        </p:style>
+      </p:cxnSp>
+      <p:cxnSp>
+        <p:nvCxnSpPr>
+          <p:cNvPr id="39" name="Straight Arrow Connector 38">
+            <a:extLst/>
+          </p:cNvPr>
+          <p:cNvCxnSpPr/>
+          <p:nvPr/>
+        </p:nvCxnSpPr>
+        <p:spPr>
+          <a:xfrm>
+            <a:off x="3459519" y="3475965"/>
+            <a:ext cx="1600428" cy="0"/>
+          </a:xfrm>
+          <a:prstGeom prst="straightConnector1">
+            <a:avLst/>
+          </a:prstGeom>
+          <a:ln w="19050">
+            <a:solidFill>
+              <a:srgbClr val="0070C0"/>
+            </a:solidFill>
+            <a:prstDash val="sysDash"/>
+            <a:headEnd type="arrow" w="med" len="med"/>
+            <a:tailEnd type="none" w="med" len="med"/>
+          </a:ln>
+        </p:spPr>
+        <p:style>
+          <a:lnRef idx="1">
+            <a:schemeClr val="accent1"/>
+          </a:lnRef>
+          <a:fillRef idx="0">
+            <a:schemeClr val="accent1"/>
+          </a:fillRef>
+          <a:effectRef idx="0">
+            <a:schemeClr val="accent1"/>
+          </a:effectRef>
+          <a:fontRef idx="minor">
+            <a:schemeClr val="tx1"/>
+          </a:fontRef>
+        </p:style>
+      </p:cxnSp>
+      <p:sp>
+        <p:nvSpPr>
+          <p:cNvPr id="40" name="TextBox 39">
+            <a:extLst/>
+          </p:cNvPr>
+          <p:cNvSpPr txBox="1"/>
+          <p:nvPr/>
+        </p:nvSpPr>
+        <p:spPr>
+          <a:xfrm>
+            <a:off x="5033665" y="4199590"/>
+            <a:ext cx="258404" cy="261610"/>
+          </a:xfrm>
+          <a:prstGeom prst="rect">
+            <a:avLst/>
+          </a:prstGeom>
+          <a:noFill/>
+        </p:spPr>
+        <p:txBody>
+          <a:bodyPr wrap="none" rtlCol="0">
+            <a:spAutoFit/>
+          </a:bodyPr>
+          <a:lstStyle/>
+          <a:p>
+            <a:r>
+              <a:rPr lang="en-SG" sz="1100" dirty="0">
+                <a:solidFill>
+                  <a:srgbClr val="002060"/>
+                </a:solidFill>
+              </a:rPr>
+              <a:t>X</a:t>
+            </a:r>
+          </a:p>
+        </p:txBody>
+      </p:sp>
+      <p:sp>
+        <p:nvSpPr>
+          <p:cNvPr id="41" name="TextBox 40">
+            <a:extLst/>
+          </p:cNvPr>
+          <p:cNvSpPr txBox="1"/>
+          <p:nvPr/>
+        </p:nvSpPr>
+        <p:spPr>
+          <a:xfrm>
+            <a:off x="4240523" y="3483698"/>
+            <a:ext cx="2683263" cy="169277"/>
+          </a:xfrm>
+          <a:prstGeom prst="rect">
+            <a:avLst/>
+          </a:prstGeom>
+          <a:noFill/>
+        </p:spPr>
+        <p:txBody>
+          <a:bodyPr wrap="square" lIns="0" tIns="0" rIns="0" bIns="0" rtlCol="0">
+            <a:spAutoFit/>
+          </a:bodyPr>
+          <a:lstStyle>
+            <a:defPPr>
+              <a:defRPr lang="en-US"/>
+            </a:defPPr>
+            <a:lvl1pPr algn="r">
+              <a:defRPr sz="1400">
+                <a:solidFill>
+                  <a:srgbClr val="0070C0"/>
+                </a:solidFill>
+              </a:defRPr>
+            </a:lvl1pPr>
+          </a:lstStyle>
+          <a:p>
+            <a:r>
+              <a:rPr lang="en-US" sz="1100" dirty="0" err="1"/>
+              <a:t>ChangeThemeRequestEvent</a:t>
+            </a:r>
+            <a:r>
+              <a:rPr lang="en-US" sz="1100" dirty="0"/>
+              <a:t>()</a:t>
+            </a:r>
+          </a:p>
+        </p:txBody>
+      </p:sp>
+      <p:sp>
+        <p:nvSpPr>
+          <p:cNvPr id="69" name="Rectangle 62"/>
+          <p:cNvSpPr/>
+          <p:nvPr/>
+        </p:nvSpPr>
+        <p:spPr>
+          <a:xfrm>
+            <a:off x="6518917" y="2119004"/>
+            <a:ext cx="1030504" cy="346760"/>
+          </a:xfrm>
+          <a:prstGeom prst="rect">
+            <a:avLst/>
+          </a:prstGeom>
+          <a:solidFill>
+            <a:schemeClr val="accent2">
+              <a:lumMod val="60000"/>
+              <a:lumOff val="40000"/>
+            </a:schemeClr>
+          </a:solidFill>
+          <a:ln w="19050">
+            <a:solidFill>
+              <a:schemeClr val="accent2">
+                <a:lumMod val="60000"/>
+                <a:lumOff val="40000"/>
+              </a:schemeClr>
+            </a:solidFill>
+          </a:ln>
+          <a:effectLst/>
+        </p:spPr>
+        <p:style>
+          <a:lnRef idx="1">
+            <a:schemeClr val="accent2"/>
+          </a:lnRef>
+          <a:fillRef idx="2">
+            <a:schemeClr val="accent2"/>
+          </a:fillRef>
+          <a:effectRef idx="1">
+            <a:schemeClr val="accent2"/>
+          </a:effectRef>
+          <a:fontRef idx="minor">
+            <a:schemeClr val="dk1"/>
+          </a:fontRef>
+        </p:style>
+        <p:txBody>
+          <a:bodyPr rtlCol="0" anchor="ctr"/>
+          <a:lstStyle/>
+          <a:p>
+            <a:pPr algn="ctr"/>
+            <a:r>
+              <a:rPr lang="en-US" sz="1600" dirty="0">
+                <a:solidFill>
+                  <a:schemeClr val="bg1"/>
+                </a:solidFill>
+              </a:rPr>
+              <a:t>:</a:t>
+            </a:r>
+            <a:r>
+              <a:rPr lang="en-US" sz="1600" dirty="0" err="1">
+                <a:solidFill>
+                  <a:schemeClr val="bg1"/>
+                </a:solidFill>
+              </a:rPr>
+              <a:t>MainApp</a:t>
+            </a:r>
+            <a:endParaRPr lang="en-SG" sz="1600" dirty="0">
+              <a:solidFill>
+                <a:schemeClr val="bg1"/>
+              </a:solidFill>
+            </a:endParaRPr>
+          </a:p>
+        </p:txBody>
+      </p:sp>
+      <p:sp>
+        <p:nvSpPr>
+          <p:cNvPr id="71" name="Rectangle 70"/>
+          <p:cNvSpPr/>
+          <p:nvPr/>
+        </p:nvSpPr>
+        <p:spPr>
+          <a:xfrm>
+            <a:off x="6866215" y="3669852"/>
+            <a:ext cx="194844" cy="1664148"/>
+          </a:xfrm>
+          <a:prstGeom prst="rect">
+            <a:avLst/>
+          </a:prstGeom>
+          <a:solidFill>
+            <a:schemeClr val="accent4">
+              <a:lumMod val="60000"/>
+              <a:lumOff val="40000"/>
+            </a:schemeClr>
+          </a:solidFill>
+          <a:ln>
+            <a:solidFill>
+              <a:schemeClr val="accent4">
+                <a:lumMod val="60000"/>
+                <a:lumOff val="40000"/>
+              </a:schemeClr>
+            </a:solidFill>
+          </a:ln>
+          <a:effectLst/>
+        </p:spPr>
+        <p:style>
+          <a:lnRef idx="1">
+            <a:schemeClr val="accent3"/>
+          </a:lnRef>
+          <a:fillRef idx="2">
+            <a:schemeClr val="accent3"/>
+          </a:fillRef>
+          <a:effectRef idx="1">
+            <a:schemeClr val="accent3"/>
+          </a:effectRef>
+          <a:fontRef idx="minor">
+            <a:schemeClr val="dk1"/>
+          </a:fontRef>
+        </p:style>
+        <p:txBody>
+          <a:bodyPr rtlCol="0" anchor="ctr"/>
+          <a:lstStyle/>
+          <a:p>
+            <a:pPr algn="ctr"/>
+            <a:endParaRPr lang="en-SG" sz="1400">
+              <a:solidFill>
+                <a:schemeClr val="dk1"/>
+              </a:solidFill>
+            </a:endParaRPr>
+          </a:p>
+        </p:txBody>
+      </p:sp>
+      <p:cxnSp>
+        <p:nvCxnSpPr>
+          <p:cNvPr id="76" name="Straight Connector 75"/>
+          <p:cNvCxnSpPr>
+            <a:cxnSpLocks/>
+          </p:cNvCxnSpPr>
+          <p:nvPr/>
+        </p:nvCxnSpPr>
+        <p:spPr>
+          <a:xfrm>
+            <a:off x="6934200" y="2480263"/>
+            <a:ext cx="0" cy="3218892"/>
+          </a:xfrm>
+          <a:prstGeom prst="line">
+            <a:avLst/>
+          </a:prstGeom>
+          <a:ln w="19050">
+            <a:solidFill>
+              <a:schemeClr val="accent4">
+                <a:lumMod val="60000"/>
+                <a:lumOff val="40000"/>
+              </a:schemeClr>
+            </a:solidFill>
+            <a:prstDash val="sysDash"/>
+          </a:ln>
+          <a:effectLst/>
+        </p:spPr>
+        <p:style>
+          <a:lnRef idx="1">
+            <a:schemeClr val="accent1"/>
+          </a:lnRef>
+          <a:fillRef idx="2">
+            <a:schemeClr val="accent1"/>
+          </a:fillRef>
+          <a:effectRef idx="1">
+            <a:schemeClr val="accent1"/>
+          </a:effectRef>
+          <a:fontRef idx="minor">
+            <a:schemeClr val="dk1"/>
+          </a:fontRef>
+        </p:style>
+      </p:cxnSp>
+      <p:sp>
+        <p:nvSpPr>
+          <p:cNvPr id="78" name="Rectangle 62"/>
+          <p:cNvSpPr/>
+          <p:nvPr/>
+        </p:nvSpPr>
+        <p:spPr>
+          <a:xfrm>
+            <a:off x="7078382" y="2569820"/>
+            <a:ext cx="1193022" cy="346760"/>
+          </a:xfrm>
+          <a:prstGeom prst="rect">
+            <a:avLst/>
+          </a:prstGeom>
+          <a:solidFill>
+            <a:schemeClr val="accent3">
+              <a:lumMod val="60000"/>
+              <a:lumOff val="40000"/>
+            </a:schemeClr>
+          </a:solidFill>
+          <a:ln w="19050">
+            <a:solidFill>
+              <a:schemeClr val="accent3">
+                <a:lumMod val="60000"/>
+                <a:lumOff val="40000"/>
+              </a:schemeClr>
+            </a:solidFill>
+          </a:ln>
+          <a:effectLst/>
+        </p:spPr>
+        <p:style>
+          <a:lnRef idx="1">
+            <a:schemeClr val="accent2"/>
+          </a:lnRef>
+          <a:fillRef idx="2">
+            <a:schemeClr val="accent2"/>
+          </a:fillRef>
+          <a:effectRef idx="1">
+            <a:schemeClr val="accent2"/>
+          </a:effectRef>
+          <a:fontRef idx="minor">
+            <a:schemeClr val="dk1"/>
+          </a:fontRef>
+        </p:style>
+        <p:txBody>
+          <a:bodyPr rtlCol="0" anchor="ctr"/>
+          <a:lstStyle/>
+          <a:p>
+            <a:pPr algn="ctr"/>
+            <a:r>
+              <a:rPr lang="en-US" sz="1600" dirty="0">
+                <a:solidFill>
+                  <a:schemeClr val="bg1"/>
+                </a:solidFill>
+              </a:rPr>
+              <a:t>:</a:t>
+            </a:r>
+            <a:r>
+              <a:rPr lang="en-US" sz="1600" dirty="0" err="1">
+                <a:solidFill>
+                  <a:schemeClr val="bg1"/>
+                </a:solidFill>
+              </a:rPr>
+              <a:t>UiManager</a:t>
+            </a:r>
+            <a:endParaRPr lang="en-SG" sz="1600" dirty="0">
+              <a:solidFill>
+                <a:schemeClr val="bg1"/>
+              </a:solidFill>
+            </a:endParaRPr>
+          </a:p>
+        </p:txBody>
+      </p:sp>
+      <p:sp>
+        <p:nvSpPr>
+          <p:cNvPr id="79" name="Rectangle 78"/>
+          <p:cNvSpPr/>
+          <p:nvPr/>
+        </p:nvSpPr>
+        <p:spPr>
+          <a:xfrm>
+            <a:off x="7588198" y="3828745"/>
+            <a:ext cx="194844" cy="1429055"/>
+          </a:xfrm>
+          <a:prstGeom prst="rect">
+            <a:avLst/>
+          </a:prstGeom>
+          <a:solidFill>
+            <a:schemeClr val="accent3">
+              <a:lumMod val="60000"/>
+              <a:lumOff val="40000"/>
+            </a:schemeClr>
+          </a:solidFill>
+          <a:ln>
+            <a:solidFill>
+              <a:schemeClr val="accent3">
+                <a:lumMod val="60000"/>
+                <a:lumOff val="40000"/>
+              </a:schemeClr>
+            </a:solidFill>
+          </a:ln>
+          <a:effectLst/>
+        </p:spPr>
+        <p:style>
+          <a:lnRef idx="1">
+            <a:schemeClr val="accent3"/>
+          </a:lnRef>
+          <a:fillRef idx="2">
+            <a:schemeClr val="accent3"/>
+          </a:fillRef>
+          <a:effectRef idx="1">
+            <a:schemeClr val="accent3"/>
+          </a:effectRef>
+          <a:fontRef idx="minor">
+            <a:schemeClr val="dk1"/>
+          </a:fontRef>
+        </p:style>
+        <p:txBody>
+          <a:bodyPr rtlCol="0" anchor="ctr"/>
+          <a:lstStyle/>
+          <a:p>
+            <a:pPr algn="ctr"/>
+            <a:endParaRPr lang="en-SG" sz="1400">
+              <a:solidFill>
+                <a:schemeClr val="dk1"/>
+              </a:solidFill>
+            </a:endParaRPr>
+          </a:p>
+        </p:txBody>
+      </p:sp>
+      <p:cxnSp>
+        <p:nvCxnSpPr>
+          <p:cNvPr id="80" name="Straight Connector 79"/>
+          <p:cNvCxnSpPr>
+            <a:cxnSpLocks/>
+          </p:cNvCxnSpPr>
+          <p:nvPr/>
+        </p:nvCxnSpPr>
+        <p:spPr>
+          <a:xfrm>
+            <a:off x="7656184" y="2931079"/>
+            <a:ext cx="29436" cy="2768076"/>
+          </a:xfrm>
+          <a:prstGeom prst="line">
+            <a:avLst/>
+          </a:prstGeom>
+          <a:ln w="19050">
+            <a:solidFill>
+              <a:schemeClr val="accent3">
+                <a:lumMod val="60000"/>
+                <a:lumOff val="40000"/>
+              </a:schemeClr>
+            </a:solidFill>
+            <a:prstDash val="sysDash"/>
+          </a:ln>
+          <a:effectLst/>
+        </p:spPr>
+        <p:style>
+          <a:lnRef idx="1">
+            <a:schemeClr val="accent1"/>
+          </a:lnRef>
+          <a:fillRef idx="2">
+            <a:schemeClr val="accent1"/>
+          </a:fillRef>
+          <a:effectRef idx="1">
+            <a:schemeClr val="accent1"/>
+          </a:effectRef>
+          <a:fontRef idx="minor">
+            <a:schemeClr val="dk1"/>
+          </a:fontRef>
+        </p:style>
+      </p:cxnSp>
+      <p:cxnSp>
+        <p:nvCxnSpPr>
+          <p:cNvPr id="81" name="Straight Arrow Connector 80">
+            <a:extLst/>
+          </p:cNvPr>
+          <p:cNvCxnSpPr>
+            <a:cxnSpLocks/>
+          </p:cNvCxnSpPr>
+          <p:nvPr/>
+        </p:nvCxnSpPr>
+        <p:spPr>
+          <a:xfrm>
+            <a:off x="7034169" y="3924300"/>
+            <a:ext cx="554029" cy="0"/>
+          </a:xfrm>
+          <a:prstGeom prst="straightConnector1">
+            <a:avLst/>
+          </a:prstGeom>
+          <a:ln w="19050">
+            <a:solidFill>
+              <a:schemeClr val="accent2">
+                <a:lumMod val="60000"/>
+                <a:lumOff val="40000"/>
+              </a:schemeClr>
+            </a:solidFill>
+            <a:tailEnd type="arrow"/>
+          </a:ln>
+        </p:spPr>
+        <p:style>
+          <a:lnRef idx="1">
+            <a:schemeClr val="accent1"/>
+          </a:lnRef>
+          <a:fillRef idx="0">
+            <a:schemeClr val="accent1"/>
+          </a:fillRef>
+          <a:effectRef idx="0">
+            <a:schemeClr val="accent1"/>
+          </a:effectRef>
+          <a:fontRef idx="minor">
+            <a:schemeClr val="tx1"/>
+          </a:fontRef>
+        </p:style>
+      </p:cxnSp>
+      <p:sp>
+        <p:nvSpPr>
+          <p:cNvPr id="88" name="Rectangle 62"/>
+          <p:cNvSpPr/>
+          <p:nvPr/>
+        </p:nvSpPr>
+        <p:spPr>
+          <a:xfrm>
+            <a:off x="7943370" y="3070337"/>
+            <a:ext cx="1397199" cy="346760"/>
+          </a:xfrm>
+          <a:prstGeom prst="rect">
+            <a:avLst/>
+          </a:prstGeom>
+          <a:solidFill>
+            <a:schemeClr val="accent3">
+              <a:lumMod val="60000"/>
+              <a:lumOff val="40000"/>
+            </a:schemeClr>
+          </a:solidFill>
+          <a:ln w="19050">
+            <a:solidFill>
+              <a:schemeClr val="accent3">
+                <a:lumMod val="60000"/>
+                <a:lumOff val="40000"/>
+              </a:schemeClr>
+            </a:solidFill>
+          </a:ln>
+          <a:effectLst/>
+        </p:spPr>
+        <p:style>
+          <a:lnRef idx="1">
+            <a:schemeClr val="accent2"/>
+          </a:lnRef>
+          <a:fillRef idx="2">
+            <a:schemeClr val="accent2"/>
+          </a:fillRef>
+          <a:effectRef idx="1">
+            <a:schemeClr val="accent2"/>
+          </a:effectRef>
+          <a:fontRef idx="minor">
+            <a:schemeClr val="dk1"/>
+          </a:fontRef>
+        </p:style>
+        <p:txBody>
+          <a:bodyPr rtlCol="0" anchor="ctr"/>
+          <a:lstStyle/>
+          <a:p>
+            <a:pPr algn="ctr"/>
+            <a:r>
+              <a:rPr lang="en-US" sz="1600" dirty="0">
+                <a:solidFill>
+                  <a:schemeClr val="bg1"/>
+                </a:solidFill>
+              </a:rPr>
+              <a:t>:</a:t>
+            </a:r>
+            <a:r>
+              <a:rPr lang="en-US" sz="1600" dirty="0" err="1">
+                <a:solidFill>
+                  <a:schemeClr val="bg1"/>
+                </a:solidFill>
+              </a:rPr>
+              <a:t>MainWindow</a:t>
+            </a:r>
+            <a:endParaRPr lang="en-SG" sz="1600" dirty="0">
+              <a:solidFill>
+                <a:schemeClr val="bg1"/>
+              </a:solidFill>
+            </a:endParaRPr>
+          </a:p>
+        </p:txBody>
+      </p:sp>
+      <p:sp>
+        <p:nvSpPr>
+          <p:cNvPr id="89" name="Rectangle 88"/>
+          <p:cNvSpPr/>
+          <p:nvPr/>
+        </p:nvSpPr>
+        <p:spPr>
+          <a:xfrm>
+            <a:off x="8432731" y="3959008"/>
+            <a:ext cx="194844" cy="819455"/>
+          </a:xfrm>
+          <a:prstGeom prst="rect">
+            <a:avLst/>
+          </a:prstGeom>
+          <a:solidFill>
+            <a:schemeClr val="accent3">
+              <a:lumMod val="60000"/>
+              <a:lumOff val="40000"/>
+            </a:schemeClr>
+          </a:solidFill>
+          <a:ln>
+            <a:solidFill>
+              <a:schemeClr val="accent3">
+                <a:lumMod val="60000"/>
+                <a:lumOff val="40000"/>
+              </a:schemeClr>
+            </a:solidFill>
+          </a:ln>
+          <a:effectLst/>
+        </p:spPr>
+        <p:style>
+          <a:lnRef idx="1">
+            <a:schemeClr val="accent3"/>
+          </a:lnRef>
+          <a:fillRef idx="2">
+            <a:schemeClr val="accent3"/>
+          </a:fillRef>
+          <a:effectRef idx="1">
+            <a:schemeClr val="accent3"/>
+          </a:effectRef>
+          <a:fontRef idx="minor">
+            <a:schemeClr val="dk1"/>
+          </a:fontRef>
+        </p:style>
+        <p:txBody>
+          <a:bodyPr rtlCol="0" anchor="ctr"/>
+          <a:lstStyle/>
+          <a:p>
+            <a:pPr algn="ctr"/>
+            <a:endParaRPr lang="en-SG" sz="1400">
+              <a:solidFill>
+                <a:schemeClr val="dk1"/>
+              </a:solidFill>
+            </a:endParaRPr>
+          </a:p>
+        </p:txBody>
+      </p:sp>
+      <p:cxnSp>
+        <p:nvCxnSpPr>
+          <p:cNvPr id="90" name="Straight Connector 89"/>
+          <p:cNvCxnSpPr>
+            <a:cxnSpLocks/>
+          </p:cNvCxnSpPr>
+          <p:nvPr/>
+        </p:nvCxnSpPr>
+        <p:spPr>
+          <a:xfrm flipH="1">
+            <a:off x="8534400" y="3387833"/>
+            <a:ext cx="5482" cy="2311322"/>
+          </a:xfrm>
+          <a:prstGeom prst="line">
+            <a:avLst/>
+          </a:prstGeom>
+          <a:ln w="19050">
+            <a:solidFill>
+              <a:schemeClr val="accent3">
+                <a:lumMod val="60000"/>
+                <a:lumOff val="40000"/>
+              </a:schemeClr>
+            </a:solidFill>
+            <a:prstDash val="sysDash"/>
+          </a:ln>
+          <a:effectLst/>
+        </p:spPr>
+        <p:style>
+          <a:lnRef idx="1">
+            <a:schemeClr val="accent1"/>
+          </a:lnRef>
+          <a:fillRef idx="2">
+            <a:schemeClr val="accent1"/>
+          </a:fillRef>
+          <a:effectRef idx="1">
+            <a:schemeClr val="accent1"/>
+          </a:effectRef>
+          <a:fontRef idx="minor">
+            <a:schemeClr val="dk1"/>
+          </a:fontRef>
+        </p:style>
+      </p:cxnSp>
+      <p:cxnSp>
+        <p:nvCxnSpPr>
+          <p:cNvPr id="97" name="Straight Arrow Connector 96">
+            <a:extLst/>
+          </p:cNvPr>
+          <p:cNvCxnSpPr>
+            <a:cxnSpLocks/>
+          </p:cNvCxnSpPr>
+          <p:nvPr/>
+        </p:nvCxnSpPr>
+        <p:spPr>
+          <a:xfrm>
+            <a:off x="7696200" y="4079579"/>
+            <a:ext cx="736531" cy="0"/>
+          </a:xfrm>
+          <a:prstGeom prst="straightConnector1">
+            <a:avLst/>
+          </a:prstGeom>
+          <a:ln w="19050">
+            <a:solidFill>
+              <a:schemeClr val="accent3">
+                <a:lumMod val="60000"/>
+                <a:lumOff val="40000"/>
+              </a:schemeClr>
+            </a:solidFill>
+            <a:tailEnd type="arrow"/>
+          </a:ln>
+        </p:spPr>
+        <p:style>
+          <a:lnRef idx="1">
+            <a:schemeClr val="accent1"/>
+          </a:lnRef>
+          <a:fillRef idx="0">
+            <a:schemeClr val="accent1"/>
+          </a:fillRef>
+          <a:effectRef idx="0">
+            <a:schemeClr val="accent1"/>
+          </a:effectRef>
+          <a:fontRef idx="minor">
+            <a:schemeClr val="tx1"/>
+          </a:fontRef>
+        </p:style>
+      </p:cxnSp>
+      <p:sp>
+        <p:nvSpPr>
+          <p:cNvPr id="106" name="Rectangle 62"/>
+          <p:cNvSpPr/>
+          <p:nvPr/>
+        </p:nvSpPr>
+        <p:spPr>
+          <a:xfrm>
+            <a:off x="8689010" y="3500638"/>
+            <a:ext cx="1397199" cy="346760"/>
+          </a:xfrm>
+          <a:prstGeom prst="rect">
+            <a:avLst/>
+          </a:prstGeom>
+          <a:solidFill>
+            <a:schemeClr val="accent3">
+              <a:lumMod val="60000"/>
+              <a:lumOff val="40000"/>
+            </a:schemeClr>
+          </a:solidFill>
+          <a:ln w="19050">
+            <a:solidFill>
+              <a:schemeClr val="accent3">
+                <a:lumMod val="60000"/>
+                <a:lumOff val="40000"/>
+              </a:schemeClr>
+            </a:solidFill>
+          </a:ln>
+          <a:effectLst/>
+        </p:spPr>
+        <p:style>
+          <a:lnRef idx="1">
+            <a:schemeClr val="accent2"/>
+          </a:lnRef>
+          <a:fillRef idx="2">
+            <a:schemeClr val="accent2"/>
+          </a:fillRef>
+          <a:effectRef idx="1">
+            <a:schemeClr val="accent2"/>
+          </a:effectRef>
+          <a:fontRef idx="minor">
+            <a:schemeClr val="dk1"/>
+          </a:fontRef>
+        </p:style>
+        <p:txBody>
+          <a:bodyPr rtlCol="0" anchor="ctr"/>
+          <a:lstStyle/>
+          <a:p>
+            <a:pPr algn="ctr"/>
+            <a:r>
+              <a:rPr lang="en-US" sz="1600" dirty="0">
+                <a:solidFill>
+                  <a:schemeClr val="bg1"/>
+                </a:solidFill>
+              </a:rPr>
+              <a:t>:</a:t>
+            </a:r>
+            <a:r>
+              <a:rPr lang="en-US" sz="1600" dirty="0" err="1">
+                <a:solidFill>
+                  <a:schemeClr val="bg1"/>
+                </a:solidFill>
+              </a:rPr>
+              <a:t>UserPref</a:t>
+            </a:r>
+            <a:endParaRPr lang="en-SG" sz="1600" dirty="0">
+              <a:solidFill>
+                <a:schemeClr val="bg1"/>
+              </a:solidFill>
+            </a:endParaRPr>
+          </a:p>
+        </p:txBody>
+      </p:sp>
+      <p:sp>
+        <p:nvSpPr>
+          <p:cNvPr id="107" name="Rectangle 106"/>
+          <p:cNvSpPr/>
+          <p:nvPr/>
+        </p:nvSpPr>
+        <p:spPr>
+          <a:xfrm>
+            <a:off x="9178371" y="4800600"/>
+            <a:ext cx="194844" cy="408164"/>
+          </a:xfrm>
+          <a:prstGeom prst="rect">
+            <a:avLst/>
+          </a:prstGeom>
+          <a:solidFill>
+            <a:schemeClr val="accent3">
+              <a:lumMod val="60000"/>
+              <a:lumOff val="40000"/>
+            </a:schemeClr>
+          </a:solidFill>
+          <a:ln>
+            <a:solidFill>
+              <a:schemeClr val="accent3">
+                <a:lumMod val="60000"/>
+                <a:lumOff val="40000"/>
+              </a:schemeClr>
+            </a:solidFill>
+          </a:ln>
+          <a:effectLst/>
+        </p:spPr>
+        <p:style>
+          <a:lnRef idx="1">
+            <a:schemeClr val="accent3"/>
+          </a:lnRef>
+          <a:fillRef idx="2">
+            <a:schemeClr val="accent3"/>
+          </a:fillRef>
+          <a:effectRef idx="1">
+            <a:schemeClr val="accent3"/>
+          </a:effectRef>
+          <a:fontRef idx="minor">
+            <a:schemeClr val="dk1"/>
+          </a:fontRef>
+        </p:style>
+        <p:txBody>
+          <a:bodyPr rtlCol="0" anchor="ctr"/>
+          <a:lstStyle/>
+          <a:p>
+            <a:pPr algn="ctr"/>
+            <a:endParaRPr lang="en-SG" sz="1400">
+              <a:solidFill>
+                <a:schemeClr val="dk1"/>
+              </a:solidFill>
+            </a:endParaRPr>
+          </a:p>
+        </p:txBody>
+      </p:sp>
+      <p:cxnSp>
+        <p:nvCxnSpPr>
+          <p:cNvPr id="108" name="Straight Connector 107"/>
+          <p:cNvCxnSpPr>
+            <a:cxnSpLocks/>
+          </p:cNvCxnSpPr>
+          <p:nvPr/>
+        </p:nvCxnSpPr>
+        <p:spPr>
+          <a:xfrm>
+            <a:off x="9285522" y="3818134"/>
+            <a:ext cx="10878" cy="1820666"/>
+          </a:xfrm>
+          <a:prstGeom prst="line">
+            <a:avLst/>
+          </a:prstGeom>
+          <a:ln w="19050">
+            <a:solidFill>
+              <a:schemeClr val="accent3">
+                <a:lumMod val="60000"/>
+                <a:lumOff val="40000"/>
+              </a:schemeClr>
+            </a:solidFill>
+            <a:prstDash val="sysDash"/>
+          </a:ln>
+          <a:effectLst/>
+        </p:spPr>
+        <p:style>
+          <a:lnRef idx="1">
+            <a:schemeClr val="accent1"/>
+          </a:lnRef>
+          <a:fillRef idx="2">
+            <a:schemeClr val="accent1"/>
+          </a:fillRef>
+          <a:effectRef idx="1">
+            <a:schemeClr val="accent1"/>
+          </a:effectRef>
+          <a:fontRef idx="minor">
+            <a:schemeClr val="dk1"/>
+          </a:fontRef>
+        </p:style>
+      </p:cxnSp>
+      <p:cxnSp>
+        <p:nvCxnSpPr>
+          <p:cNvPr id="109" name="Straight Arrow Connector 108">
+            <a:extLst/>
+          </p:cNvPr>
+          <p:cNvCxnSpPr>
+            <a:cxnSpLocks/>
+          </p:cNvCxnSpPr>
+          <p:nvPr/>
+        </p:nvCxnSpPr>
+        <p:spPr>
+          <a:xfrm>
+            <a:off x="7783042" y="4876800"/>
+            <a:ext cx="1395329" cy="0"/>
+          </a:xfrm>
+          <a:prstGeom prst="straightConnector1">
+            <a:avLst/>
+          </a:prstGeom>
+          <a:ln w="19050">
+            <a:solidFill>
+              <a:schemeClr val="accent3">
+                <a:lumMod val="60000"/>
+                <a:lumOff val="40000"/>
+              </a:schemeClr>
+            </a:solidFill>
+            <a:tailEnd type="arrow"/>
+          </a:ln>
+        </p:spPr>
+        <p:style>
+          <a:lnRef idx="1">
+            <a:schemeClr val="accent1"/>
+          </a:lnRef>
+          <a:fillRef idx="0">
+            <a:schemeClr val="accent1"/>
+          </a:fillRef>
+          <a:effectRef idx="0">
+            <a:schemeClr val="accent1"/>
+          </a:effectRef>
+          <a:fontRef idx="minor">
+            <a:schemeClr val="tx1"/>
+          </a:fontRef>
+        </p:style>
+      </p:cxnSp>
+      <p:cxnSp>
+        <p:nvCxnSpPr>
+          <p:cNvPr id="112" name="Straight Arrow Connector 111">
+            <a:extLst/>
+          </p:cNvPr>
+          <p:cNvCxnSpPr>
+            <a:cxnSpLocks/>
+          </p:cNvCxnSpPr>
+          <p:nvPr/>
+        </p:nvCxnSpPr>
+        <p:spPr>
+          <a:xfrm>
+            <a:off x="7783042" y="5208764"/>
+            <a:ext cx="1395329" cy="0"/>
+          </a:xfrm>
+          <a:prstGeom prst="straightConnector1">
+            <a:avLst/>
+          </a:prstGeom>
+          <a:ln w="19050">
+            <a:solidFill>
+              <a:schemeClr val="accent3">
+                <a:lumMod val="60000"/>
+                <a:lumOff val="40000"/>
+              </a:schemeClr>
+            </a:solidFill>
+            <a:prstDash val="sysDash"/>
+            <a:headEnd type="arrow" w="med" len="med"/>
+            <a:tailEnd type="none" w="med" len="med"/>
+          </a:ln>
+        </p:spPr>
+        <p:style>
+          <a:lnRef idx="1">
+            <a:schemeClr val="accent1"/>
+          </a:lnRef>
+          <a:fillRef idx="0">
+            <a:schemeClr val="accent1"/>
+          </a:fillRef>
+          <a:effectRef idx="0">
+            <a:schemeClr val="accent1"/>
+          </a:effectRef>
+          <a:fontRef idx="minor">
+            <a:schemeClr val="tx1"/>
+          </a:fontRef>
+        </p:style>
+      </p:cxnSp>
+      <p:sp>
+        <p:nvSpPr>
+          <p:cNvPr id="113" name="TextBox 112">
+            <a:extLst/>
+          </p:cNvPr>
+          <p:cNvSpPr txBox="1"/>
+          <p:nvPr/>
+        </p:nvSpPr>
+        <p:spPr>
+          <a:xfrm>
+            <a:off x="7535021" y="4901313"/>
+            <a:ext cx="1677128" cy="169277"/>
+          </a:xfrm>
+          <a:prstGeom prst="rect">
+            <a:avLst/>
+          </a:prstGeom>
+          <a:noFill/>
+          <a:ln>
+            <a:noFill/>
+          </a:ln>
+        </p:spPr>
+        <p:txBody>
+          <a:bodyPr wrap="square" lIns="0" tIns="0" rIns="0" bIns="0" rtlCol="0">
+            <a:spAutoFit/>
+          </a:bodyPr>
+          <a:lstStyle>
+            <a:defPPr>
+              <a:defRPr lang="en-US"/>
+            </a:defPPr>
+            <a:lvl1pPr algn="r">
+              <a:defRPr sz="1400">
+                <a:solidFill>
+                  <a:srgbClr val="0070C0"/>
+                </a:solidFill>
+              </a:defRPr>
+            </a:lvl1pPr>
+          </a:lstStyle>
+          <a:p>
+            <a:r>
+              <a:rPr lang="en-US" sz="1100" dirty="0" err="1">
+                <a:solidFill>
+                  <a:schemeClr val="accent3">
+                    <a:lumMod val="60000"/>
+                    <a:lumOff val="40000"/>
+                  </a:schemeClr>
+                </a:solidFill>
+              </a:rPr>
+              <a:t>setAddressBookTheme</a:t>
+            </a:r>
+            <a:r>
+              <a:rPr lang="en-US" sz="1100" dirty="0">
+                <a:solidFill>
+                  <a:schemeClr val="accent3">
+                    <a:lumMod val="60000"/>
+                    <a:lumOff val="40000"/>
+                  </a:schemeClr>
+                </a:solidFill>
+              </a:rPr>
+              <a:t>()</a:t>
+            </a:r>
+          </a:p>
+        </p:txBody>
+      </p:sp>
+      <p:cxnSp>
+        <p:nvCxnSpPr>
+          <p:cNvPr id="115" name="Straight Arrow Connector 114">
+            <a:extLst/>
+          </p:cNvPr>
+          <p:cNvCxnSpPr>
+            <a:cxnSpLocks/>
+          </p:cNvCxnSpPr>
+          <p:nvPr/>
+        </p:nvCxnSpPr>
+        <p:spPr>
+          <a:xfrm>
+            <a:off x="7783042" y="4648200"/>
+            <a:ext cx="621459" cy="0"/>
+          </a:xfrm>
+          <a:prstGeom prst="straightConnector1">
+            <a:avLst/>
+          </a:prstGeom>
+          <a:ln w="19050">
+            <a:solidFill>
+              <a:schemeClr val="accent3">
+                <a:lumMod val="60000"/>
+                <a:lumOff val="40000"/>
+              </a:schemeClr>
+            </a:solidFill>
+            <a:prstDash val="sysDash"/>
+            <a:headEnd type="arrow" w="med" len="med"/>
+            <a:tailEnd type="none" w="med" len="med"/>
+          </a:ln>
+        </p:spPr>
+        <p:style>
+          <a:lnRef idx="1">
+            <a:schemeClr val="accent1"/>
+          </a:lnRef>
+          <a:fillRef idx="0">
+            <a:schemeClr val="accent1"/>
+          </a:fillRef>
+          <a:effectRef idx="0">
+            <a:schemeClr val="accent1"/>
+          </a:effectRef>
+          <a:fontRef idx="minor">
+            <a:schemeClr val="tx1"/>
+          </a:fontRef>
+        </p:style>
+      </p:cxnSp>
+      <p:cxnSp>
+        <p:nvCxnSpPr>
+          <p:cNvPr id="117" name="Straight Arrow Connector 116">
+            <a:extLst/>
+          </p:cNvPr>
+          <p:cNvCxnSpPr>
+            <a:cxnSpLocks/>
+          </p:cNvCxnSpPr>
+          <p:nvPr/>
+        </p:nvCxnSpPr>
+        <p:spPr>
+          <a:xfrm>
+            <a:off x="7064161" y="5248656"/>
+            <a:ext cx="621459" cy="0"/>
+          </a:xfrm>
+          <a:prstGeom prst="straightConnector1">
+            <a:avLst/>
+          </a:prstGeom>
+          <a:ln w="19050">
+            <a:solidFill>
+              <a:schemeClr val="accent3">
+                <a:lumMod val="60000"/>
+                <a:lumOff val="40000"/>
+              </a:schemeClr>
+            </a:solidFill>
+            <a:prstDash val="sysDash"/>
+            <a:headEnd type="arrow" w="med" len="med"/>
+            <a:tailEnd type="none" w="med" len="med"/>
+          </a:ln>
+        </p:spPr>
+        <p:style>
+          <a:lnRef idx="1">
+            <a:schemeClr val="accent1"/>
+          </a:lnRef>
+          <a:fillRef idx="0">
+            <a:schemeClr val="accent1"/>
+          </a:fillRef>
+          <a:effectRef idx="0">
+            <a:schemeClr val="accent1"/>
+          </a:effectRef>
+          <a:fontRef idx="minor">
+            <a:schemeClr val="tx1"/>
+          </a:fontRef>
+        </p:style>
+      </p:cxnSp>
+      <p:sp>
+        <p:nvSpPr>
+          <p:cNvPr id="126" name="Rectangle 125"/>
+          <p:cNvSpPr/>
+          <p:nvPr/>
+        </p:nvSpPr>
+        <p:spPr>
+          <a:xfrm>
+            <a:off x="6866215" y="3665822"/>
+            <a:ext cx="194844" cy="1664148"/>
+          </a:xfrm>
+          <a:prstGeom prst="rect">
+            <a:avLst/>
+          </a:prstGeom>
+          <a:solidFill>
+            <a:schemeClr val="accent2">
+              <a:lumMod val="60000"/>
+              <a:lumOff val="40000"/>
+            </a:schemeClr>
+          </a:solidFill>
+          <a:ln>
+            <a:solidFill>
+              <a:schemeClr val="accent2">
+                <a:lumMod val="60000"/>
+                <a:lumOff val="40000"/>
+              </a:schemeClr>
+            </a:solidFill>
+          </a:ln>
+          <a:effectLst/>
+        </p:spPr>
+        <p:style>
+          <a:lnRef idx="1">
+            <a:schemeClr val="accent3"/>
+          </a:lnRef>
+          <a:fillRef idx="2">
+            <a:schemeClr val="accent3"/>
+          </a:fillRef>
+          <a:effectRef idx="1">
+            <a:schemeClr val="accent3"/>
+          </a:effectRef>
+          <a:fontRef idx="minor">
+            <a:schemeClr val="dk1"/>
+          </a:fontRef>
+        </p:style>
+        <p:txBody>
+          <a:bodyPr rtlCol="0" anchor="ctr"/>
+          <a:lstStyle/>
+          <a:p>
+            <a:pPr algn="ctr"/>
+            <a:endParaRPr lang="en-SG" sz="1400">
+              <a:solidFill>
+                <a:schemeClr val="dk1"/>
+              </a:solidFill>
+            </a:endParaRPr>
+          </a:p>
+        </p:txBody>
+      </p:sp>
+      <p:cxnSp>
+        <p:nvCxnSpPr>
+          <p:cNvPr id="127" name="Straight Connector 126"/>
+          <p:cNvCxnSpPr>
+            <a:cxnSpLocks/>
+          </p:cNvCxnSpPr>
+          <p:nvPr/>
+        </p:nvCxnSpPr>
+        <p:spPr>
+          <a:xfrm>
+            <a:off x="6934200" y="2476233"/>
+            <a:ext cx="0" cy="3218892"/>
+          </a:xfrm>
+          <a:prstGeom prst="line">
+            <a:avLst/>
+          </a:prstGeom>
+          <a:ln w="19050">
+            <a:solidFill>
+              <a:schemeClr val="accent2">
+                <a:lumMod val="60000"/>
+                <a:lumOff val="40000"/>
+              </a:schemeClr>
+            </a:solidFill>
+            <a:prstDash val="sysDash"/>
+          </a:ln>
+          <a:effectLst/>
+        </p:spPr>
+        <p:style>
+          <a:lnRef idx="1">
+            <a:schemeClr val="accent1"/>
+          </a:lnRef>
+          <a:fillRef idx="2">
+            <a:schemeClr val="accent1"/>
+          </a:fillRef>
+          <a:effectRef idx="1">
+            <a:schemeClr val="accent1"/>
+          </a:effectRef>
+          <a:fontRef idx="minor">
+            <a:schemeClr val="dk1"/>
+          </a:fontRef>
+        </p:style>
+      </p:cxnSp>
+      <p:sp>
+        <p:nvSpPr>
+          <p:cNvPr id="128" name="TextBox 127">
+            <a:extLst/>
+          </p:cNvPr>
+          <p:cNvSpPr txBox="1"/>
+          <p:nvPr/>
+        </p:nvSpPr>
+        <p:spPr>
+          <a:xfrm>
+            <a:off x="6605766" y="3550297"/>
+            <a:ext cx="952996" cy="338554"/>
+          </a:xfrm>
+          <a:prstGeom prst="rect">
+            <a:avLst/>
+          </a:prstGeom>
+          <a:noFill/>
+        </p:spPr>
+        <p:txBody>
+          <a:bodyPr wrap="square" lIns="0" tIns="0" rIns="0" bIns="0" rtlCol="0">
+            <a:spAutoFit/>
+          </a:bodyPr>
+          <a:lstStyle>
+            <a:defPPr>
+              <a:defRPr lang="en-US"/>
+            </a:defPPr>
+            <a:lvl1pPr algn="r">
+              <a:defRPr sz="1400">
+                <a:solidFill>
+                  <a:srgbClr val="0070C0"/>
+                </a:solidFill>
+              </a:defRPr>
+            </a:lvl1pPr>
+          </a:lstStyle>
+          <a:p>
+            <a:r>
+              <a:rPr lang="en-US" sz="1100" dirty="0">
+                <a:solidFill>
+                  <a:schemeClr val="accent2">
+                    <a:lumMod val="60000"/>
+                    <a:lumOff val="40000"/>
+                  </a:schemeClr>
+                </a:solidFill>
+              </a:rPr>
+              <a:t>change</a:t>
+            </a:r>
+            <a:br>
+              <a:rPr lang="en-US" sz="1100" dirty="0">
+                <a:solidFill>
+                  <a:schemeClr val="accent2">
+                    <a:lumMod val="60000"/>
+                    <a:lumOff val="40000"/>
+                  </a:schemeClr>
+                </a:solidFill>
+              </a:rPr>
+            </a:br>
+            <a:r>
+              <a:rPr lang="en-US" sz="1100" dirty="0">
+                <a:solidFill>
+                  <a:schemeClr val="accent2">
+                    <a:lumMod val="60000"/>
+                    <a:lumOff val="40000"/>
+                  </a:schemeClr>
+                </a:solidFill>
+              </a:rPr>
+              <a:t>Theme()</a:t>
+            </a:r>
+          </a:p>
+        </p:txBody>
+      </p:sp>
+    </p:spTree>
+    <p:extLst>
+      <p:ext uri="{BB962C8B-B14F-4D97-AF65-F5344CB8AC3E}">
+        <p14:creationId xmlns:p14="http://schemas.microsoft.com/office/powerpoint/2010/main" val="2761728219"/>
+      </p:ext>
+    </p:extLst>
+  </p:cSld>
+  <p:clrMapOvr>
+    <a:masterClrMapping/>
+  </p:clrMapOvr>
+</p:sld>
+</file>
+
 <file path=ppt/theme/theme1.xml><?xml version="1.0" encoding="utf-8"?>
 <a:theme xmlns:a="http://schemas.openxmlformats.org/drawingml/2006/main" name="Office Theme">
   <a:themeElements>

</xml_diff>

<commit_message>
make changes to chart design, update UG and DG
</commit_message>
<xml_diff>
--- a/docs/diagrams/LogicComponentSequenceDiagram.pptx
+++ b/docs/diagrams/LogicComponentSequenceDiagram.pptx
@@ -5,7 +5,7 @@
     <p:sldMasterId id="2147483648" r:id="rId1"/>
   </p:sldMasterIdLst>
   <p:notesMasterIdLst>
-    <p:notesMasterId r:id="rId8"/>
+    <p:notesMasterId r:id="rId10"/>
   </p:notesMasterIdLst>
   <p:sldIdLst>
     <p:sldId id="267" r:id="rId2"/>
@@ -14,6 +14,8 @@
     <p:sldId id="269" r:id="rId5"/>
     <p:sldId id="271" r:id="rId6"/>
     <p:sldId id="272" r:id="rId7"/>
+    <p:sldId id="273" r:id="rId8"/>
+    <p:sldId id="274" r:id="rId9"/>
   </p:sldIdLst>
   <p:sldSz cx="9144000" cy="6858000" type="screen4x3"/>
   <p:notesSz cx="6858000" cy="9144000"/>
@@ -217,7 +219,7 @@
           <a:p>
             <a:fld id="{F5CC4B3F-88C1-4FFA-B1B6-F41C21DC6924}" type="datetimeFigureOut">
               <a:rPr lang="en-US" smtClean="0"/>
-              <a:t>11/2/2017</a:t>
+              <a:t>11/12/2017</a:t>
             </a:fld>
             <a:endParaRPr lang="en-US"/>
           </a:p>
@@ -663,7 +665,7 @@
           <a:p>
             <a:fld id="{78C97017-6FC3-485B-9764-EAC9E56C1D49}" type="datetimeFigureOut">
               <a:rPr lang="en-US" smtClean="0"/>
-              <a:t>11/2/2017</a:t>
+              <a:t>11/12/2017</a:t>
             </a:fld>
             <a:endParaRPr lang="en-US"/>
           </a:p>
@@ -831,7 +833,7 @@
           <a:p>
             <a:fld id="{78C97017-6FC3-485B-9764-EAC9E56C1D49}" type="datetimeFigureOut">
               <a:rPr lang="en-US" smtClean="0"/>
-              <a:t>11/2/2017</a:t>
+              <a:t>11/12/2017</a:t>
             </a:fld>
             <a:endParaRPr lang="en-US"/>
           </a:p>
@@ -1009,7 +1011,7 @@
           <a:p>
             <a:fld id="{78C97017-6FC3-485B-9764-EAC9E56C1D49}" type="datetimeFigureOut">
               <a:rPr lang="en-US" smtClean="0"/>
-              <a:t>11/2/2017</a:t>
+              <a:t>11/12/2017</a:t>
             </a:fld>
             <a:endParaRPr lang="en-US"/>
           </a:p>
@@ -1177,7 +1179,7 @@
           <a:p>
             <a:fld id="{78C97017-6FC3-485B-9764-EAC9E56C1D49}" type="datetimeFigureOut">
               <a:rPr lang="en-US" smtClean="0"/>
-              <a:t>11/2/2017</a:t>
+              <a:t>11/12/2017</a:t>
             </a:fld>
             <a:endParaRPr lang="en-US"/>
           </a:p>
@@ -1422,7 +1424,7 @@
           <a:p>
             <a:fld id="{78C97017-6FC3-485B-9764-EAC9E56C1D49}" type="datetimeFigureOut">
               <a:rPr lang="en-US" smtClean="0"/>
-              <a:t>11/2/2017</a:t>
+              <a:t>11/12/2017</a:t>
             </a:fld>
             <a:endParaRPr lang="en-US"/>
           </a:p>
@@ -1707,7 +1709,7 @@
           <a:p>
             <a:fld id="{78C97017-6FC3-485B-9764-EAC9E56C1D49}" type="datetimeFigureOut">
               <a:rPr lang="en-US" smtClean="0"/>
-              <a:t>11/2/2017</a:t>
+              <a:t>11/12/2017</a:t>
             </a:fld>
             <a:endParaRPr lang="en-US"/>
           </a:p>
@@ -2126,7 +2128,7 @@
           <a:p>
             <a:fld id="{78C97017-6FC3-485B-9764-EAC9E56C1D49}" type="datetimeFigureOut">
               <a:rPr lang="en-US" smtClean="0"/>
-              <a:t>11/2/2017</a:t>
+              <a:t>11/12/2017</a:t>
             </a:fld>
             <a:endParaRPr lang="en-US"/>
           </a:p>
@@ -2243,7 +2245,7 @@
           <a:p>
             <a:fld id="{78C97017-6FC3-485B-9764-EAC9E56C1D49}" type="datetimeFigureOut">
               <a:rPr lang="en-US" smtClean="0"/>
-              <a:t>11/2/2017</a:t>
+              <a:t>11/12/2017</a:t>
             </a:fld>
             <a:endParaRPr lang="en-US"/>
           </a:p>
@@ -2338,7 +2340,7 @@
           <a:p>
             <a:fld id="{78C97017-6FC3-485B-9764-EAC9E56C1D49}" type="datetimeFigureOut">
               <a:rPr lang="en-US" smtClean="0"/>
-              <a:t>11/2/2017</a:t>
+              <a:t>11/12/2017</a:t>
             </a:fld>
             <a:endParaRPr lang="en-US"/>
           </a:p>
@@ -2613,7 +2615,7 @@
           <a:p>
             <a:fld id="{78C97017-6FC3-485B-9764-EAC9E56C1D49}" type="datetimeFigureOut">
               <a:rPr lang="en-US" smtClean="0"/>
-              <a:t>11/2/2017</a:t>
+              <a:t>11/12/2017</a:t>
             </a:fld>
             <a:endParaRPr lang="en-US"/>
           </a:p>
@@ -2865,7 +2867,7 @@
           <a:p>
             <a:fld id="{78C97017-6FC3-485B-9764-EAC9E56C1D49}" type="datetimeFigureOut">
               <a:rPr lang="en-US" smtClean="0"/>
-              <a:t>11/2/2017</a:t>
+              <a:t>11/12/2017</a:t>
             </a:fld>
             <a:endParaRPr lang="en-US"/>
           </a:p>
@@ -3076,7 +3078,7 @@
           <a:p>
             <a:fld id="{78C97017-6FC3-485B-9764-EAC9E56C1D49}" type="datetimeFigureOut">
               <a:rPr lang="en-US" smtClean="0"/>
-              <a:t>11/2/2017</a:t>
+              <a:t>11/12/2017</a:t>
             </a:fld>
             <a:endParaRPr lang="en-US"/>
           </a:p>
@@ -7551,10 +7553,10 @@
       </p:grpSpPr>
       <p:grpSp>
         <p:nvGrpSpPr>
-          <p:cNvPr id="87" name="Group 86">
+          <p:cNvPr id="17" name="Group 16">
             <a:extLst>
               <a:ext uri="{FF2B5EF4-FFF2-40B4-BE49-F238E27FC236}">
-                <a16:creationId xmlns:a16="http://schemas.microsoft.com/office/drawing/2014/main" id="{8653116A-F2DE-4B59-9AE8-5A427F792E31}"/>
+                <a16:creationId xmlns:a16="http://schemas.microsoft.com/office/drawing/2014/main" id="{70E84BB7-7F3E-419C-8C85-62EFF7BD7506}"/>
               </a:ext>
             </a:extLst>
           </p:cNvPr>
@@ -7564,9 +7566,9 @@
         <p:grpSpPr>
           <a:xfrm>
             <a:off x="-275323" y="1981200"/>
-            <a:ext cx="9101137" cy="4000286"/>
+            <a:ext cx="9343123" cy="4000286"/>
             <a:chOff x="-275323" y="1981200"/>
-            <a:chExt cx="9101137" cy="4000286"/>
+            <a:chExt cx="9343123" cy="4000286"/>
           </a:xfrm>
         </p:grpSpPr>
         <p:sp>
@@ -7584,7 +7586,7 @@
           <p:spPr>
             <a:xfrm>
               <a:off x="685800" y="1981200"/>
-              <a:ext cx="7252956" cy="4000286"/>
+              <a:ext cx="8382000" cy="4000286"/>
             </a:xfrm>
             <a:prstGeom prst="roundRect">
               <a:avLst>
@@ -7890,13 +7892,15 @@
                 </a:ext>
               </a:extLst>
             </p:cNvPr>
-            <p:cNvCxnSpPr/>
+            <p:cNvCxnSpPr>
+              <a:cxnSpLocks/>
+            </p:cNvCxnSpPr>
             <p:nvPr/>
           </p:nvCxnSpPr>
           <p:spPr>
             <a:xfrm>
               <a:off x="3356599" y="2663904"/>
-              <a:ext cx="0" cy="1695374"/>
+              <a:ext cx="23015" cy="2746296"/>
             </a:xfrm>
             <a:prstGeom prst="line">
               <a:avLst/>
@@ -7939,7 +7943,7 @@
           <p:spPr>
             <a:xfrm>
               <a:off x="3284590" y="3122096"/>
-              <a:ext cx="174929" cy="1129459"/>
+              <a:ext cx="190048" cy="1972548"/>
             </a:xfrm>
             <a:prstGeom prst="rect">
               <a:avLst/>
@@ -7995,7 +7999,7 @@
           </p:nvSpPr>
           <p:spPr>
             <a:xfrm>
-              <a:off x="6221565" y="3312740"/>
+              <a:off x="7895976" y="3805662"/>
               <a:ext cx="1093635" cy="461538"/>
             </a:xfrm>
             <a:prstGeom prst="rect">
@@ -8071,14 +8075,15 @@
               </a:extLst>
             </p:cNvPr>
             <p:cNvCxnSpPr>
+              <a:cxnSpLocks/>
               <a:stCxn id="50" idx="0"/>
             </p:cNvCxnSpPr>
             <p:nvPr/>
           </p:nvCxnSpPr>
           <p:spPr>
             <a:xfrm>
-              <a:off x="6772574" y="3774278"/>
-              <a:ext cx="0" cy="1940722"/>
+              <a:off x="7095522" y="3774278"/>
+              <a:ext cx="0" cy="1635922"/>
             </a:xfrm>
             <a:prstGeom prst="line">
               <a:avLst/>
@@ -8120,7 +8125,7 @@
           </p:nvSpPr>
           <p:spPr>
             <a:xfrm>
-              <a:off x="6696374" y="3774278"/>
+              <a:off x="7019322" y="3774278"/>
               <a:ext cx="152400" cy="276003"/>
             </a:xfrm>
             <a:prstGeom prst="rect">
@@ -8325,52 +8330,6 @@
             </a:fontRef>
           </p:style>
         </p:cxnSp>
-        <p:sp>
-          <p:nvSpPr>
-            <p:cNvPr id="55" name="TextBox 54">
-              <a:extLst>
-                <a:ext uri="{FF2B5EF4-FFF2-40B4-BE49-F238E27FC236}">
-                  <a16:creationId xmlns:a16="http://schemas.microsoft.com/office/drawing/2014/main" id="{167D1E71-0970-4FA6-A2F9-2EBB0FA6C1D3}"/>
-                </a:ext>
-              </a:extLst>
-            </p:cNvPr>
-            <p:cNvSpPr txBox="1"/>
-            <p:nvPr/>
-          </p:nvSpPr>
-          <p:spPr>
-            <a:xfrm>
-              <a:off x="4257582" y="4251556"/>
-              <a:ext cx="855809" cy="215444"/>
-            </a:xfrm>
-            <a:prstGeom prst="rect">
-              <a:avLst/>
-            </a:prstGeom>
-            <a:noFill/>
-          </p:spPr>
-          <p:txBody>
-            <a:bodyPr wrap="square" lIns="0" tIns="0" rIns="0" bIns="0" rtlCol="0">
-              <a:spAutoFit/>
-            </a:bodyPr>
-            <a:lstStyle>
-              <a:defPPr>
-                <a:defRPr lang="en-US"/>
-              </a:defPPr>
-              <a:lvl1pPr algn="r">
-                <a:defRPr sz="1400">
-                  <a:solidFill>
-                    <a:srgbClr val="0070C0"/>
-                  </a:solidFill>
-                </a:defRPr>
-              </a:lvl1pPr>
-            </a:lstStyle>
-            <a:p>
-              <a:r>
-                <a:rPr lang="en-US" dirty="0"/>
-                <a:t>execute()</a:t>
-              </a:r>
-            </a:p>
-          </p:txBody>
-        </p:sp>
         <p:cxnSp>
           <p:nvCxnSpPr>
             <p:cNvPr id="56" name="Straight Arrow Connector 55">
@@ -8380,13 +8339,16 @@
                 </a:ext>
               </a:extLst>
             </p:cNvPr>
-            <p:cNvCxnSpPr/>
+            <p:cNvCxnSpPr>
+              <a:cxnSpLocks/>
+              <a:endCxn id="50" idx="2"/>
+            </p:cNvCxnSpPr>
             <p:nvPr/>
           </p:nvCxnSpPr>
           <p:spPr>
             <a:xfrm>
               <a:off x="5257800" y="4050281"/>
-              <a:ext cx="1492974" cy="0"/>
+              <a:ext cx="1837722" cy="0"/>
             </a:xfrm>
             <a:prstGeom prst="straightConnector1">
               <a:avLst/>
@@ -8429,7 +8391,7 @@
           </p:nvCxnSpPr>
           <p:spPr>
             <a:xfrm flipV="1">
-              <a:off x="1670186" y="4243231"/>
+              <a:off x="1661179" y="5085618"/>
               <a:ext cx="1596514" cy="5378"/>
             </a:xfrm>
             <a:prstGeom prst="straightConnector1">
@@ -8505,101 +8467,6 @@
         </p:cxnSp>
         <p:cxnSp>
           <p:nvCxnSpPr>
-            <p:cNvPr id="60" name="Straight Arrow Connector 59">
-              <a:extLst>
-                <a:ext uri="{FF2B5EF4-FFF2-40B4-BE49-F238E27FC236}">
-                  <a16:creationId xmlns:a16="http://schemas.microsoft.com/office/drawing/2014/main" id="{BA35CE39-DBFC-4BF6-8D35-2AD97EE43E3E}"/>
-                </a:ext>
-              </a:extLst>
-            </p:cNvPr>
-            <p:cNvCxnSpPr/>
-            <p:nvPr/>
-          </p:nvCxnSpPr>
-          <p:spPr>
-            <a:xfrm>
-              <a:off x="1653251" y="4495317"/>
-              <a:ext cx="5043123" cy="0"/>
-            </a:xfrm>
-            <a:prstGeom prst="straightConnector1">
-              <a:avLst/>
-            </a:prstGeom>
-            <a:ln w="19050">
-              <a:solidFill>
-                <a:srgbClr val="0070C0"/>
-              </a:solidFill>
-              <a:tailEnd type="arrow"/>
-            </a:ln>
-          </p:spPr>
-          <p:style>
-            <a:lnRef idx="1">
-              <a:schemeClr val="accent1"/>
-            </a:lnRef>
-            <a:fillRef idx="0">
-              <a:schemeClr val="accent1"/>
-            </a:fillRef>
-            <a:effectRef idx="0">
-              <a:schemeClr val="accent1"/>
-            </a:effectRef>
-            <a:fontRef idx="minor">
-              <a:schemeClr val="tx1"/>
-            </a:fontRef>
-          </p:style>
-        </p:cxnSp>
-        <p:sp>
-          <p:nvSpPr>
-            <p:cNvPr id="61" name="Rectangle 60">
-              <a:extLst>
-                <a:ext uri="{FF2B5EF4-FFF2-40B4-BE49-F238E27FC236}">
-                  <a16:creationId xmlns:a16="http://schemas.microsoft.com/office/drawing/2014/main" id="{0F01BBB8-21BA-4814-A106-897444FBDDA3}"/>
-                </a:ext>
-              </a:extLst>
-            </p:cNvPr>
-            <p:cNvSpPr/>
-            <p:nvPr/>
-          </p:nvSpPr>
-          <p:spPr>
-            <a:xfrm>
-              <a:off x="6687452" y="4467000"/>
-              <a:ext cx="161322" cy="1019400"/>
-            </a:xfrm>
-            <a:prstGeom prst="rect">
-              <a:avLst/>
-            </a:prstGeom>
-            <a:solidFill>
-              <a:srgbClr val="0070C0"/>
-            </a:solidFill>
-            <a:ln>
-              <a:solidFill>
-                <a:srgbClr val="0070C0"/>
-              </a:solidFill>
-            </a:ln>
-            <a:effectLst/>
-          </p:spPr>
-          <p:style>
-            <a:lnRef idx="1">
-              <a:schemeClr val="accent3"/>
-            </a:lnRef>
-            <a:fillRef idx="2">
-              <a:schemeClr val="accent3"/>
-            </a:fillRef>
-            <a:effectRef idx="1">
-              <a:schemeClr val="accent3"/>
-            </a:effectRef>
-            <a:fontRef idx="minor">
-              <a:schemeClr val="dk1"/>
-            </a:fontRef>
-          </p:style>
-          <p:txBody>
-            <a:bodyPr rtlCol="0" anchor="ctr"/>
-            <a:lstStyle/>
-            <a:p>
-              <a:pPr algn="ctr"/>
-              <a:endParaRPr lang="en-SG" sz="1400"/>
-            </a:p>
-          </p:txBody>
-        </p:sp>
-        <p:cxnSp>
-          <p:nvCxnSpPr>
             <p:cNvPr id="66" name="Straight Arrow Connector 65">
               <a:extLst>
                 <a:ext uri="{FF2B5EF4-FFF2-40B4-BE49-F238E27FC236}">
@@ -8607,13 +8474,15 @@
                 </a:ext>
               </a:extLst>
             </p:cNvPr>
-            <p:cNvCxnSpPr/>
+            <p:cNvCxnSpPr>
+              <a:cxnSpLocks/>
+            </p:cNvCxnSpPr>
             <p:nvPr/>
           </p:nvCxnSpPr>
           <p:spPr>
             <a:xfrm>
-              <a:off x="1653251" y="5486400"/>
-              <a:ext cx="5052349" cy="0"/>
+              <a:off x="3459519" y="4953000"/>
+              <a:ext cx="1600428" cy="0"/>
             </a:xfrm>
             <a:prstGeom prst="straightConnector1">
               <a:avLst/>
@@ -8748,8 +8617,8 @@
           </p:nvSpPr>
           <p:spPr>
             <a:xfrm>
-              <a:off x="4340137" y="5255323"/>
-              <a:ext cx="621216" cy="215444"/>
+              <a:off x="6199817" y="4572000"/>
+              <a:ext cx="612862" cy="220903"/>
             </a:xfrm>
             <a:prstGeom prst="rect">
               <a:avLst/>
@@ -8840,7 +8709,7 @@
           </p:nvSpPr>
           <p:spPr>
             <a:xfrm>
-              <a:off x="7020245" y="4777286"/>
+              <a:off x="6180361" y="3285484"/>
               <a:ext cx="1805569" cy="461538"/>
             </a:xfrm>
             <a:prstGeom prst="rect">
@@ -8929,8 +8798,8 @@
           </p:nvSpPr>
           <p:spPr>
             <a:xfrm>
-              <a:off x="7777323" y="5238824"/>
-              <a:ext cx="152400" cy="171376"/>
+              <a:off x="8328678" y="4439155"/>
+              <a:ext cx="212364" cy="361445"/>
             </a:xfrm>
             <a:prstGeom prst="rect">
               <a:avLst/>
@@ -8977,13 +8846,15 @@
                 </a:ext>
               </a:extLst>
             </p:cNvPr>
-            <p:cNvCxnSpPr/>
+            <p:cNvCxnSpPr>
+              <a:cxnSpLocks/>
+            </p:cNvCxnSpPr>
             <p:nvPr/>
           </p:nvCxnSpPr>
           <p:spPr>
             <a:xfrm>
-              <a:off x="6858000" y="5410200"/>
-              <a:ext cx="966624" cy="0"/>
+              <a:off x="5239068" y="4800600"/>
+              <a:ext cx="3089610" cy="0"/>
             </a:xfrm>
             <a:prstGeom prst="straightConnector1">
               <a:avLst/>
@@ -9204,6 +9075,7 @@
               </a:extLst>
             </p:cNvPr>
             <p:cNvCxnSpPr>
+              <a:cxnSpLocks/>
               <a:stCxn id="78" idx="0"/>
             </p:cNvCxnSpPr>
             <p:nvPr/>
@@ -9211,7 +9083,7 @@
           <p:spPr>
             <a:xfrm>
               <a:off x="5162869" y="3352800"/>
-              <a:ext cx="0" cy="990600"/>
+              <a:ext cx="0" cy="1905000"/>
             </a:xfrm>
             <a:prstGeom prst="line">
               <a:avLst/>
@@ -9253,8 +9125,8 @@
           </p:nvSpPr>
           <p:spPr>
             <a:xfrm>
-              <a:off x="5059947" y="3657601"/>
-              <a:ext cx="205843" cy="533400"/>
+              <a:off x="5059948" y="3657600"/>
+              <a:ext cx="179120" cy="1342557"/>
             </a:xfrm>
             <a:prstGeom prst="rect">
               <a:avLst/>
@@ -9294,50 +9166,6 @@
         </p:sp>
         <p:cxnSp>
           <p:nvCxnSpPr>
-            <p:cNvPr id="81" name="Straight Arrow Connector 80">
-              <a:extLst>
-                <a:ext uri="{FF2B5EF4-FFF2-40B4-BE49-F238E27FC236}">
-                  <a16:creationId xmlns:a16="http://schemas.microsoft.com/office/drawing/2014/main" id="{A37B2CD6-21E1-4F7F-98BB-8EA910B8F256}"/>
-                </a:ext>
-              </a:extLst>
-            </p:cNvPr>
-            <p:cNvCxnSpPr/>
-            <p:nvPr/>
-          </p:nvCxnSpPr>
-          <p:spPr>
-            <a:xfrm>
-              <a:off x="3499382" y="4185073"/>
-              <a:ext cx="1667219" cy="0"/>
-            </a:xfrm>
-            <a:prstGeom prst="straightConnector1">
-              <a:avLst/>
-            </a:prstGeom>
-            <a:ln w="19050">
-              <a:solidFill>
-                <a:srgbClr val="0070C0"/>
-              </a:solidFill>
-              <a:prstDash val="sysDash"/>
-              <a:headEnd type="arrow" w="med" len="med"/>
-              <a:tailEnd type="none" w="med" len="med"/>
-            </a:ln>
-          </p:spPr>
-          <p:style>
-            <a:lnRef idx="1">
-              <a:schemeClr val="accent1"/>
-            </a:lnRef>
-            <a:fillRef idx="0">
-              <a:schemeClr val="accent1"/>
-            </a:fillRef>
-            <a:effectRef idx="0">
-              <a:schemeClr val="accent1"/>
-            </a:effectRef>
-            <a:fontRef idx="minor">
-              <a:schemeClr val="tx1"/>
-            </a:fontRef>
-          </p:style>
-        </p:cxnSp>
-        <p:cxnSp>
-          <p:nvCxnSpPr>
             <p:cNvPr id="82" name="Straight Arrow Connector 81">
               <a:extLst>
                 <a:ext uri="{FF2B5EF4-FFF2-40B4-BE49-F238E27FC236}">
@@ -9345,13 +9173,15 @@
                 </a:ext>
               </a:extLst>
             </p:cNvPr>
-            <p:cNvCxnSpPr/>
+            <p:cNvCxnSpPr>
+              <a:cxnSpLocks/>
+            </p:cNvCxnSpPr>
             <p:nvPr/>
           </p:nvCxnSpPr>
           <p:spPr>
             <a:xfrm>
-              <a:off x="6858000" y="5029200"/>
-              <a:ext cx="162246" cy="0"/>
+              <a:off x="5257800" y="4495800"/>
+              <a:ext cx="3070878" cy="0"/>
             </a:xfrm>
             <a:prstGeom prst="straightConnector1">
               <a:avLst/>
@@ -9462,12 +9292,58 @@
             </a:fontRef>
           </p:style>
         </p:cxnSp>
+        <p:cxnSp>
+          <p:nvCxnSpPr>
+            <p:cNvPr id="59" name="Straight Connector 58">
+              <a:extLst>
+                <a:ext uri="{FF2B5EF4-FFF2-40B4-BE49-F238E27FC236}">
+                  <a16:creationId xmlns:a16="http://schemas.microsoft.com/office/drawing/2014/main" id="{1FC677F3-4289-4A94-BC24-701362965ADC}"/>
+                </a:ext>
+              </a:extLst>
+            </p:cNvPr>
+            <p:cNvCxnSpPr>
+              <a:cxnSpLocks/>
+              <a:stCxn id="48" idx="2"/>
+            </p:cNvCxnSpPr>
+            <p:nvPr/>
+          </p:nvCxnSpPr>
+          <p:spPr>
+            <a:xfrm>
+              <a:off x="8442794" y="4267200"/>
+              <a:ext cx="0" cy="1271288"/>
+            </a:xfrm>
+            <a:prstGeom prst="line">
+              <a:avLst/>
+            </a:prstGeom>
+            <a:ln w="19050">
+              <a:solidFill>
+                <a:srgbClr val="0070C0"/>
+              </a:solidFill>
+              <a:prstDash val="sysDash"/>
+            </a:ln>
+            <a:effectLst/>
+          </p:spPr>
+          <p:style>
+            <a:lnRef idx="1">
+              <a:schemeClr val="accent1"/>
+            </a:lnRef>
+            <a:fillRef idx="2">
+              <a:schemeClr val="accent1"/>
+            </a:fillRef>
+            <a:effectRef idx="1">
+              <a:schemeClr val="accent1"/>
+            </a:effectRef>
+            <a:fontRef idx="minor">
+              <a:schemeClr val="dk1"/>
+            </a:fontRef>
+          </p:style>
+        </p:cxnSp>
         <p:sp>
           <p:nvSpPr>
-            <p:cNvPr id="85" name="TextBox 84">
+            <p:cNvPr id="62" name="TextBox 61">
               <a:extLst>
                 <a:ext uri="{FF2B5EF4-FFF2-40B4-BE49-F238E27FC236}">
-                  <a16:creationId xmlns:a16="http://schemas.microsoft.com/office/drawing/2014/main" id="{C636911B-7D54-4AB0-8BC1-912CC212815F}"/>
+                  <a16:creationId xmlns:a16="http://schemas.microsoft.com/office/drawing/2014/main" id="{9B0E400E-E4A9-4D9B-9FC9-3F1365F7D11D}"/>
                 </a:ext>
               </a:extLst>
             </p:cNvPr>
@@ -9476,8 +9352,8 @@
           </p:nvSpPr>
           <p:spPr>
             <a:xfrm>
-              <a:off x="5033665" y="4199590"/>
-              <a:ext cx="258404" cy="261610"/>
+              <a:off x="3978703" y="4732097"/>
+              <a:ext cx="612862" cy="220903"/>
             </a:xfrm>
             <a:prstGeom prst="rect">
               <a:avLst/>
@@ -9485,18 +9361,71 @@
             <a:noFill/>
           </p:spPr>
           <p:txBody>
-            <a:bodyPr wrap="none" rtlCol="0">
+            <a:bodyPr wrap="square" lIns="0" tIns="0" rIns="0" bIns="0" rtlCol="0">
               <a:spAutoFit/>
             </a:bodyPr>
-            <a:lstStyle/>
+            <a:lstStyle>
+              <a:defPPr>
+                <a:defRPr lang="en-US"/>
+              </a:defPPr>
+              <a:lvl1pPr algn="r">
+                <a:defRPr sz="1400">
+                  <a:solidFill>
+                    <a:srgbClr val="0070C0"/>
+                  </a:solidFill>
+                </a:defRPr>
+              </a:lvl1pPr>
+            </a:lstStyle>
             <a:p>
               <a:r>
-                <a:rPr lang="en-SG" sz="1100" dirty="0">
+                <a:rPr lang="en-US" dirty="0"/>
+                <a:t>return</a:t>
+              </a:r>
+            </a:p>
+          </p:txBody>
+        </p:sp>
+        <p:sp>
+          <p:nvSpPr>
+            <p:cNvPr id="63" name="TextBox 62">
+              <a:extLst>
+                <a:ext uri="{FF2B5EF4-FFF2-40B4-BE49-F238E27FC236}">
+                  <a16:creationId xmlns:a16="http://schemas.microsoft.com/office/drawing/2014/main" id="{9AE01D13-C2E5-4D87-8399-803716F137AC}"/>
+                </a:ext>
+              </a:extLst>
+            </p:cNvPr>
+            <p:cNvSpPr txBox="1"/>
+            <p:nvPr/>
+          </p:nvSpPr>
+          <p:spPr>
+            <a:xfrm>
+              <a:off x="2130338" y="4867404"/>
+              <a:ext cx="612862" cy="220903"/>
+            </a:xfrm>
+            <a:prstGeom prst="rect">
+              <a:avLst/>
+            </a:prstGeom>
+            <a:noFill/>
+          </p:spPr>
+          <p:txBody>
+            <a:bodyPr wrap="square" lIns="0" tIns="0" rIns="0" bIns="0" rtlCol="0">
+              <a:spAutoFit/>
+            </a:bodyPr>
+            <a:lstStyle>
+              <a:defPPr>
+                <a:defRPr lang="en-US"/>
+              </a:defPPr>
+              <a:lvl1pPr algn="r">
+                <a:defRPr sz="1400">
                   <a:solidFill>
-                    <a:srgbClr val="002060"/>
+                    <a:srgbClr val="0070C0"/>
                   </a:solidFill>
-                </a:rPr>
-                <a:t>X</a:t>
+                </a:defRPr>
+              </a:lvl1pPr>
+            </a:lstStyle>
+            <a:p>
+              <a:r>
+                <a:rPr lang="en-US" dirty="0"/>
+                <a:t>return</a:t>
               </a:r>
             </a:p>
           </p:txBody>
@@ -13497,6 +13426,3025 @@
     <p:extLst>
       <p:ext uri="{BB962C8B-B14F-4D97-AF65-F5344CB8AC3E}">
         <p14:creationId xmlns:p14="http://schemas.microsoft.com/office/powerpoint/2010/main" val="2761728219"/>
+      </p:ext>
+    </p:extLst>
+  </p:cSld>
+  <p:clrMapOvr>
+    <a:masterClrMapping/>
+  </p:clrMapOvr>
+</p:sld>
+</file>
+
+<file path=ppt/slides/slide7.xml><?xml version="1.0" encoding="utf-8"?>
+<p:sld xmlns:a="http://schemas.openxmlformats.org/drawingml/2006/main" xmlns:r="http://schemas.openxmlformats.org/officeDocument/2006/relationships" xmlns:p="http://schemas.openxmlformats.org/presentationml/2006/main">
+  <p:cSld>
+    <p:spTree>
+      <p:nvGrpSpPr>
+        <p:cNvPr id="1" name=""/>
+        <p:cNvGrpSpPr/>
+        <p:nvPr/>
+      </p:nvGrpSpPr>
+      <p:grpSpPr>
+        <a:xfrm>
+          <a:off x="0" y="0"/>
+          <a:ext cx="0" cy="0"/>
+          <a:chOff x="0" y="0"/>
+          <a:chExt cx="0" cy="0"/>
+        </a:xfrm>
+      </p:grpSpPr>
+      <p:sp>
+        <p:nvSpPr>
+          <p:cNvPr id="3" name="Rectangle 65">
+            <a:extLst>
+              <a:ext uri="{FF2B5EF4-FFF2-40B4-BE49-F238E27FC236}">
+                <a16:creationId xmlns:a16="http://schemas.microsoft.com/office/drawing/2014/main" id="{0D197A8D-B416-47DE-A2FC-A82485B34CD7}"/>
+              </a:ext>
+            </a:extLst>
+          </p:cNvPr>
+          <p:cNvSpPr/>
+          <p:nvPr/>
+        </p:nvSpPr>
+        <p:spPr>
+          <a:xfrm>
+            <a:off x="685800" y="1981200"/>
+            <a:ext cx="8382000" cy="4000286"/>
+          </a:xfrm>
+          <a:prstGeom prst="roundRect">
+            <a:avLst>
+              <a:gd name="adj" fmla="val 3484"/>
+            </a:avLst>
+          </a:prstGeom>
+          <a:solidFill>
+            <a:schemeClr val="accent1">
+              <a:lumMod val="20000"/>
+              <a:lumOff val="80000"/>
+            </a:schemeClr>
+          </a:solidFill>
+          <a:ln w="19050">
+            <a:noFill/>
+          </a:ln>
+          <a:effectLst/>
+        </p:spPr>
+        <p:style>
+          <a:lnRef idx="1">
+            <a:schemeClr val="accent2"/>
+          </a:lnRef>
+          <a:fillRef idx="2">
+            <a:schemeClr val="accent2"/>
+          </a:fillRef>
+          <a:effectRef idx="1">
+            <a:schemeClr val="accent2"/>
+          </a:effectRef>
+          <a:fontRef idx="minor">
+            <a:schemeClr val="dk1"/>
+          </a:fontRef>
+        </p:style>
+        <p:txBody>
+          <a:bodyPr rtlCol="0" anchor="t"/>
+          <a:lstStyle/>
+          <a:p>
+            <a:r>
+              <a:rPr lang="en-US" sz="1200" b="1" dirty="0">
+                <a:solidFill>
+                  <a:srgbClr val="0070C0"/>
+                </a:solidFill>
+              </a:rPr>
+              <a:t>Logic</a:t>
+            </a:r>
+            <a:endParaRPr lang="en-SG" sz="1200" b="1" dirty="0">
+              <a:solidFill>
+                <a:srgbClr val="0070C0"/>
+              </a:solidFill>
+            </a:endParaRPr>
+          </a:p>
+        </p:txBody>
+      </p:sp>
+      <p:sp>
+        <p:nvSpPr>
+          <p:cNvPr id="4" name="Rectangle 62">
+            <a:extLst>
+              <a:ext uri="{FF2B5EF4-FFF2-40B4-BE49-F238E27FC236}">
+                <a16:creationId xmlns:a16="http://schemas.microsoft.com/office/drawing/2014/main" id="{6B5342B4-E65F-451C-923C-1E398AAE47EE}"/>
+              </a:ext>
+            </a:extLst>
+          </p:cNvPr>
+          <p:cNvSpPr/>
+          <p:nvPr/>
+        </p:nvSpPr>
+        <p:spPr>
+          <a:xfrm>
+            <a:off x="845045" y="2296546"/>
+            <a:ext cx="1455629" cy="346760"/>
+          </a:xfrm>
+          <a:prstGeom prst="rect">
+            <a:avLst/>
+          </a:prstGeom>
+          <a:solidFill>
+            <a:srgbClr val="0070C0"/>
+          </a:solidFill>
+          <a:ln w="19050">
+            <a:solidFill>
+              <a:srgbClr val="0070C0"/>
+            </a:solidFill>
+          </a:ln>
+          <a:effectLst/>
+        </p:spPr>
+        <p:style>
+          <a:lnRef idx="1">
+            <a:schemeClr val="accent2"/>
+          </a:lnRef>
+          <a:fillRef idx="2">
+            <a:schemeClr val="accent2"/>
+          </a:fillRef>
+          <a:effectRef idx="1">
+            <a:schemeClr val="accent2"/>
+          </a:effectRef>
+          <a:fontRef idx="minor">
+            <a:schemeClr val="dk1"/>
+          </a:fontRef>
+        </p:style>
+        <p:txBody>
+          <a:bodyPr rtlCol="0" anchor="ctr"/>
+          <a:lstStyle/>
+          <a:p>
+            <a:pPr algn="ctr"/>
+            <a:r>
+              <a:rPr lang="en-US" sz="1600" dirty="0">
+                <a:solidFill>
+                  <a:schemeClr val="bg1"/>
+                </a:solidFill>
+              </a:rPr>
+              <a:t>:</a:t>
+            </a:r>
+            <a:r>
+              <a:rPr lang="en-US" sz="1600" dirty="0" err="1">
+                <a:solidFill>
+                  <a:schemeClr val="bg1"/>
+                </a:solidFill>
+              </a:rPr>
+              <a:t>LogicManager</a:t>
+            </a:r>
+            <a:endParaRPr lang="en-SG" sz="1600" dirty="0">
+              <a:solidFill>
+                <a:schemeClr val="bg1"/>
+              </a:solidFill>
+            </a:endParaRPr>
+          </a:p>
+        </p:txBody>
+      </p:sp>
+      <p:cxnSp>
+        <p:nvCxnSpPr>
+          <p:cNvPr id="5" name="Straight Connector 4">
+            <a:extLst>
+              <a:ext uri="{FF2B5EF4-FFF2-40B4-BE49-F238E27FC236}">
+                <a16:creationId xmlns:a16="http://schemas.microsoft.com/office/drawing/2014/main" id="{48516C7E-78EA-4587-9F7A-54F22814E683}"/>
+              </a:ext>
+            </a:extLst>
+          </p:cNvPr>
+          <p:cNvCxnSpPr/>
+          <p:nvPr/>
+        </p:nvCxnSpPr>
+        <p:spPr>
+          <a:xfrm>
+            <a:off x="1572859" y="2660217"/>
+            <a:ext cx="0" cy="2597583"/>
+          </a:xfrm>
+          <a:prstGeom prst="line">
+            <a:avLst/>
+          </a:prstGeom>
+          <a:ln w="19050">
+            <a:solidFill>
+              <a:srgbClr val="0070C0"/>
+            </a:solidFill>
+            <a:prstDash val="sysDash"/>
+          </a:ln>
+          <a:effectLst/>
+        </p:spPr>
+        <p:style>
+          <a:lnRef idx="1">
+            <a:schemeClr val="accent1"/>
+          </a:lnRef>
+          <a:fillRef idx="2">
+            <a:schemeClr val="accent1"/>
+          </a:fillRef>
+          <a:effectRef idx="1">
+            <a:schemeClr val="accent1"/>
+          </a:effectRef>
+          <a:fontRef idx="minor">
+            <a:schemeClr val="dk1"/>
+          </a:fontRef>
+        </p:style>
+      </p:cxnSp>
+      <p:sp>
+        <p:nvSpPr>
+          <p:cNvPr id="6" name="Rectangle 5">
+            <a:extLst>
+              <a:ext uri="{FF2B5EF4-FFF2-40B4-BE49-F238E27FC236}">
+                <a16:creationId xmlns:a16="http://schemas.microsoft.com/office/drawing/2014/main" id="{7ECE8F87-4C7A-4344-A3FD-3CA113A7345D}"/>
+              </a:ext>
+            </a:extLst>
+          </p:cNvPr>
+          <p:cNvSpPr/>
+          <p:nvPr/>
+        </p:nvSpPr>
+        <p:spPr>
+          <a:xfrm>
+            <a:off x="1500851" y="3010911"/>
+            <a:ext cx="152400" cy="2780287"/>
+          </a:xfrm>
+          <a:prstGeom prst="rect">
+            <a:avLst/>
+          </a:prstGeom>
+          <a:solidFill>
+            <a:srgbClr val="0070C0"/>
+          </a:solidFill>
+          <a:ln>
+            <a:solidFill>
+              <a:srgbClr val="0070C0"/>
+            </a:solidFill>
+          </a:ln>
+          <a:effectLst/>
+        </p:spPr>
+        <p:style>
+          <a:lnRef idx="1">
+            <a:schemeClr val="accent3"/>
+          </a:lnRef>
+          <a:fillRef idx="2">
+            <a:schemeClr val="accent3"/>
+          </a:fillRef>
+          <a:effectRef idx="1">
+            <a:schemeClr val="accent3"/>
+          </a:effectRef>
+          <a:fontRef idx="minor">
+            <a:schemeClr val="dk1"/>
+          </a:fontRef>
+        </p:style>
+        <p:txBody>
+          <a:bodyPr rtlCol="0" anchor="ctr"/>
+          <a:lstStyle/>
+          <a:p>
+            <a:pPr algn="ctr"/>
+            <a:endParaRPr lang="en-SG" sz="1400"/>
+          </a:p>
+        </p:txBody>
+      </p:sp>
+      <p:sp>
+        <p:nvSpPr>
+          <p:cNvPr id="7" name="Rectangle 62">
+            <a:extLst>
+              <a:ext uri="{FF2B5EF4-FFF2-40B4-BE49-F238E27FC236}">
+                <a16:creationId xmlns:a16="http://schemas.microsoft.com/office/drawing/2014/main" id="{D7B7274B-3E7A-4679-BDAC-329EA0EE3B20}"/>
+              </a:ext>
+            </a:extLst>
+          </p:cNvPr>
+          <p:cNvSpPr/>
+          <p:nvPr/>
+        </p:nvSpPr>
+        <p:spPr>
+          <a:xfrm>
+            <a:off x="2743200" y="2179309"/>
+            <a:ext cx="1219200" cy="467684"/>
+          </a:xfrm>
+          <a:prstGeom prst="rect">
+            <a:avLst/>
+          </a:prstGeom>
+          <a:solidFill>
+            <a:srgbClr val="0070C0"/>
+          </a:solidFill>
+          <a:ln w="19050">
+            <a:solidFill>
+              <a:srgbClr val="0070C0"/>
+            </a:solidFill>
+          </a:ln>
+          <a:effectLst/>
+        </p:spPr>
+        <p:style>
+          <a:lnRef idx="1">
+            <a:schemeClr val="accent2"/>
+          </a:lnRef>
+          <a:fillRef idx="2">
+            <a:schemeClr val="accent2"/>
+          </a:fillRef>
+          <a:effectRef idx="1">
+            <a:schemeClr val="accent2"/>
+          </a:effectRef>
+          <a:fontRef idx="minor">
+            <a:schemeClr val="dk1"/>
+          </a:fontRef>
+        </p:style>
+        <p:txBody>
+          <a:bodyPr rtlCol="0" anchor="ctr"/>
+          <a:lstStyle/>
+          <a:p>
+            <a:pPr algn="ctr"/>
+            <a:r>
+              <a:rPr lang="en-US" sz="1600" dirty="0">
+                <a:solidFill>
+                  <a:schemeClr val="bg1"/>
+                </a:solidFill>
+              </a:rPr>
+              <a:t>:Address</a:t>
+            </a:r>
+          </a:p>
+          <a:p>
+            <a:pPr algn="ctr"/>
+            <a:r>
+              <a:rPr lang="en-US" sz="1600" dirty="0" err="1">
+                <a:solidFill>
+                  <a:schemeClr val="bg1"/>
+                </a:solidFill>
+              </a:rPr>
+              <a:t>BookParser</a:t>
+            </a:r>
+            <a:endParaRPr lang="en-SG" sz="1600" dirty="0">
+              <a:solidFill>
+                <a:schemeClr val="bg1"/>
+              </a:solidFill>
+            </a:endParaRPr>
+          </a:p>
+        </p:txBody>
+      </p:sp>
+      <p:cxnSp>
+        <p:nvCxnSpPr>
+          <p:cNvPr id="8" name="Straight Connector 7">
+            <a:extLst>
+              <a:ext uri="{FF2B5EF4-FFF2-40B4-BE49-F238E27FC236}">
+                <a16:creationId xmlns:a16="http://schemas.microsoft.com/office/drawing/2014/main" id="{925FA914-04D3-4CD1-BF3B-FA052067D5F0}"/>
+              </a:ext>
+            </a:extLst>
+          </p:cNvPr>
+          <p:cNvCxnSpPr>
+            <a:cxnSpLocks/>
+          </p:cNvCxnSpPr>
+          <p:nvPr/>
+        </p:nvCxnSpPr>
+        <p:spPr>
+          <a:xfrm>
+            <a:off x="3356599" y="2663904"/>
+            <a:ext cx="23015" cy="2746296"/>
+          </a:xfrm>
+          <a:prstGeom prst="line">
+            <a:avLst/>
+          </a:prstGeom>
+          <a:ln w="19050">
+            <a:solidFill>
+              <a:srgbClr val="0070C0"/>
+            </a:solidFill>
+            <a:prstDash val="sysDash"/>
+          </a:ln>
+          <a:effectLst/>
+        </p:spPr>
+        <p:style>
+          <a:lnRef idx="1">
+            <a:schemeClr val="accent1"/>
+          </a:lnRef>
+          <a:fillRef idx="2">
+            <a:schemeClr val="accent1"/>
+          </a:fillRef>
+          <a:effectRef idx="1">
+            <a:schemeClr val="accent1"/>
+          </a:effectRef>
+          <a:fontRef idx="minor">
+            <a:schemeClr val="dk1"/>
+          </a:fontRef>
+        </p:style>
+      </p:cxnSp>
+      <p:sp>
+        <p:nvSpPr>
+          <p:cNvPr id="9" name="Rectangle 8">
+            <a:extLst>
+              <a:ext uri="{FF2B5EF4-FFF2-40B4-BE49-F238E27FC236}">
+                <a16:creationId xmlns:a16="http://schemas.microsoft.com/office/drawing/2014/main" id="{FFCFB79C-21F0-42A0-B19A-8491B6BB52D9}"/>
+              </a:ext>
+            </a:extLst>
+          </p:cNvPr>
+          <p:cNvSpPr/>
+          <p:nvPr/>
+        </p:nvSpPr>
+        <p:spPr>
+          <a:xfrm>
+            <a:off x="3284590" y="3122096"/>
+            <a:ext cx="190048" cy="1972548"/>
+          </a:xfrm>
+          <a:prstGeom prst="rect">
+            <a:avLst/>
+          </a:prstGeom>
+          <a:solidFill>
+            <a:srgbClr val="0070C0"/>
+          </a:solidFill>
+          <a:ln>
+            <a:solidFill>
+              <a:srgbClr val="0070C0"/>
+            </a:solidFill>
+          </a:ln>
+          <a:effectLst/>
+        </p:spPr>
+        <p:style>
+          <a:lnRef idx="1">
+            <a:schemeClr val="accent3"/>
+          </a:lnRef>
+          <a:fillRef idx="2">
+            <a:schemeClr val="accent3"/>
+          </a:fillRef>
+          <a:effectRef idx="1">
+            <a:schemeClr val="accent3"/>
+          </a:effectRef>
+          <a:fontRef idx="minor">
+            <a:schemeClr val="dk1"/>
+          </a:fontRef>
+        </p:style>
+        <p:txBody>
+          <a:bodyPr rtlCol="0" anchor="ctr"/>
+          <a:lstStyle/>
+          <a:p>
+            <a:pPr algn="ctr"/>
+            <a:endParaRPr lang="en-SG" sz="1400">
+              <a:solidFill>
+                <a:schemeClr val="dk1"/>
+              </a:solidFill>
+            </a:endParaRPr>
+          </a:p>
+        </p:txBody>
+      </p:sp>
+      <p:sp>
+        <p:nvSpPr>
+          <p:cNvPr id="10" name="Rectangle 62">
+            <a:extLst>
+              <a:ext uri="{FF2B5EF4-FFF2-40B4-BE49-F238E27FC236}">
+                <a16:creationId xmlns:a16="http://schemas.microsoft.com/office/drawing/2014/main" id="{4CFC33B0-C739-4B99-8D45-D2FD24409312}"/>
+              </a:ext>
+            </a:extLst>
+          </p:cNvPr>
+          <p:cNvSpPr/>
+          <p:nvPr/>
+        </p:nvSpPr>
+        <p:spPr>
+          <a:xfrm>
+            <a:off x="7895976" y="3805662"/>
+            <a:ext cx="1093635" cy="461538"/>
+          </a:xfrm>
+          <a:prstGeom prst="rect">
+            <a:avLst/>
+          </a:prstGeom>
+          <a:solidFill>
+            <a:srgbClr val="0070C0"/>
+          </a:solidFill>
+          <a:ln w="19050">
+            <a:solidFill>
+              <a:srgbClr val="0070C0"/>
+            </a:solidFill>
+          </a:ln>
+          <a:effectLst/>
+        </p:spPr>
+        <p:style>
+          <a:lnRef idx="1">
+            <a:schemeClr val="accent2"/>
+          </a:lnRef>
+          <a:fillRef idx="2">
+            <a:schemeClr val="accent2"/>
+          </a:fillRef>
+          <a:effectRef idx="1">
+            <a:schemeClr val="accent2"/>
+          </a:effectRef>
+          <a:fontRef idx="minor">
+            <a:schemeClr val="dk1"/>
+          </a:fontRef>
+        </p:style>
+        <p:txBody>
+          <a:bodyPr rtlCol="0" anchor="ctr"/>
+          <a:lstStyle/>
+          <a:p>
+            <a:pPr algn="ctr"/>
+            <a:r>
+              <a:rPr lang="en-US" sz="1600" dirty="0">
+                <a:solidFill>
+                  <a:schemeClr val="bg1"/>
+                </a:solidFill>
+              </a:rPr>
+              <a:t>d:Find</a:t>
+            </a:r>
+            <a:br>
+              <a:rPr lang="en-US" sz="1600" dirty="0">
+                <a:solidFill>
+                  <a:schemeClr val="bg1"/>
+                </a:solidFill>
+              </a:rPr>
+            </a:br>
+            <a:r>
+              <a:rPr lang="en-US" sz="1600" dirty="0">
+                <a:solidFill>
+                  <a:schemeClr val="bg1"/>
+                </a:solidFill>
+              </a:rPr>
+              <a:t>Command</a:t>
+            </a:r>
+            <a:endParaRPr lang="en-SG" sz="1600" dirty="0">
+              <a:solidFill>
+                <a:schemeClr val="bg1"/>
+              </a:solidFill>
+            </a:endParaRPr>
+          </a:p>
+        </p:txBody>
+      </p:sp>
+      <p:cxnSp>
+        <p:nvCxnSpPr>
+          <p:cNvPr id="11" name="Straight Connector 10">
+            <a:extLst>
+              <a:ext uri="{FF2B5EF4-FFF2-40B4-BE49-F238E27FC236}">
+                <a16:creationId xmlns:a16="http://schemas.microsoft.com/office/drawing/2014/main" id="{85E30059-77D3-47E3-9072-EF86C17C6175}"/>
+              </a:ext>
+            </a:extLst>
+          </p:cNvPr>
+          <p:cNvCxnSpPr>
+            <a:cxnSpLocks/>
+            <a:stCxn id="12" idx="0"/>
+          </p:cNvCxnSpPr>
+          <p:nvPr/>
+        </p:nvCxnSpPr>
+        <p:spPr>
+          <a:xfrm>
+            <a:off x="7095522" y="3774278"/>
+            <a:ext cx="0" cy="1635922"/>
+          </a:xfrm>
+          <a:prstGeom prst="line">
+            <a:avLst/>
+          </a:prstGeom>
+          <a:ln w="19050">
+            <a:solidFill>
+              <a:srgbClr val="0070C0"/>
+            </a:solidFill>
+            <a:prstDash val="sysDash"/>
+          </a:ln>
+          <a:effectLst/>
+        </p:spPr>
+        <p:style>
+          <a:lnRef idx="1">
+            <a:schemeClr val="accent1"/>
+          </a:lnRef>
+          <a:fillRef idx="2">
+            <a:schemeClr val="accent1"/>
+          </a:fillRef>
+          <a:effectRef idx="1">
+            <a:schemeClr val="accent1"/>
+          </a:effectRef>
+          <a:fontRef idx="minor">
+            <a:schemeClr val="dk1"/>
+          </a:fontRef>
+        </p:style>
+      </p:cxnSp>
+      <p:sp>
+        <p:nvSpPr>
+          <p:cNvPr id="12" name="Rectangle 11">
+            <a:extLst>
+              <a:ext uri="{FF2B5EF4-FFF2-40B4-BE49-F238E27FC236}">
+                <a16:creationId xmlns:a16="http://schemas.microsoft.com/office/drawing/2014/main" id="{19418F9F-9931-4C76-9C1E-9978E707BA1A}"/>
+              </a:ext>
+            </a:extLst>
+          </p:cNvPr>
+          <p:cNvSpPr/>
+          <p:nvPr/>
+        </p:nvSpPr>
+        <p:spPr>
+          <a:xfrm>
+            <a:off x="7019322" y="3774278"/>
+            <a:ext cx="152400" cy="276003"/>
+          </a:xfrm>
+          <a:prstGeom prst="rect">
+            <a:avLst/>
+          </a:prstGeom>
+          <a:solidFill>
+            <a:srgbClr val="0070C0"/>
+          </a:solidFill>
+          <a:ln>
+            <a:solidFill>
+              <a:srgbClr val="0070C0"/>
+            </a:solidFill>
+          </a:ln>
+          <a:effectLst/>
+        </p:spPr>
+        <p:style>
+          <a:lnRef idx="1">
+            <a:schemeClr val="accent3"/>
+          </a:lnRef>
+          <a:fillRef idx="2">
+            <a:schemeClr val="accent3"/>
+          </a:fillRef>
+          <a:effectRef idx="1">
+            <a:schemeClr val="accent3"/>
+          </a:effectRef>
+          <a:fontRef idx="minor">
+            <a:schemeClr val="dk1"/>
+          </a:fontRef>
+        </p:style>
+        <p:txBody>
+          <a:bodyPr rtlCol="0" anchor="ctr"/>
+          <a:lstStyle/>
+          <a:p>
+            <a:pPr algn="ctr"/>
+            <a:endParaRPr lang="en-SG" sz="1400"/>
+          </a:p>
+        </p:txBody>
+      </p:sp>
+      <p:cxnSp>
+        <p:nvCxnSpPr>
+          <p:cNvPr id="13" name="Straight Arrow Connector 12">
+            <a:extLst>
+              <a:ext uri="{FF2B5EF4-FFF2-40B4-BE49-F238E27FC236}">
+                <a16:creationId xmlns:a16="http://schemas.microsoft.com/office/drawing/2014/main" id="{7FBAB53F-99D7-454D-B8F7-10CAB86C6AE3}"/>
+              </a:ext>
+            </a:extLst>
+          </p:cNvPr>
+          <p:cNvCxnSpPr/>
+          <p:nvPr/>
+        </p:nvCxnSpPr>
+        <p:spPr>
+          <a:xfrm>
+            <a:off x="381000" y="3014599"/>
+            <a:ext cx="1119851" cy="0"/>
+          </a:xfrm>
+          <a:prstGeom prst="straightConnector1">
+            <a:avLst/>
+          </a:prstGeom>
+          <a:ln w="19050">
+            <a:solidFill>
+              <a:srgbClr val="00B050"/>
+            </a:solidFill>
+            <a:tailEnd type="arrow"/>
+          </a:ln>
+        </p:spPr>
+        <p:style>
+          <a:lnRef idx="1">
+            <a:schemeClr val="accent1"/>
+          </a:lnRef>
+          <a:fillRef idx="0">
+            <a:schemeClr val="accent1"/>
+          </a:fillRef>
+          <a:effectRef idx="0">
+            <a:schemeClr val="accent1"/>
+          </a:effectRef>
+          <a:fontRef idx="minor">
+            <a:schemeClr val="tx1"/>
+          </a:fontRef>
+        </p:style>
+      </p:cxnSp>
+      <p:cxnSp>
+        <p:nvCxnSpPr>
+          <p:cNvPr id="14" name="Straight Arrow Connector 13">
+            <a:extLst>
+              <a:ext uri="{FF2B5EF4-FFF2-40B4-BE49-F238E27FC236}">
+                <a16:creationId xmlns:a16="http://schemas.microsoft.com/office/drawing/2014/main" id="{86137ED3-7428-4CC3-8179-31B77341A3F8}"/>
+              </a:ext>
+            </a:extLst>
+          </p:cNvPr>
+          <p:cNvCxnSpPr/>
+          <p:nvPr/>
+        </p:nvCxnSpPr>
+        <p:spPr>
+          <a:xfrm flipV="1">
+            <a:off x="1653251" y="3122097"/>
+            <a:ext cx="1596514" cy="1"/>
+          </a:xfrm>
+          <a:prstGeom prst="straightConnector1">
+            <a:avLst/>
+          </a:prstGeom>
+          <a:ln w="19050">
+            <a:solidFill>
+              <a:srgbClr val="0070C0"/>
+            </a:solidFill>
+            <a:tailEnd type="arrow"/>
+          </a:ln>
+        </p:spPr>
+        <p:style>
+          <a:lnRef idx="1">
+            <a:schemeClr val="accent1"/>
+          </a:lnRef>
+          <a:fillRef idx="0">
+            <a:schemeClr val="accent1"/>
+          </a:fillRef>
+          <a:effectRef idx="0">
+            <a:schemeClr val="accent1"/>
+          </a:effectRef>
+          <a:fontRef idx="minor">
+            <a:schemeClr val="tx1"/>
+          </a:fontRef>
+        </p:style>
+      </p:cxnSp>
+      <p:sp>
+        <p:nvSpPr>
+          <p:cNvPr id="15" name="TextBox 14">
+            <a:extLst>
+              <a:ext uri="{FF2B5EF4-FFF2-40B4-BE49-F238E27FC236}">
+                <a16:creationId xmlns:a16="http://schemas.microsoft.com/office/drawing/2014/main" id="{83C9778E-0D03-4A03-AAE1-158BA7C384DA}"/>
+              </a:ext>
+            </a:extLst>
+          </p:cNvPr>
+          <p:cNvSpPr txBox="1"/>
+          <p:nvPr/>
+        </p:nvSpPr>
+        <p:spPr>
+          <a:xfrm>
+            <a:off x="-275323" y="2743200"/>
+            <a:ext cx="1700169" cy="215444"/>
+          </a:xfrm>
+          <a:prstGeom prst="rect">
+            <a:avLst/>
+          </a:prstGeom>
+          <a:noFill/>
+        </p:spPr>
+        <p:txBody>
+          <a:bodyPr wrap="square" lIns="0" tIns="0" rIns="0" bIns="0" rtlCol="0">
+            <a:spAutoFit/>
+          </a:bodyPr>
+          <a:lstStyle/>
+          <a:p>
+            <a:pPr algn="r"/>
+            <a:r>
+              <a:rPr lang="en-US" sz="1400" dirty="0">
+                <a:solidFill>
+                  <a:srgbClr val="0070C0"/>
+                </a:solidFill>
+              </a:rPr>
+              <a:t>execute(“Find m/Jan”)</a:t>
+            </a:r>
+          </a:p>
+        </p:txBody>
+      </p:sp>
+      <p:cxnSp>
+        <p:nvCxnSpPr>
+          <p:cNvPr id="16" name="Straight Arrow Connector 15">
+            <a:extLst>
+              <a:ext uri="{FF2B5EF4-FFF2-40B4-BE49-F238E27FC236}">
+                <a16:creationId xmlns:a16="http://schemas.microsoft.com/office/drawing/2014/main" id="{43CD2E05-A496-4565-A7C5-89E74C64D901}"/>
+              </a:ext>
+            </a:extLst>
+          </p:cNvPr>
+          <p:cNvCxnSpPr/>
+          <p:nvPr/>
+        </p:nvCxnSpPr>
+        <p:spPr>
+          <a:xfrm flipV="1">
+            <a:off x="5257218" y="3703214"/>
+            <a:ext cx="922392" cy="1"/>
+          </a:xfrm>
+          <a:prstGeom prst="straightConnector1">
+            <a:avLst/>
+          </a:prstGeom>
+          <a:ln w="19050">
+            <a:solidFill>
+              <a:srgbClr val="0070C0"/>
+            </a:solidFill>
+            <a:tailEnd type="arrow"/>
+          </a:ln>
+        </p:spPr>
+        <p:style>
+          <a:lnRef idx="1">
+            <a:schemeClr val="accent1"/>
+          </a:lnRef>
+          <a:fillRef idx="0">
+            <a:schemeClr val="accent1"/>
+          </a:fillRef>
+          <a:effectRef idx="0">
+            <a:schemeClr val="accent1"/>
+          </a:effectRef>
+          <a:fontRef idx="minor">
+            <a:schemeClr val="tx1"/>
+          </a:fontRef>
+        </p:style>
+      </p:cxnSp>
+      <p:cxnSp>
+        <p:nvCxnSpPr>
+          <p:cNvPr id="17" name="Straight Arrow Connector 16">
+            <a:extLst>
+              <a:ext uri="{FF2B5EF4-FFF2-40B4-BE49-F238E27FC236}">
+                <a16:creationId xmlns:a16="http://schemas.microsoft.com/office/drawing/2014/main" id="{F9BE0DAD-A87B-4EB5-919B-D47830F0AAD4}"/>
+              </a:ext>
+            </a:extLst>
+          </p:cNvPr>
+          <p:cNvCxnSpPr>
+            <a:cxnSpLocks/>
+            <a:endCxn id="12" idx="2"/>
+          </p:cNvCxnSpPr>
+          <p:nvPr/>
+        </p:nvCxnSpPr>
+        <p:spPr>
+          <a:xfrm>
+            <a:off x="5257800" y="4050281"/>
+            <a:ext cx="1837722" cy="0"/>
+          </a:xfrm>
+          <a:prstGeom prst="straightConnector1">
+            <a:avLst/>
+          </a:prstGeom>
+          <a:ln w="19050">
+            <a:solidFill>
+              <a:srgbClr val="0070C0"/>
+            </a:solidFill>
+            <a:prstDash val="sysDash"/>
+            <a:headEnd type="arrow" w="med" len="med"/>
+            <a:tailEnd type="none" w="med" len="med"/>
+          </a:ln>
+        </p:spPr>
+        <p:style>
+          <a:lnRef idx="1">
+            <a:schemeClr val="accent1"/>
+          </a:lnRef>
+          <a:fillRef idx="0">
+            <a:schemeClr val="accent1"/>
+          </a:fillRef>
+          <a:effectRef idx="0">
+            <a:schemeClr val="accent1"/>
+          </a:effectRef>
+          <a:fontRef idx="minor">
+            <a:schemeClr val="tx1"/>
+          </a:fontRef>
+        </p:style>
+      </p:cxnSp>
+      <p:cxnSp>
+        <p:nvCxnSpPr>
+          <p:cNvPr id="18" name="Straight Arrow Connector 17">
+            <a:extLst>
+              <a:ext uri="{FF2B5EF4-FFF2-40B4-BE49-F238E27FC236}">
+                <a16:creationId xmlns:a16="http://schemas.microsoft.com/office/drawing/2014/main" id="{E7CB0B45-F740-48EF-974D-CD43A739EA85}"/>
+              </a:ext>
+            </a:extLst>
+          </p:cNvPr>
+          <p:cNvCxnSpPr/>
+          <p:nvPr/>
+        </p:nvCxnSpPr>
+        <p:spPr>
+          <a:xfrm flipV="1">
+            <a:off x="1661179" y="5085618"/>
+            <a:ext cx="1596514" cy="5378"/>
+          </a:xfrm>
+          <a:prstGeom prst="straightConnector1">
+            <a:avLst/>
+          </a:prstGeom>
+          <a:ln w="19050">
+            <a:solidFill>
+              <a:srgbClr val="0070C0"/>
+            </a:solidFill>
+            <a:prstDash val="sysDash"/>
+            <a:headEnd type="arrow" w="med" len="med"/>
+            <a:tailEnd type="none" w="med" len="med"/>
+          </a:ln>
+        </p:spPr>
+        <p:style>
+          <a:lnRef idx="1">
+            <a:schemeClr val="accent1"/>
+          </a:lnRef>
+          <a:fillRef idx="0">
+            <a:schemeClr val="accent1"/>
+          </a:fillRef>
+          <a:effectRef idx="0">
+            <a:schemeClr val="accent1"/>
+          </a:effectRef>
+          <a:fontRef idx="minor">
+            <a:schemeClr val="tx1"/>
+          </a:fontRef>
+        </p:style>
+      </p:cxnSp>
+      <p:cxnSp>
+        <p:nvCxnSpPr>
+          <p:cNvPr id="19" name="Straight Arrow Connector 18">
+            <a:extLst>
+              <a:ext uri="{FF2B5EF4-FFF2-40B4-BE49-F238E27FC236}">
+                <a16:creationId xmlns:a16="http://schemas.microsoft.com/office/drawing/2014/main" id="{34CD0DB7-9DC4-43A9-9108-6021610D752F}"/>
+              </a:ext>
+            </a:extLst>
+          </p:cNvPr>
+          <p:cNvCxnSpPr/>
+          <p:nvPr/>
+        </p:nvCxnSpPr>
+        <p:spPr>
+          <a:xfrm>
+            <a:off x="304800" y="5791200"/>
+            <a:ext cx="1196051" cy="0"/>
+          </a:xfrm>
+          <a:prstGeom prst="straightConnector1">
+            <a:avLst/>
+          </a:prstGeom>
+          <a:ln w="19050">
+            <a:solidFill>
+              <a:schemeClr val="accent1"/>
+            </a:solidFill>
+            <a:prstDash val="sysDash"/>
+            <a:headEnd type="arrow" w="med" len="med"/>
+            <a:tailEnd type="none" w="med" len="med"/>
+          </a:ln>
+        </p:spPr>
+        <p:style>
+          <a:lnRef idx="1">
+            <a:schemeClr val="accent1"/>
+          </a:lnRef>
+          <a:fillRef idx="0">
+            <a:schemeClr val="accent1"/>
+          </a:fillRef>
+          <a:effectRef idx="0">
+            <a:schemeClr val="accent1"/>
+          </a:effectRef>
+          <a:fontRef idx="minor">
+            <a:schemeClr val="tx1"/>
+          </a:fontRef>
+        </p:style>
+      </p:cxnSp>
+      <p:cxnSp>
+        <p:nvCxnSpPr>
+          <p:cNvPr id="20" name="Straight Arrow Connector 19">
+            <a:extLst>
+              <a:ext uri="{FF2B5EF4-FFF2-40B4-BE49-F238E27FC236}">
+                <a16:creationId xmlns:a16="http://schemas.microsoft.com/office/drawing/2014/main" id="{94D73C4F-5D29-419D-9CE4-0AD6A9A8686C}"/>
+              </a:ext>
+            </a:extLst>
+          </p:cNvPr>
+          <p:cNvCxnSpPr>
+            <a:cxnSpLocks/>
+          </p:cNvCxnSpPr>
+          <p:nvPr/>
+        </p:nvCxnSpPr>
+        <p:spPr>
+          <a:xfrm>
+            <a:off x="3459519" y="4953000"/>
+            <a:ext cx="1600428" cy="0"/>
+          </a:xfrm>
+          <a:prstGeom prst="straightConnector1">
+            <a:avLst/>
+          </a:prstGeom>
+          <a:ln w="19050">
+            <a:solidFill>
+              <a:srgbClr val="0070C0"/>
+            </a:solidFill>
+            <a:prstDash val="sysDash"/>
+            <a:headEnd type="arrow" w="med" len="med"/>
+            <a:tailEnd type="none" w="med" len="med"/>
+          </a:ln>
+        </p:spPr>
+        <p:style>
+          <a:lnRef idx="1">
+            <a:schemeClr val="accent1"/>
+          </a:lnRef>
+          <a:fillRef idx="0">
+            <a:schemeClr val="accent1"/>
+          </a:fillRef>
+          <a:effectRef idx="0">
+            <a:schemeClr val="accent1"/>
+          </a:effectRef>
+          <a:fontRef idx="minor">
+            <a:schemeClr val="tx1"/>
+          </a:fontRef>
+        </p:style>
+      </p:cxnSp>
+      <p:sp>
+        <p:nvSpPr>
+          <p:cNvPr id="21" name="TextBox 20">
+            <a:extLst>
+              <a:ext uri="{FF2B5EF4-FFF2-40B4-BE49-F238E27FC236}">
+                <a16:creationId xmlns:a16="http://schemas.microsoft.com/office/drawing/2014/main" id="{C2E4B815-385D-4FDA-B95B-70E95FC8262A}"/>
+              </a:ext>
+            </a:extLst>
+          </p:cNvPr>
+          <p:cNvSpPr txBox="1"/>
+          <p:nvPr/>
+        </p:nvSpPr>
+        <p:spPr>
+          <a:xfrm>
+            <a:off x="3629363" y="3672116"/>
+            <a:ext cx="985221" cy="184666"/>
+          </a:xfrm>
+          <a:prstGeom prst="rect">
+            <a:avLst/>
+          </a:prstGeom>
+          <a:noFill/>
+        </p:spPr>
+        <p:txBody>
+          <a:bodyPr wrap="square" lIns="0" tIns="0" rIns="0" bIns="0" rtlCol="0">
+            <a:spAutoFit/>
+          </a:bodyPr>
+          <a:lstStyle>
+            <a:defPPr>
+              <a:defRPr lang="en-US"/>
+            </a:defPPr>
+            <a:lvl1pPr algn="r">
+              <a:defRPr sz="1400">
+                <a:solidFill>
+                  <a:srgbClr val="0070C0"/>
+                </a:solidFill>
+              </a:defRPr>
+            </a:lvl1pPr>
+          </a:lstStyle>
+          <a:p>
+            <a:r>
+              <a:rPr lang="en-US" sz="1200" dirty="0"/>
+              <a:t>parse(“m/Jan”)</a:t>
+            </a:r>
+          </a:p>
+        </p:txBody>
+      </p:sp>
+      <p:sp>
+        <p:nvSpPr>
+          <p:cNvPr id="22" name="TextBox 21">
+            <a:extLst>
+              <a:ext uri="{FF2B5EF4-FFF2-40B4-BE49-F238E27FC236}">
+                <a16:creationId xmlns:a16="http://schemas.microsoft.com/office/drawing/2014/main" id="{04DAA476-E2FE-4672-8569-F767D493B7E8}"/>
+              </a:ext>
+            </a:extLst>
+          </p:cNvPr>
+          <p:cNvSpPr txBox="1"/>
+          <p:nvPr/>
+        </p:nvSpPr>
+        <p:spPr>
+          <a:xfrm>
+            <a:off x="1496855" y="2850922"/>
+            <a:ext cx="1670973" cy="215444"/>
+          </a:xfrm>
+          <a:prstGeom prst="rect">
+            <a:avLst/>
+          </a:prstGeom>
+          <a:noFill/>
+        </p:spPr>
+        <p:txBody>
+          <a:bodyPr wrap="square" lIns="0" tIns="0" rIns="0" bIns="0" rtlCol="0">
+            <a:spAutoFit/>
+          </a:bodyPr>
+          <a:lstStyle>
+            <a:defPPr>
+              <a:defRPr lang="en-US"/>
+            </a:defPPr>
+            <a:lvl1pPr algn="r">
+              <a:defRPr sz="1400">
+                <a:solidFill>
+                  <a:srgbClr val="0070C0"/>
+                </a:solidFill>
+              </a:defRPr>
+            </a:lvl1pPr>
+          </a:lstStyle>
+          <a:p>
+            <a:r>
+              <a:rPr lang="en-US" dirty="0"/>
+              <a:t>parse(“Find m/Jan”)</a:t>
+            </a:r>
+          </a:p>
+        </p:txBody>
+      </p:sp>
+      <p:sp>
+        <p:nvSpPr>
+          <p:cNvPr id="23" name="TextBox 22">
+            <a:extLst>
+              <a:ext uri="{FF2B5EF4-FFF2-40B4-BE49-F238E27FC236}">
+                <a16:creationId xmlns:a16="http://schemas.microsoft.com/office/drawing/2014/main" id="{42FF5761-8509-41D6-9388-84963A5B4880}"/>
+              </a:ext>
+            </a:extLst>
+          </p:cNvPr>
+          <p:cNvSpPr txBox="1"/>
+          <p:nvPr/>
+        </p:nvSpPr>
+        <p:spPr>
+          <a:xfrm>
+            <a:off x="6199817" y="4572000"/>
+            <a:ext cx="612862" cy="220903"/>
+          </a:xfrm>
+          <a:prstGeom prst="rect">
+            <a:avLst/>
+          </a:prstGeom>
+          <a:noFill/>
+        </p:spPr>
+        <p:txBody>
+          <a:bodyPr wrap="square" lIns="0" tIns="0" rIns="0" bIns="0" rtlCol="0">
+            <a:spAutoFit/>
+          </a:bodyPr>
+          <a:lstStyle>
+            <a:defPPr>
+              <a:defRPr lang="en-US"/>
+            </a:defPPr>
+            <a:lvl1pPr algn="r">
+              <a:defRPr sz="1400">
+                <a:solidFill>
+                  <a:srgbClr val="0070C0"/>
+                </a:solidFill>
+              </a:defRPr>
+            </a:lvl1pPr>
+          </a:lstStyle>
+          <a:p>
+            <a:r>
+              <a:rPr lang="en-US" dirty="0"/>
+              <a:t>return</a:t>
+            </a:r>
+          </a:p>
+        </p:txBody>
+      </p:sp>
+      <p:sp>
+        <p:nvSpPr>
+          <p:cNvPr id="24" name="TextBox 23">
+            <a:extLst>
+              <a:ext uri="{FF2B5EF4-FFF2-40B4-BE49-F238E27FC236}">
+                <a16:creationId xmlns:a16="http://schemas.microsoft.com/office/drawing/2014/main" id="{8F6AFC30-3DFC-4EDD-A34B-A00F2AF239EA}"/>
+              </a:ext>
+            </a:extLst>
+          </p:cNvPr>
+          <p:cNvSpPr txBox="1"/>
+          <p:nvPr/>
+        </p:nvSpPr>
+        <p:spPr>
+          <a:xfrm>
+            <a:off x="599983" y="5538488"/>
+            <a:ext cx="762000" cy="215444"/>
+          </a:xfrm>
+          <a:prstGeom prst="rect">
+            <a:avLst/>
+          </a:prstGeom>
+          <a:noFill/>
+        </p:spPr>
+        <p:txBody>
+          <a:bodyPr wrap="square" lIns="0" tIns="0" rIns="0" bIns="0" rtlCol="0">
+            <a:spAutoFit/>
+          </a:bodyPr>
+          <a:lstStyle>
+            <a:defPPr>
+              <a:defRPr lang="en-US"/>
+            </a:defPPr>
+            <a:lvl1pPr algn="r">
+              <a:defRPr sz="1400">
+                <a:solidFill>
+                  <a:srgbClr val="0070C0"/>
+                </a:solidFill>
+              </a:defRPr>
+            </a:lvl1pPr>
+          </a:lstStyle>
+          <a:p>
+            <a:r>
+              <a:rPr lang="en-US" dirty="0"/>
+              <a:t>return</a:t>
+            </a:r>
+          </a:p>
+        </p:txBody>
+      </p:sp>
+      <p:sp>
+        <p:nvSpPr>
+          <p:cNvPr id="25" name="Rectangle 62">
+            <a:extLst>
+              <a:ext uri="{FF2B5EF4-FFF2-40B4-BE49-F238E27FC236}">
+                <a16:creationId xmlns:a16="http://schemas.microsoft.com/office/drawing/2014/main" id="{DD40B97D-46BE-453C-8377-64E87EF65281}"/>
+              </a:ext>
+            </a:extLst>
+          </p:cNvPr>
+          <p:cNvSpPr/>
+          <p:nvPr/>
+        </p:nvSpPr>
+        <p:spPr>
+          <a:xfrm>
+            <a:off x="6180361" y="3285484"/>
+            <a:ext cx="1805569" cy="461538"/>
+          </a:xfrm>
+          <a:prstGeom prst="rect">
+            <a:avLst/>
+          </a:prstGeom>
+          <a:solidFill>
+            <a:srgbClr val="0070C0"/>
+          </a:solidFill>
+          <a:ln w="19050">
+            <a:solidFill>
+              <a:srgbClr val="0070C0"/>
+            </a:solidFill>
+          </a:ln>
+          <a:effectLst/>
+        </p:spPr>
+        <p:style>
+          <a:lnRef idx="1">
+            <a:schemeClr val="accent2"/>
+          </a:lnRef>
+          <a:fillRef idx="2">
+            <a:schemeClr val="accent2"/>
+          </a:fillRef>
+          <a:effectRef idx="1">
+            <a:schemeClr val="accent2"/>
+          </a:effectRef>
+          <a:fontRef idx="minor">
+            <a:schemeClr val="dk1"/>
+          </a:fontRef>
+        </p:style>
+        <p:txBody>
+          <a:bodyPr rtlCol="0" anchor="ctr"/>
+          <a:lstStyle/>
+          <a:p>
+            <a:pPr algn="ctr"/>
+            <a:r>
+              <a:rPr lang="en-US" sz="1600" dirty="0">
+                <a:solidFill>
+                  <a:schemeClr val="bg1"/>
+                </a:solidFill>
+              </a:rPr>
+              <a:t>:</a:t>
+            </a:r>
+            <a:r>
+              <a:rPr lang="en-US" sz="1600" dirty="0" err="1">
+                <a:solidFill>
+                  <a:schemeClr val="bg1"/>
+                </a:solidFill>
+              </a:rPr>
+              <a:t>PersonContains</a:t>
+            </a:r>
+            <a:endParaRPr lang="en-US" sz="1600" dirty="0">
+              <a:solidFill>
+                <a:schemeClr val="bg1"/>
+              </a:solidFill>
+            </a:endParaRPr>
+          </a:p>
+          <a:p>
+            <a:pPr algn="ctr"/>
+            <a:r>
+              <a:rPr lang="en-US" sz="1600" dirty="0" err="1">
+                <a:solidFill>
+                  <a:schemeClr val="bg1"/>
+                </a:solidFill>
+              </a:rPr>
+              <a:t>KeywordsPredicate</a:t>
+            </a:r>
+            <a:endParaRPr lang="en-SG" sz="1600" dirty="0">
+              <a:solidFill>
+                <a:schemeClr val="bg1"/>
+              </a:solidFill>
+            </a:endParaRPr>
+          </a:p>
+        </p:txBody>
+      </p:sp>
+      <p:sp>
+        <p:nvSpPr>
+          <p:cNvPr id="26" name="Rectangle 25">
+            <a:extLst>
+              <a:ext uri="{FF2B5EF4-FFF2-40B4-BE49-F238E27FC236}">
+                <a16:creationId xmlns:a16="http://schemas.microsoft.com/office/drawing/2014/main" id="{9BD384D3-C06A-492B-BA0D-34D7285B6FA6}"/>
+              </a:ext>
+            </a:extLst>
+          </p:cNvPr>
+          <p:cNvSpPr/>
+          <p:nvPr/>
+        </p:nvSpPr>
+        <p:spPr>
+          <a:xfrm>
+            <a:off x="8328678" y="4439155"/>
+            <a:ext cx="212364" cy="361445"/>
+          </a:xfrm>
+          <a:prstGeom prst="rect">
+            <a:avLst/>
+          </a:prstGeom>
+          <a:solidFill>
+            <a:srgbClr val="0070C0"/>
+          </a:solidFill>
+          <a:ln>
+            <a:solidFill>
+              <a:srgbClr val="0070C0"/>
+            </a:solidFill>
+          </a:ln>
+          <a:effectLst/>
+        </p:spPr>
+        <p:style>
+          <a:lnRef idx="1">
+            <a:schemeClr val="accent3"/>
+          </a:lnRef>
+          <a:fillRef idx="2">
+            <a:schemeClr val="accent3"/>
+          </a:fillRef>
+          <a:effectRef idx="1">
+            <a:schemeClr val="accent3"/>
+          </a:effectRef>
+          <a:fontRef idx="minor">
+            <a:schemeClr val="dk1"/>
+          </a:fontRef>
+        </p:style>
+        <p:txBody>
+          <a:bodyPr rtlCol="0" anchor="ctr"/>
+          <a:lstStyle/>
+          <a:p>
+            <a:pPr algn="ctr"/>
+            <a:endParaRPr lang="en-SG" sz="1400"/>
+          </a:p>
+        </p:txBody>
+      </p:sp>
+      <p:cxnSp>
+        <p:nvCxnSpPr>
+          <p:cNvPr id="27" name="Straight Arrow Connector 26">
+            <a:extLst>
+              <a:ext uri="{FF2B5EF4-FFF2-40B4-BE49-F238E27FC236}">
+                <a16:creationId xmlns:a16="http://schemas.microsoft.com/office/drawing/2014/main" id="{66219504-475F-423F-995D-59BCBB64B54F}"/>
+              </a:ext>
+            </a:extLst>
+          </p:cNvPr>
+          <p:cNvCxnSpPr>
+            <a:cxnSpLocks/>
+          </p:cNvCxnSpPr>
+          <p:nvPr/>
+        </p:nvCxnSpPr>
+        <p:spPr>
+          <a:xfrm>
+            <a:off x="5239068" y="4800600"/>
+            <a:ext cx="3089610" cy="0"/>
+          </a:xfrm>
+          <a:prstGeom prst="straightConnector1">
+            <a:avLst/>
+          </a:prstGeom>
+          <a:ln w="19050">
+            <a:solidFill>
+              <a:srgbClr val="0070C0"/>
+            </a:solidFill>
+            <a:prstDash val="sysDash"/>
+            <a:headEnd type="arrow" w="med" len="med"/>
+            <a:tailEnd type="none" w="med" len="med"/>
+          </a:ln>
+        </p:spPr>
+        <p:style>
+          <a:lnRef idx="1">
+            <a:schemeClr val="accent1"/>
+          </a:lnRef>
+          <a:fillRef idx="0">
+            <a:schemeClr val="accent1"/>
+          </a:fillRef>
+          <a:effectRef idx="0">
+            <a:schemeClr val="accent1"/>
+          </a:effectRef>
+          <a:fontRef idx="minor">
+            <a:schemeClr val="tx1"/>
+          </a:fontRef>
+        </p:style>
+      </p:cxnSp>
+      <p:sp>
+        <p:nvSpPr>
+          <p:cNvPr id="28" name="Rectangle 62">
+            <a:extLst>
+              <a:ext uri="{FF2B5EF4-FFF2-40B4-BE49-F238E27FC236}">
+                <a16:creationId xmlns:a16="http://schemas.microsoft.com/office/drawing/2014/main" id="{E4BD8BF9-938E-4935-9C2A-5399FDBBDFC0}"/>
+              </a:ext>
+            </a:extLst>
+          </p:cNvPr>
+          <p:cNvSpPr/>
+          <p:nvPr/>
+        </p:nvSpPr>
+        <p:spPr>
+          <a:xfrm>
+            <a:off x="4231981" y="2929839"/>
+            <a:ext cx="1778201" cy="432035"/>
+          </a:xfrm>
+          <a:prstGeom prst="rect">
+            <a:avLst/>
+          </a:prstGeom>
+          <a:solidFill>
+            <a:srgbClr val="0070C0"/>
+          </a:solidFill>
+          <a:ln w="19050">
+            <a:solidFill>
+              <a:srgbClr val="0070C0"/>
+            </a:solidFill>
+          </a:ln>
+          <a:effectLst/>
+        </p:spPr>
+        <p:style>
+          <a:lnRef idx="1">
+            <a:schemeClr val="accent2"/>
+          </a:lnRef>
+          <a:fillRef idx="2">
+            <a:schemeClr val="accent2"/>
+          </a:fillRef>
+          <a:effectRef idx="1">
+            <a:schemeClr val="accent2"/>
+          </a:effectRef>
+          <a:fontRef idx="minor">
+            <a:schemeClr val="dk1"/>
+          </a:fontRef>
+        </p:style>
+        <p:txBody>
+          <a:bodyPr rtlCol="0" anchor="ctr"/>
+          <a:lstStyle/>
+          <a:p>
+            <a:pPr algn="ctr"/>
+            <a:r>
+              <a:rPr lang="en-US" sz="1600" dirty="0">
+                <a:solidFill>
+                  <a:schemeClr val="bg1"/>
+                </a:solidFill>
+              </a:rPr>
+              <a:t>:</a:t>
+            </a:r>
+            <a:r>
+              <a:rPr lang="en-US" sz="1600" dirty="0" err="1">
+                <a:solidFill>
+                  <a:schemeClr val="bg1"/>
+                </a:solidFill>
+              </a:rPr>
+              <a:t>FindCommand</a:t>
+            </a:r>
+            <a:endParaRPr lang="en-US" sz="1600" dirty="0">
+              <a:solidFill>
+                <a:schemeClr val="bg1"/>
+              </a:solidFill>
+            </a:endParaRPr>
+          </a:p>
+          <a:p>
+            <a:pPr algn="ctr"/>
+            <a:r>
+              <a:rPr lang="en-US" sz="1600" dirty="0">
+                <a:solidFill>
+                  <a:schemeClr val="bg1"/>
+                </a:solidFill>
+              </a:rPr>
+              <a:t>Parser</a:t>
+            </a:r>
+            <a:endParaRPr lang="en-SG" sz="1600" dirty="0">
+              <a:solidFill>
+                <a:schemeClr val="bg1"/>
+              </a:solidFill>
+            </a:endParaRPr>
+          </a:p>
+        </p:txBody>
+      </p:sp>
+      <p:cxnSp>
+        <p:nvCxnSpPr>
+          <p:cNvPr id="29" name="Straight Arrow Connector 28">
+            <a:extLst>
+              <a:ext uri="{FF2B5EF4-FFF2-40B4-BE49-F238E27FC236}">
+                <a16:creationId xmlns:a16="http://schemas.microsoft.com/office/drawing/2014/main" id="{78B2ABB3-56CB-4DB5-A1CA-6CD9AF41DE50}"/>
+              </a:ext>
+            </a:extLst>
+          </p:cNvPr>
+          <p:cNvCxnSpPr/>
+          <p:nvPr/>
+        </p:nvCxnSpPr>
+        <p:spPr>
+          <a:xfrm>
+            <a:off x="3462591" y="3657600"/>
+            <a:ext cx="1597356" cy="1"/>
+          </a:xfrm>
+          <a:prstGeom prst="straightConnector1">
+            <a:avLst/>
+          </a:prstGeom>
+          <a:ln w="19050">
+            <a:headEnd type="none" w="med" len="med"/>
+            <a:tailEnd type="arrow" w="med" len="med"/>
+          </a:ln>
+        </p:spPr>
+        <p:style>
+          <a:lnRef idx="1">
+            <a:schemeClr val="accent1"/>
+          </a:lnRef>
+          <a:fillRef idx="0">
+            <a:schemeClr val="accent1"/>
+          </a:fillRef>
+          <a:effectRef idx="0">
+            <a:schemeClr val="accent1"/>
+          </a:effectRef>
+          <a:fontRef idx="minor">
+            <a:schemeClr val="tx1"/>
+          </a:fontRef>
+        </p:style>
+      </p:cxnSp>
+      <p:sp>
+        <p:nvSpPr>
+          <p:cNvPr id="30" name="Rectangle 29">
+            <a:extLst>
+              <a:ext uri="{FF2B5EF4-FFF2-40B4-BE49-F238E27FC236}">
+                <a16:creationId xmlns:a16="http://schemas.microsoft.com/office/drawing/2014/main" id="{069116DF-3044-405B-8DC7-3DB8020B3684}"/>
+              </a:ext>
+            </a:extLst>
+          </p:cNvPr>
+          <p:cNvSpPr/>
+          <p:nvPr/>
+        </p:nvSpPr>
+        <p:spPr>
+          <a:xfrm>
+            <a:off x="5059947" y="3352800"/>
+            <a:ext cx="205843" cy="123165"/>
+          </a:xfrm>
+          <a:prstGeom prst="rect">
+            <a:avLst/>
+          </a:prstGeom>
+          <a:solidFill>
+            <a:srgbClr val="0070C0"/>
+          </a:solidFill>
+          <a:ln>
+            <a:solidFill>
+              <a:srgbClr val="0070C0"/>
+            </a:solidFill>
+          </a:ln>
+          <a:effectLst/>
+        </p:spPr>
+        <p:style>
+          <a:lnRef idx="1">
+            <a:schemeClr val="accent3"/>
+          </a:lnRef>
+          <a:fillRef idx="2">
+            <a:schemeClr val="accent3"/>
+          </a:fillRef>
+          <a:effectRef idx="1">
+            <a:schemeClr val="accent3"/>
+          </a:effectRef>
+          <a:fontRef idx="minor">
+            <a:schemeClr val="dk1"/>
+          </a:fontRef>
+        </p:style>
+        <p:txBody>
+          <a:bodyPr rtlCol="0" anchor="ctr"/>
+          <a:lstStyle/>
+          <a:p>
+            <a:pPr algn="ctr"/>
+            <a:endParaRPr lang="en-SG" sz="1400"/>
+          </a:p>
+        </p:txBody>
+      </p:sp>
+      <p:cxnSp>
+        <p:nvCxnSpPr>
+          <p:cNvPr id="31" name="Straight Connector 30">
+            <a:extLst>
+              <a:ext uri="{FF2B5EF4-FFF2-40B4-BE49-F238E27FC236}">
+                <a16:creationId xmlns:a16="http://schemas.microsoft.com/office/drawing/2014/main" id="{8CC8892C-1EB2-406B-9A62-5DFCE0B20B66}"/>
+              </a:ext>
+            </a:extLst>
+          </p:cNvPr>
+          <p:cNvCxnSpPr>
+            <a:cxnSpLocks/>
+            <a:stCxn id="30" idx="0"/>
+          </p:cNvCxnSpPr>
+          <p:nvPr/>
+        </p:nvCxnSpPr>
+        <p:spPr>
+          <a:xfrm>
+            <a:off x="5162869" y="3352800"/>
+            <a:ext cx="0" cy="1905000"/>
+          </a:xfrm>
+          <a:prstGeom prst="line">
+            <a:avLst/>
+          </a:prstGeom>
+          <a:ln w="19050">
+            <a:solidFill>
+              <a:srgbClr val="0070C0"/>
+            </a:solidFill>
+            <a:prstDash val="sysDash"/>
+          </a:ln>
+          <a:effectLst/>
+        </p:spPr>
+        <p:style>
+          <a:lnRef idx="1">
+            <a:schemeClr val="accent1"/>
+          </a:lnRef>
+          <a:fillRef idx="2">
+            <a:schemeClr val="accent1"/>
+          </a:fillRef>
+          <a:effectRef idx="1">
+            <a:schemeClr val="accent1"/>
+          </a:effectRef>
+          <a:fontRef idx="minor">
+            <a:schemeClr val="dk1"/>
+          </a:fontRef>
+        </p:style>
+      </p:cxnSp>
+      <p:sp>
+        <p:nvSpPr>
+          <p:cNvPr id="32" name="Rectangle 31">
+            <a:extLst>
+              <a:ext uri="{FF2B5EF4-FFF2-40B4-BE49-F238E27FC236}">
+                <a16:creationId xmlns:a16="http://schemas.microsoft.com/office/drawing/2014/main" id="{6F1A4B01-1C89-4CD2-BF08-1BA7E1DDC33F}"/>
+              </a:ext>
+            </a:extLst>
+          </p:cNvPr>
+          <p:cNvSpPr/>
+          <p:nvPr/>
+        </p:nvSpPr>
+        <p:spPr>
+          <a:xfrm>
+            <a:off x="5059948" y="3657600"/>
+            <a:ext cx="179120" cy="1342557"/>
+          </a:xfrm>
+          <a:prstGeom prst="rect">
+            <a:avLst/>
+          </a:prstGeom>
+          <a:solidFill>
+            <a:srgbClr val="0070C0"/>
+          </a:solidFill>
+          <a:ln>
+            <a:solidFill>
+              <a:srgbClr val="0070C0"/>
+            </a:solidFill>
+          </a:ln>
+          <a:effectLst/>
+        </p:spPr>
+        <p:style>
+          <a:lnRef idx="1">
+            <a:schemeClr val="accent3"/>
+          </a:lnRef>
+          <a:fillRef idx="2">
+            <a:schemeClr val="accent3"/>
+          </a:fillRef>
+          <a:effectRef idx="1">
+            <a:schemeClr val="accent3"/>
+          </a:effectRef>
+          <a:fontRef idx="minor">
+            <a:schemeClr val="dk1"/>
+          </a:fontRef>
+        </p:style>
+        <p:txBody>
+          <a:bodyPr rtlCol="0" anchor="ctr"/>
+          <a:lstStyle/>
+          <a:p>
+            <a:pPr algn="ctr"/>
+            <a:endParaRPr lang="en-SG" sz="1400"/>
+          </a:p>
+        </p:txBody>
+      </p:sp>
+      <p:cxnSp>
+        <p:nvCxnSpPr>
+          <p:cNvPr id="33" name="Straight Arrow Connector 32">
+            <a:extLst>
+              <a:ext uri="{FF2B5EF4-FFF2-40B4-BE49-F238E27FC236}">
+                <a16:creationId xmlns:a16="http://schemas.microsoft.com/office/drawing/2014/main" id="{EADA1660-D66B-4AF5-BFD2-E6031D0DA384}"/>
+              </a:ext>
+            </a:extLst>
+          </p:cNvPr>
+          <p:cNvCxnSpPr>
+            <a:cxnSpLocks/>
+          </p:cNvCxnSpPr>
+          <p:nvPr/>
+        </p:nvCxnSpPr>
+        <p:spPr>
+          <a:xfrm>
+            <a:off x="5257800" y="4495800"/>
+            <a:ext cx="3070878" cy="0"/>
+          </a:xfrm>
+          <a:prstGeom prst="straightConnector1">
+            <a:avLst/>
+          </a:prstGeom>
+          <a:ln w="19050">
+            <a:headEnd type="none" w="med" len="med"/>
+            <a:tailEnd type="arrow" w="med" len="med"/>
+          </a:ln>
+        </p:spPr>
+        <p:style>
+          <a:lnRef idx="1">
+            <a:schemeClr val="accent1"/>
+          </a:lnRef>
+          <a:fillRef idx="0">
+            <a:schemeClr val="accent1"/>
+          </a:fillRef>
+          <a:effectRef idx="0">
+            <a:schemeClr val="accent1"/>
+          </a:effectRef>
+          <a:fontRef idx="minor">
+            <a:schemeClr val="tx1"/>
+          </a:fontRef>
+        </p:style>
+      </p:cxnSp>
+      <p:cxnSp>
+        <p:nvCxnSpPr>
+          <p:cNvPr id="34" name="Straight Arrow Connector 33">
+            <a:extLst>
+              <a:ext uri="{FF2B5EF4-FFF2-40B4-BE49-F238E27FC236}">
+                <a16:creationId xmlns:a16="http://schemas.microsoft.com/office/drawing/2014/main" id="{E1EADD01-18F0-4307-B5C5-F2C58C1BE1CD}"/>
+              </a:ext>
+            </a:extLst>
+          </p:cNvPr>
+          <p:cNvCxnSpPr/>
+          <p:nvPr/>
+        </p:nvCxnSpPr>
+        <p:spPr>
+          <a:xfrm>
+            <a:off x="3412425" y="3173004"/>
+            <a:ext cx="819556" cy="1"/>
+          </a:xfrm>
+          <a:prstGeom prst="straightConnector1">
+            <a:avLst/>
+          </a:prstGeom>
+          <a:ln w="19050">
+            <a:solidFill>
+              <a:srgbClr val="0070C0"/>
+            </a:solidFill>
+            <a:tailEnd type="arrow"/>
+          </a:ln>
+        </p:spPr>
+        <p:style>
+          <a:lnRef idx="1">
+            <a:schemeClr val="accent1"/>
+          </a:lnRef>
+          <a:fillRef idx="0">
+            <a:schemeClr val="accent1"/>
+          </a:fillRef>
+          <a:effectRef idx="0">
+            <a:schemeClr val="accent1"/>
+          </a:effectRef>
+          <a:fontRef idx="minor">
+            <a:schemeClr val="tx1"/>
+          </a:fontRef>
+        </p:style>
+      </p:cxnSp>
+      <p:cxnSp>
+        <p:nvCxnSpPr>
+          <p:cNvPr id="35" name="Straight Arrow Connector 34">
+            <a:extLst>
+              <a:ext uri="{FF2B5EF4-FFF2-40B4-BE49-F238E27FC236}">
+                <a16:creationId xmlns:a16="http://schemas.microsoft.com/office/drawing/2014/main" id="{550C72B9-4515-4205-9C1A-CA61DE04350F}"/>
+              </a:ext>
+            </a:extLst>
+          </p:cNvPr>
+          <p:cNvCxnSpPr/>
+          <p:nvPr/>
+        </p:nvCxnSpPr>
+        <p:spPr>
+          <a:xfrm>
+            <a:off x="3459519" y="3475965"/>
+            <a:ext cx="1600428" cy="0"/>
+          </a:xfrm>
+          <a:prstGeom prst="straightConnector1">
+            <a:avLst/>
+          </a:prstGeom>
+          <a:ln w="19050">
+            <a:solidFill>
+              <a:srgbClr val="0070C0"/>
+            </a:solidFill>
+            <a:prstDash val="sysDash"/>
+            <a:headEnd type="arrow" w="med" len="med"/>
+            <a:tailEnd type="none" w="med" len="med"/>
+          </a:ln>
+        </p:spPr>
+        <p:style>
+          <a:lnRef idx="1">
+            <a:schemeClr val="accent1"/>
+          </a:lnRef>
+          <a:fillRef idx="0">
+            <a:schemeClr val="accent1"/>
+          </a:fillRef>
+          <a:effectRef idx="0">
+            <a:schemeClr val="accent1"/>
+          </a:effectRef>
+          <a:fontRef idx="minor">
+            <a:schemeClr val="tx1"/>
+          </a:fontRef>
+        </p:style>
+      </p:cxnSp>
+      <p:cxnSp>
+        <p:nvCxnSpPr>
+          <p:cNvPr id="36" name="Straight Connector 35">
+            <a:extLst>
+              <a:ext uri="{FF2B5EF4-FFF2-40B4-BE49-F238E27FC236}">
+                <a16:creationId xmlns:a16="http://schemas.microsoft.com/office/drawing/2014/main" id="{DFDFD1BC-65A0-43B3-8FA4-BA3FE9CBB57E}"/>
+              </a:ext>
+            </a:extLst>
+          </p:cNvPr>
+          <p:cNvCxnSpPr>
+            <a:cxnSpLocks/>
+            <a:stCxn id="10" idx="2"/>
+          </p:cNvCxnSpPr>
+          <p:nvPr/>
+        </p:nvCxnSpPr>
+        <p:spPr>
+          <a:xfrm>
+            <a:off x="8442794" y="4267200"/>
+            <a:ext cx="0" cy="1271288"/>
+          </a:xfrm>
+          <a:prstGeom prst="line">
+            <a:avLst/>
+          </a:prstGeom>
+          <a:ln w="19050">
+            <a:solidFill>
+              <a:srgbClr val="0070C0"/>
+            </a:solidFill>
+            <a:prstDash val="sysDash"/>
+          </a:ln>
+          <a:effectLst/>
+        </p:spPr>
+        <p:style>
+          <a:lnRef idx="1">
+            <a:schemeClr val="accent1"/>
+          </a:lnRef>
+          <a:fillRef idx="2">
+            <a:schemeClr val="accent1"/>
+          </a:fillRef>
+          <a:effectRef idx="1">
+            <a:schemeClr val="accent1"/>
+          </a:effectRef>
+          <a:fontRef idx="minor">
+            <a:schemeClr val="dk1"/>
+          </a:fontRef>
+        </p:style>
+      </p:cxnSp>
+      <p:sp>
+        <p:nvSpPr>
+          <p:cNvPr id="37" name="TextBox 36">
+            <a:extLst>
+              <a:ext uri="{FF2B5EF4-FFF2-40B4-BE49-F238E27FC236}">
+                <a16:creationId xmlns:a16="http://schemas.microsoft.com/office/drawing/2014/main" id="{F847444C-9F09-4433-A673-AC81888331EC}"/>
+              </a:ext>
+            </a:extLst>
+          </p:cNvPr>
+          <p:cNvSpPr txBox="1"/>
+          <p:nvPr/>
+        </p:nvSpPr>
+        <p:spPr>
+          <a:xfrm>
+            <a:off x="3978703" y="4732097"/>
+            <a:ext cx="612862" cy="220903"/>
+          </a:xfrm>
+          <a:prstGeom prst="rect">
+            <a:avLst/>
+          </a:prstGeom>
+          <a:noFill/>
+        </p:spPr>
+        <p:txBody>
+          <a:bodyPr wrap="square" lIns="0" tIns="0" rIns="0" bIns="0" rtlCol="0">
+            <a:spAutoFit/>
+          </a:bodyPr>
+          <a:lstStyle>
+            <a:defPPr>
+              <a:defRPr lang="en-US"/>
+            </a:defPPr>
+            <a:lvl1pPr algn="r">
+              <a:defRPr sz="1400">
+                <a:solidFill>
+                  <a:srgbClr val="0070C0"/>
+                </a:solidFill>
+              </a:defRPr>
+            </a:lvl1pPr>
+          </a:lstStyle>
+          <a:p>
+            <a:r>
+              <a:rPr lang="en-US" dirty="0"/>
+              <a:t>return</a:t>
+            </a:r>
+          </a:p>
+        </p:txBody>
+      </p:sp>
+      <p:sp>
+        <p:nvSpPr>
+          <p:cNvPr id="38" name="TextBox 37">
+            <a:extLst>
+              <a:ext uri="{FF2B5EF4-FFF2-40B4-BE49-F238E27FC236}">
+                <a16:creationId xmlns:a16="http://schemas.microsoft.com/office/drawing/2014/main" id="{8688ECD7-AAB3-46AB-8729-AE9F1307AEF8}"/>
+              </a:ext>
+            </a:extLst>
+          </p:cNvPr>
+          <p:cNvSpPr txBox="1"/>
+          <p:nvPr/>
+        </p:nvSpPr>
+        <p:spPr>
+          <a:xfrm>
+            <a:off x="2130338" y="4867404"/>
+            <a:ext cx="612862" cy="220903"/>
+          </a:xfrm>
+          <a:prstGeom prst="rect">
+            <a:avLst/>
+          </a:prstGeom>
+          <a:noFill/>
+        </p:spPr>
+        <p:txBody>
+          <a:bodyPr wrap="square" lIns="0" tIns="0" rIns="0" bIns="0" rtlCol="0">
+            <a:spAutoFit/>
+          </a:bodyPr>
+          <a:lstStyle>
+            <a:defPPr>
+              <a:defRPr lang="en-US"/>
+            </a:defPPr>
+            <a:lvl1pPr algn="r">
+              <a:defRPr sz="1400">
+                <a:solidFill>
+                  <a:srgbClr val="0070C0"/>
+                </a:solidFill>
+              </a:defRPr>
+            </a:lvl1pPr>
+          </a:lstStyle>
+          <a:p>
+            <a:r>
+              <a:rPr lang="en-US" dirty="0"/>
+              <a:t>return</a:t>
+            </a:r>
+          </a:p>
+        </p:txBody>
+      </p:sp>
+    </p:spTree>
+    <p:extLst>
+      <p:ext uri="{BB962C8B-B14F-4D97-AF65-F5344CB8AC3E}">
+        <p14:creationId xmlns:p14="http://schemas.microsoft.com/office/powerpoint/2010/main" val="635406673"/>
+      </p:ext>
+    </p:extLst>
+  </p:cSld>
+  <p:clrMapOvr>
+    <a:masterClrMapping/>
+  </p:clrMapOvr>
+</p:sld>
+</file>
+
+<file path=ppt/slides/slide8.xml><?xml version="1.0" encoding="utf-8"?>
+<p:sld xmlns:a="http://schemas.openxmlformats.org/drawingml/2006/main" xmlns:r="http://schemas.openxmlformats.org/officeDocument/2006/relationships" xmlns:p="http://schemas.openxmlformats.org/presentationml/2006/main">
+  <p:cSld>
+    <p:spTree>
+      <p:nvGrpSpPr>
+        <p:cNvPr id="1" name=""/>
+        <p:cNvGrpSpPr/>
+        <p:nvPr/>
+      </p:nvGrpSpPr>
+      <p:grpSpPr>
+        <a:xfrm>
+          <a:off x="0" y="0"/>
+          <a:ext cx="0" cy="0"/>
+          <a:chOff x="0" y="0"/>
+          <a:chExt cx="0" cy="0"/>
+        </a:xfrm>
+      </p:grpSpPr>
+      <p:grpSp>
+        <p:nvGrpSpPr>
+          <p:cNvPr id="88" name="Group 87">
+            <a:extLst>
+              <a:ext uri="{FF2B5EF4-FFF2-40B4-BE49-F238E27FC236}">
+                <a16:creationId xmlns:a16="http://schemas.microsoft.com/office/drawing/2014/main" id="{66A559FD-C3AD-4BEC-9C86-49C440D0C16D}"/>
+              </a:ext>
+            </a:extLst>
+          </p:cNvPr>
+          <p:cNvGrpSpPr/>
+          <p:nvPr/>
+        </p:nvGrpSpPr>
+        <p:grpSpPr>
+          <a:xfrm>
+            <a:off x="1937610" y="2143350"/>
+            <a:ext cx="6368190" cy="4071730"/>
+            <a:chOff x="1937610" y="2143350"/>
+            <a:chExt cx="6368190" cy="4071730"/>
+          </a:xfrm>
+        </p:grpSpPr>
+        <p:sp>
+          <p:nvSpPr>
+            <p:cNvPr id="81" name="Rectangle 65"/>
+            <p:cNvSpPr/>
+            <p:nvPr/>
+          </p:nvSpPr>
+          <p:spPr>
+            <a:xfrm>
+              <a:off x="2547210" y="2143350"/>
+              <a:ext cx="4343399" cy="4000286"/>
+            </a:xfrm>
+            <a:prstGeom prst="roundRect">
+              <a:avLst>
+                <a:gd name="adj" fmla="val 3484"/>
+              </a:avLst>
+            </a:prstGeom>
+            <a:solidFill>
+              <a:schemeClr val="accent1">
+                <a:lumMod val="20000"/>
+                <a:lumOff val="80000"/>
+              </a:schemeClr>
+            </a:solidFill>
+            <a:ln w="19050">
+              <a:noFill/>
+            </a:ln>
+            <a:effectLst/>
+          </p:spPr>
+          <p:style>
+            <a:lnRef idx="1">
+              <a:schemeClr val="accent2"/>
+            </a:lnRef>
+            <a:fillRef idx="2">
+              <a:schemeClr val="accent2"/>
+            </a:fillRef>
+            <a:effectRef idx="1">
+              <a:schemeClr val="accent2"/>
+            </a:effectRef>
+            <a:fontRef idx="minor">
+              <a:schemeClr val="dk1"/>
+            </a:fontRef>
+          </p:style>
+          <p:txBody>
+            <a:bodyPr rtlCol="0" anchor="t"/>
+            <a:lstStyle/>
+            <a:p>
+              <a:r>
+                <a:rPr lang="en-US" sz="1200" b="1" dirty="0">
+                  <a:solidFill>
+                    <a:srgbClr val="0070C0"/>
+                  </a:solidFill>
+                </a:rPr>
+                <a:t>Logic</a:t>
+              </a:r>
+              <a:endParaRPr lang="en-SG" sz="1200" b="1" dirty="0">
+                <a:solidFill>
+                  <a:srgbClr val="0070C0"/>
+                </a:solidFill>
+              </a:endParaRPr>
+            </a:p>
+          </p:txBody>
+        </p:sp>
+        <p:sp>
+          <p:nvSpPr>
+            <p:cNvPr id="19" name="Rectangle 62"/>
+            <p:cNvSpPr/>
+            <p:nvPr/>
+          </p:nvSpPr>
+          <p:spPr>
+            <a:xfrm>
+              <a:off x="3156810" y="2214794"/>
+              <a:ext cx="1093635" cy="690556"/>
+            </a:xfrm>
+            <a:prstGeom prst="rect">
+              <a:avLst/>
+            </a:prstGeom>
+            <a:solidFill>
+              <a:srgbClr val="0070C0"/>
+            </a:solidFill>
+            <a:ln w="19050">
+              <a:solidFill>
+                <a:srgbClr val="0070C0"/>
+              </a:solidFill>
+            </a:ln>
+            <a:effectLst/>
+          </p:spPr>
+          <p:style>
+            <a:lnRef idx="1">
+              <a:schemeClr val="accent2"/>
+            </a:lnRef>
+            <a:fillRef idx="2">
+              <a:schemeClr val="accent2"/>
+            </a:fillRef>
+            <a:effectRef idx="1">
+              <a:schemeClr val="accent2"/>
+            </a:effectRef>
+            <a:fontRef idx="minor">
+              <a:schemeClr val="dk1"/>
+            </a:fontRef>
+          </p:style>
+          <p:txBody>
+            <a:bodyPr rtlCol="0" anchor="ctr"/>
+            <a:lstStyle/>
+            <a:p>
+              <a:pPr algn="ctr"/>
+              <a:r>
+                <a:rPr lang="en-US" sz="1600" dirty="0">
+                  <a:solidFill>
+                    <a:schemeClr val="bg1"/>
+                  </a:solidFill>
+                </a:rPr>
+                <a:t>:Birthday</a:t>
+              </a:r>
+            </a:p>
+            <a:p>
+              <a:pPr algn="ctr"/>
+              <a:r>
+                <a:rPr lang="en-US" sz="1600" dirty="0">
+                  <a:solidFill>
+                    <a:schemeClr val="bg1"/>
+                  </a:solidFill>
+                </a:rPr>
+                <a:t>Statistics</a:t>
+              </a:r>
+              <a:br>
+                <a:rPr lang="en-US" sz="1600" dirty="0">
+                  <a:solidFill>
+                    <a:schemeClr val="bg1"/>
+                  </a:solidFill>
+                </a:rPr>
+              </a:br>
+              <a:r>
+                <a:rPr lang="en-US" sz="1600" dirty="0">
+                  <a:solidFill>
+                    <a:schemeClr val="bg1"/>
+                  </a:solidFill>
+                </a:rPr>
+                <a:t>Command</a:t>
+              </a:r>
+              <a:endParaRPr lang="en-SG" sz="1600" dirty="0">
+                <a:solidFill>
+                  <a:schemeClr val="bg1"/>
+                </a:solidFill>
+              </a:endParaRPr>
+            </a:p>
+          </p:txBody>
+        </p:sp>
+        <p:cxnSp>
+          <p:nvCxnSpPr>
+            <p:cNvPr id="20" name="Straight Connector 19"/>
+            <p:cNvCxnSpPr>
+              <a:cxnSpLocks/>
+              <a:stCxn id="19" idx="2"/>
+            </p:cNvCxnSpPr>
+            <p:nvPr/>
+          </p:nvCxnSpPr>
+          <p:spPr>
+            <a:xfrm flipH="1">
+              <a:off x="3688038" y="2905350"/>
+              <a:ext cx="15590" cy="3309730"/>
+            </a:xfrm>
+            <a:prstGeom prst="line">
+              <a:avLst/>
+            </a:prstGeom>
+            <a:ln w="19050">
+              <a:solidFill>
+                <a:srgbClr val="0070C0"/>
+              </a:solidFill>
+              <a:prstDash val="sysDash"/>
+            </a:ln>
+            <a:effectLst/>
+          </p:spPr>
+          <p:style>
+            <a:lnRef idx="1">
+              <a:schemeClr val="accent1"/>
+            </a:lnRef>
+            <a:fillRef idx="2">
+              <a:schemeClr val="accent1"/>
+            </a:fillRef>
+            <a:effectRef idx="1">
+              <a:schemeClr val="accent1"/>
+            </a:effectRef>
+            <a:fontRef idx="minor">
+              <a:schemeClr val="dk1"/>
+            </a:fontRef>
+          </p:style>
+        </p:cxnSp>
+        <p:sp>
+          <p:nvSpPr>
+            <p:cNvPr id="21" name="Rectangle 20"/>
+            <p:cNvSpPr/>
+            <p:nvPr/>
+          </p:nvSpPr>
+          <p:spPr>
+            <a:xfrm>
+              <a:off x="3614010" y="3074382"/>
+              <a:ext cx="185759" cy="2997610"/>
+            </a:xfrm>
+            <a:prstGeom prst="rect">
+              <a:avLst/>
+            </a:prstGeom>
+            <a:solidFill>
+              <a:srgbClr val="0070C0"/>
+            </a:solidFill>
+            <a:ln>
+              <a:solidFill>
+                <a:srgbClr val="0070C0"/>
+              </a:solidFill>
+            </a:ln>
+            <a:effectLst/>
+          </p:spPr>
+          <p:style>
+            <a:lnRef idx="1">
+              <a:schemeClr val="accent3"/>
+            </a:lnRef>
+            <a:fillRef idx="2">
+              <a:schemeClr val="accent3"/>
+            </a:fillRef>
+            <a:effectRef idx="1">
+              <a:schemeClr val="accent3"/>
+            </a:effectRef>
+            <a:fontRef idx="minor">
+              <a:schemeClr val="dk1"/>
+            </a:fontRef>
+          </p:style>
+          <p:txBody>
+            <a:bodyPr rtlCol="0" anchor="ctr"/>
+            <a:lstStyle/>
+            <a:p>
+              <a:pPr algn="ctr"/>
+              <a:endParaRPr lang="en-SG" sz="1400"/>
+            </a:p>
+          </p:txBody>
+        </p:sp>
+        <p:sp>
+          <p:nvSpPr>
+            <p:cNvPr id="26" name="TextBox 25"/>
+            <p:cNvSpPr txBox="1"/>
+            <p:nvPr/>
+          </p:nvSpPr>
+          <p:spPr>
+            <a:xfrm>
+              <a:off x="1995510" y="2697730"/>
+              <a:ext cx="1416678" cy="430887"/>
+            </a:xfrm>
+            <a:prstGeom prst="rect">
+              <a:avLst/>
+            </a:prstGeom>
+            <a:noFill/>
+          </p:spPr>
+          <p:txBody>
+            <a:bodyPr wrap="square" lIns="0" tIns="0" rIns="0" bIns="0" rtlCol="0">
+              <a:spAutoFit/>
+            </a:bodyPr>
+            <a:lstStyle/>
+            <a:p>
+              <a:r>
+                <a:rPr lang="en-US" sz="1400" dirty="0">
+                  <a:solidFill>
+                    <a:srgbClr val="0070C0"/>
+                  </a:solidFill>
+                </a:rPr>
+                <a:t>Execute</a:t>
+              </a:r>
+            </a:p>
+            <a:p>
+              <a:r>
+                <a:rPr lang="en-US" sz="1400" dirty="0">
+                  <a:solidFill>
+                    <a:srgbClr val="0070C0"/>
+                  </a:solidFill>
+                </a:rPr>
+                <a:t>(</a:t>
+              </a:r>
+              <a:r>
+                <a:rPr lang="en-US" sz="1400" dirty="0" err="1">
+                  <a:solidFill>
+                    <a:srgbClr val="0070C0"/>
+                  </a:solidFill>
+                </a:rPr>
+                <a:t>birthdaystatistics</a:t>
+              </a:r>
+              <a:r>
+                <a:rPr lang="en-US" sz="1400" dirty="0">
+                  <a:solidFill>
+                    <a:srgbClr val="0070C0"/>
+                  </a:solidFill>
+                </a:rPr>
+                <a:t>)</a:t>
+              </a:r>
+            </a:p>
+          </p:txBody>
+        </p:sp>
+        <p:cxnSp>
+          <p:nvCxnSpPr>
+            <p:cNvPr id="28" name="Straight Arrow Connector 27"/>
+            <p:cNvCxnSpPr>
+              <a:cxnSpLocks/>
+            </p:cNvCxnSpPr>
+            <p:nvPr/>
+          </p:nvCxnSpPr>
+          <p:spPr>
+            <a:xfrm flipV="1">
+              <a:off x="3787038" y="3339469"/>
+              <a:ext cx="1554569" cy="1"/>
+            </a:xfrm>
+            <a:prstGeom prst="straightConnector1">
+              <a:avLst/>
+            </a:prstGeom>
+            <a:ln w="19050">
+              <a:solidFill>
+                <a:srgbClr val="0070C0"/>
+              </a:solidFill>
+              <a:tailEnd type="arrow"/>
+            </a:ln>
+          </p:spPr>
+          <p:style>
+            <a:lnRef idx="1">
+              <a:schemeClr val="accent1"/>
+            </a:lnRef>
+            <a:fillRef idx="0">
+              <a:schemeClr val="accent1"/>
+            </a:fillRef>
+            <a:effectRef idx="0">
+              <a:schemeClr val="accent1"/>
+            </a:effectRef>
+            <a:fontRef idx="minor">
+              <a:schemeClr val="tx1"/>
+            </a:fontRef>
+          </p:style>
+        </p:cxnSp>
+        <p:cxnSp>
+          <p:nvCxnSpPr>
+            <p:cNvPr id="34" name="Straight Arrow Connector 33"/>
+            <p:cNvCxnSpPr/>
+            <p:nvPr/>
+          </p:nvCxnSpPr>
+          <p:spPr>
+            <a:xfrm>
+              <a:off x="3817835" y="3888583"/>
+              <a:ext cx="1492974" cy="0"/>
+            </a:xfrm>
+            <a:prstGeom prst="straightConnector1">
+              <a:avLst/>
+            </a:prstGeom>
+            <a:ln w="19050">
+              <a:solidFill>
+                <a:srgbClr val="0070C0"/>
+              </a:solidFill>
+              <a:prstDash val="sysDash"/>
+              <a:headEnd type="arrow" w="med" len="med"/>
+              <a:tailEnd type="none" w="med" len="med"/>
+            </a:ln>
+          </p:spPr>
+          <p:style>
+            <a:lnRef idx="1">
+              <a:schemeClr val="accent1"/>
+            </a:lnRef>
+            <a:fillRef idx="0">
+              <a:schemeClr val="accent1"/>
+            </a:fillRef>
+            <a:effectRef idx="0">
+              <a:schemeClr val="accent1"/>
+            </a:effectRef>
+            <a:fontRef idx="minor">
+              <a:schemeClr val="tx1"/>
+            </a:fontRef>
+          </p:style>
+        </p:cxnSp>
+        <p:sp>
+          <p:nvSpPr>
+            <p:cNvPr id="65" name="Rectangle 64"/>
+            <p:cNvSpPr/>
+            <p:nvPr/>
+          </p:nvSpPr>
+          <p:spPr>
+            <a:xfrm>
+              <a:off x="6377689" y="5628905"/>
+              <a:ext cx="185760" cy="172813"/>
+            </a:xfrm>
+            <a:prstGeom prst="rect">
+              <a:avLst/>
+            </a:prstGeom>
+            <a:solidFill>
+              <a:srgbClr val="0070C0"/>
+            </a:solidFill>
+            <a:ln>
+              <a:solidFill>
+                <a:srgbClr val="0070C0"/>
+              </a:solidFill>
+            </a:ln>
+            <a:effectLst/>
+          </p:spPr>
+          <p:style>
+            <a:lnRef idx="1">
+              <a:schemeClr val="accent3"/>
+            </a:lnRef>
+            <a:fillRef idx="2">
+              <a:schemeClr val="accent3"/>
+            </a:fillRef>
+            <a:effectRef idx="1">
+              <a:schemeClr val="accent3"/>
+            </a:effectRef>
+            <a:fontRef idx="minor">
+              <a:schemeClr val="dk1"/>
+            </a:fontRef>
+          </p:style>
+          <p:txBody>
+            <a:bodyPr rtlCol="0" anchor="ctr"/>
+            <a:lstStyle/>
+            <a:p>
+              <a:pPr algn="ctr"/>
+              <a:endParaRPr lang="en-SG" sz="1400"/>
+            </a:p>
+          </p:txBody>
+        </p:sp>
+        <p:cxnSp>
+          <p:nvCxnSpPr>
+            <p:cNvPr id="75" name="Straight Arrow Connector 74"/>
+            <p:cNvCxnSpPr>
+              <a:cxnSpLocks/>
+            </p:cNvCxnSpPr>
+            <p:nvPr/>
+          </p:nvCxnSpPr>
+          <p:spPr>
+            <a:xfrm>
+              <a:off x="3817835" y="4419601"/>
+              <a:ext cx="3752875" cy="30243"/>
+            </a:xfrm>
+            <a:prstGeom prst="straightConnector1">
+              <a:avLst/>
+            </a:prstGeom>
+            <a:ln w="19050">
+              <a:solidFill>
+                <a:srgbClr val="0070C0"/>
+              </a:solidFill>
+              <a:tailEnd type="arrow"/>
+            </a:ln>
+          </p:spPr>
+          <p:style>
+            <a:lnRef idx="1">
+              <a:schemeClr val="accent1"/>
+            </a:lnRef>
+            <a:fillRef idx="0">
+              <a:schemeClr val="accent1"/>
+            </a:fillRef>
+            <a:effectRef idx="0">
+              <a:schemeClr val="accent1"/>
+            </a:effectRef>
+            <a:fontRef idx="minor">
+              <a:schemeClr val="tx1"/>
+            </a:fontRef>
+          </p:style>
+        </p:cxnSp>
+        <p:cxnSp>
+          <p:nvCxnSpPr>
+            <p:cNvPr id="77" name="Straight Arrow Connector 76"/>
+            <p:cNvCxnSpPr>
+              <a:cxnSpLocks/>
+            </p:cNvCxnSpPr>
+            <p:nvPr/>
+          </p:nvCxnSpPr>
+          <p:spPr>
+            <a:xfrm>
+              <a:off x="3819996" y="4724400"/>
+              <a:ext cx="3750714" cy="7227"/>
+            </a:xfrm>
+            <a:prstGeom prst="straightConnector1">
+              <a:avLst/>
+            </a:prstGeom>
+            <a:ln w="19050">
+              <a:solidFill>
+                <a:srgbClr val="0070C0"/>
+              </a:solidFill>
+              <a:prstDash val="sysDash"/>
+              <a:headEnd type="arrow" w="med" len="med"/>
+              <a:tailEnd type="none" w="med" len="med"/>
+            </a:ln>
+          </p:spPr>
+          <p:style>
+            <a:lnRef idx="1">
+              <a:schemeClr val="accent1"/>
+            </a:lnRef>
+            <a:fillRef idx="0">
+              <a:schemeClr val="accent1"/>
+            </a:fillRef>
+            <a:effectRef idx="0">
+              <a:schemeClr val="accent1"/>
+            </a:effectRef>
+            <a:fontRef idx="minor">
+              <a:schemeClr val="tx1"/>
+            </a:fontRef>
+          </p:style>
+        </p:cxnSp>
+        <p:sp>
+          <p:nvSpPr>
+            <p:cNvPr id="84" name="Rectangle 62"/>
+            <p:cNvSpPr/>
+            <p:nvPr/>
+          </p:nvSpPr>
+          <p:spPr>
+            <a:xfrm>
+              <a:off x="5653972" y="5168817"/>
+              <a:ext cx="1590354" cy="461538"/>
+            </a:xfrm>
+            <a:prstGeom prst="rect">
+              <a:avLst/>
+            </a:prstGeom>
+            <a:solidFill>
+              <a:srgbClr val="0070C0"/>
+            </a:solidFill>
+            <a:ln w="19050">
+              <a:solidFill>
+                <a:srgbClr val="0070C0"/>
+              </a:solidFill>
+            </a:ln>
+            <a:effectLst/>
+          </p:spPr>
+          <p:style>
+            <a:lnRef idx="1">
+              <a:schemeClr val="accent2"/>
+            </a:lnRef>
+            <a:fillRef idx="2">
+              <a:schemeClr val="accent2"/>
+            </a:fillRef>
+            <a:effectRef idx="1">
+              <a:schemeClr val="accent2"/>
+            </a:effectRef>
+            <a:fontRef idx="minor">
+              <a:schemeClr val="dk1"/>
+            </a:fontRef>
+          </p:style>
+          <p:txBody>
+            <a:bodyPr rtlCol="0" anchor="ctr"/>
+            <a:lstStyle/>
+            <a:p>
+              <a:pPr algn="ctr"/>
+              <a:r>
+                <a:rPr lang="en-US" sz="1600" dirty="0" err="1">
+                  <a:solidFill>
+                    <a:schemeClr val="bg1"/>
+                  </a:solidFill>
+                </a:rPr>
+                <a:t>result:Command</a:t>
+              </a:r>
+              <a:r>
+                <a:rPr lang="en-US" sz="1600" dirty="0">
+                  <a:solidFill>
+                    <a:schemeClr val="bg1"/>
+                  </a:solidFill>
+                </a:rPr>
+                <a:t> Result</a:t>
+              </a:r>
+              <a:endParaRPr lang="en-SG" sz="1600" dirty="0">
+                <a:solidFill>
+                  <a:schemeClr val="bg1"/>
+                </a:solidFill>
+              </a:endParaRPr>
+            </a:p>
+          </p:txBody>
+        </p:sp>
+        <p:cxnSp>
+          <p:nvCxnSpPr>
+            <p:cNvPr id="90" name="Straight Arrow Connector 89"/>
+            <p:cNvCxnSpPr>
+              <a:cxnSpLocks/>
+            </p:cNvCxnSpPr>
+            <p:nvPr/>
+          </p:nvCxnSpPr>
+          <p:spPr>
+            <a:xfrm>
+              <a:off x="3799769" y="5801718"/>
+              <a:ext cx="2577920" cy="9425"/>
+            </a:xfrm>
+            <a:prstGeom prst="straightConnector1">
+              <a:avLst/>
+            </a:prstGeom>
+            <a:ln w="19050">
+              <a:solidFill>
+                <a:srgbClr val="0070C0"/>
+              </a:solidFill>
+              <a:prstDash val="sysDash"/>
+              <a:headEnd type="arrow" w="med" len="med"/>
+              <a:tailEnd type="none" w="med" len="med"/>
+            </a:ln>
+          </p:spPr>
+          <p:style>
+            <a:lnRef idx="1">
+              <a:schemeClr val="accent1"/>
+            </a:lnRef>
+            <a:fillRef idx="0">
+              <a:schemeClr val="accent1"/>
+            </a:fillRef>
+            <a:effectRef idx="0">
+              <a:schemeClr val="accent1"/>
+            </a:effectRef>
+            <a:fontRef idx="minor">
+              <a:schemeClr val="tx1"/>
+            </a:fontRef>
+          </p:style>
+        </p:cxnSp>
+        <p:sp>
+          <p:nvSpPr>
+            <p:cNvPr id="40" name="Rectangle 62"/>
+            <p:cNvSpPr/>
+            <p:nvPr/>
+          </p:nvSpPr>
+          <p:spPr>
+            <a:xfrm>
+              <a:off x="4464681" y="2420652"/>
+              <a:ext cx="1947629" cy="554155"/>
+            </a:xfrm>
+            <a:prstGeom prst="rect">
+              <a:avLst/>
+            </a:prstGeom>
+            <a:solidFill>
+              <a:srgbClr val="0070C0"/>
+            </a:solidFill>
+            <a:ln w="19050">
+              <a:solidFill>
+                <a:srgbClr val="0070C0"/>
+              </a:solidFill>
+            </a:ln>
+            <a:effectLst/>
+          </p:spPr>
+          <p:style>
+            <a:lnRef idx="1">
+              <a:schemeClr val="accent2"/>
+            </a:lnRef>
+            <a:fillRef idx="2">
+              <a:schemeClr val="accent2"/>
+            </a:fillRef>
+            <a:effectRef idx="1">
+              <a:schemeClr val="accent2"/>
+            </a:effectRef>
+            <a:fontRef idx="minor">
+              <a:schemeClr val="dk1"/>
+            </a:fontRef>
+          </p:style>
+          <p:txBody>
+            <a:bodyPr rtlCol="0" anchor="ctr"/>
+            <a:lstStyle/>
+            <a:p>
+              <a:pPr algn="ctr"/>
+              <a:r>
+                <a:rPr lang="en-US" sz="1600" dirty="0">
+                  <a:solidFill>
+                    <a:schemeClr val="bg1"/>
+                  </a:solidFill>
+                </a:rPr>
+                <a:t>:</a:t>
+              </a:r>
+              <a:r>
+                <a:rPr lang="en-US" sz="1600" dirty="0" err="1">
+                  <a:solidFill>
+                    <a:schemeClr val="bg1"/>
+                  </a:solidFill>
+                </a:rPr>
+                <a:t>ChangeInformation</a:t>
+              </a:r>
+              <a:endParaRPr lang="en-US" sz="1600" dirty="0">
+                <a:solidFill>
+                  <a:schemeClr val="bg1"/>
+                </a:solidFill>
+              </a:endParaRPr>
+            </a:p>
+            <a:p>
+              <a:pPr algn="ctr"/>
+              <a:r>
+                <a:rPr lang="en-US" sz="1600" dirty="0" err="1">
+                  <a:solidFill>
+                    <a:schemeClr val="bg1"/>
+                  </a:solidFill>
+                </a:rPr>
+                <a:t>PanelRequestEvent</a:t>
+              </a:r>
+              <a:endParaRPr lang="en-SG" sz="1600" dirty="0">
+                <a:solidFill>
+                  <a:schemeClr val="bg1"/>
+                </a:solidFill>
+              </a:endParaRPr>
+            </a:p>
+          </p:txBody>
+        </p:sp>
+        <p:cxnSp>
+          <p:nvCxnSpPr>
+            <p:cNvPr id="13" name="Straight Arrow Connector 12"/>
+            <p:cNvCxnSpPr>
+              <a:cxnSpLocks/>
+              <a:endCxn id="84" idx="1"/>
+            </p:cNvCxnSpPr>
+            <p:nvPr/>
+          </p:nvCxnSpPr>
+          <p:spPr>
+            <a:xfrm>
+              <a:off x="3817835" y="5399586"/>
+              <a:ext cx="1836137" cy="0"/>
+            </a:xfrm>
+            <a:prstGeom prst="straightConnector1">
+              <a:avLst/>
+            </a:prstGeom>
+            <a:ln w="19050">
+              <a:headEnd type="none" w="med" len="med"/>
+              <a:tailEnd type="arrow" w="med" len="med"/>
+            </a:ln>
+          </p:spPr>
+          <p:style>
+            <a:lnRef idx="1">
+              <a:schemeClr val="accent1"/>
+            </a:lnRef>
+            <a:fillRef idx="0">
+              <a:schemeClr val="accent1"/>
+            </a:fillRef>
+            <a:effectRef idx="0">
+              <a:schemeClr val="accent1"/>
+            </a:effectRef>
+            <a:fontRef idx="minor">
+              <a:schemeClr val="tx1"/>
+            </a:fontRef>
+          </p:style>
+        </p:cxnSp>
+        <p:cxnSp>
+          <p:nvCxnSpPr>
+            <p:cNvPr id="47" name="Straight Arrow Connector 46">
+              <a:extLst>
+                <a:ext uri="{FF2B5EF4-FFF2-40B4-BE49-F238E27FC236}">
+                  <a16:creationId xmlns:a16="http://schemas.microsoft.com/office/drawing/2014/main" id="{51875A2F-5ED4-42FF-8403-C14AB94FA994}"/>
+                </a:ext>
+              </a:extLst>
+            </p:cNvPr>
+            <p:cNvCxnSpPr>
+              <a:cxnSpLocks/>
+            </p:cNvCxnSpPr>
+            <p:nvPr/>
+          </p:nvCxnSpPr>
+          <p:spPr>
+            <a:xfrm>
+              <a:off x="1937610" y="3176749"/>
+              <a:ext cx="1676400" cy="0"/>
+            </a:xfrm>
+            <a:prstGeom prst="straightConnector1">
+              <a:avLst/>
+            </a:prstGeom>
+            <a:ln w="19050">
+              <a:solidFill>
+                <a:srgbClr val="00B050"/>
+              </a:solidFill>
+              <a:tailEnd type="arrow"/>
+            </a:ln>
+          </p:spPr>
+          <p:style>
+            <a:lnRef idx="1">
+              <a:schemeClr val="accent1"/>
+            </a:lnRef>
+            <a:fillRef idx="0">
+              <a:schemeClr val="accent1"/>
+            </a:fillRef>
+            <a:effectRef idx="0">
+              <a:schemeClr val="accent1"/>
+            </a:effectRef>
+            <a:fontRef idx="minor">
+              <a:schemeClr val="tx1"/>
+            </a:fontRef>
+          </p:style>
+        </p:cxnSp>
+        <p:cxnSp>
+          <p:nvCxnSpPr>
+            <p:cNvPr id="54" name="Straight Connector 53">
+              <a:extLst>
+                <a:ext uri="{FF2B5EF4-FFF2-40B4-BE49-F238E27FC236}">
+                  <a16:creationId xmlns:a16="http://schemas.microsoft.com/office/drawing/2014/main" id="{D0125B4D-DC6A-4595-8C20-9B9B8B0D23AE}"/>
+                </a:ext>
+              </a:extLst>
+            </p:cNvPr>
+            <p:cNvCxnSpPr>
+              <a:cxnSpLocks/>
+              <a:stCxn id="40" idx="2"/>
+            </p:cNvCxnSpPr>
+            <p:nvPr/>
+          </p:nvCxnSpPr>
+          <p:spPr>
+            <a:xfrm>
+              <a:off x="5438496" y="2974807"/>
+              <a:ext cx="0" cy="1292393"/>
+            </a:xfrm>
+            <a:prstGeom prst="line">
+              <a:avLst/>
+            </a:prstGeom>
+            <a:ln w="19050">
+              <a:solidFill>
+                <a:srgbClr val="0070C0"/>
+              </a:solidFill>
+              <a:prstDash val="sysDash"/>
+            </a:ln>
+            <a:effectLst/>
+          </p:spPr>
+          <p:style>
+            <a:lnRef idx="1">
+              <a:schemeClr val="accent1"/>
+            </a:lnRef>
+            <a:fillRef idx="2">
+              <a:schemeClr val="accent1"/>
+            </a:fillRef>
+            <a:effectRef idx="1">
+              <a:schemeClr val="accent1"/>
+            </a:effectRef>
+            <a:fontRef idx="minor">
+              <a:schemeClr val="dk1"/>
+            </a:fontRef>
+          </p:style>
+        </p:cxnSp>
+        <p:sp>
+          <p:nvSpPr>
+            <p:cNvPr id="55" name="Rectangle 54">
+              <a:extLst>
+                <a:ext uri="{FF2B5EF4-FFF2-40B4-BE49-F238E27FC236}">
+                  <a16:creationId xmlns:a16="http://schemas.microsoft.com/office/drawing/2014/main" id="{57766847-E022-42A3-8099-A868187833BF}"/>
+                </a:ext>
+              </a:extLst>
+            </p:cNvPr>
+            <p:cNvSpPr/>
+            <p:nvPr/>
+          </p:nvSpPr>
+          <p:spPr>
+            <a:xfrm>
+              <a:off x="5343500" y="3293717"/>
+              <a:ext cx="201677" cy="594866"/>
+            </a:xfrm>
+            <a:prstGeom prst="rect">
+              <a:avLst/>
+            </a:prstGeom>
+            <a:solidFill>
+              <a:srgbClr val="0070C0"/>
+            </a:solidFill>
+            <a:ln>
+              <a:solidFill>
+                <a:srgbClr val="0070C0"/>
+              </a:solidFill>
+            </a:ln>
+            <a:effectLst/>
+          </p:spPr>
+          <p:style>
+            <a:lnRef idx="1">
+              <a:schemeClr val="accent3"/>
+            </a:lnRef>
+            <a:fillRef idx="2">
+              <a:schemeClr val="accent3"/>
+            </a:fillRef>
+            <a:effectRef idx="1">
+              <a:schemeClr val="accent3"/>
+            </a:effectRef>
+            <a:fontRef idx="minor">
+              <a:schemeClr val="dk1"/>
+            </a:fontRef>
+          </p:style>
+          <p:txBody>
+            <a:bodyPr rtlCol="0" anchor="ctr"/>
+            <a:lstStyle/>
+            <a:p>
+              <a:pPr algn="ctr"/>
+              <a:endParaRPr lang="en-SG" sz="1400"/>
+            </a:p>
+          </p:txBody>
+        </p:sp>
+        <p:sp>
+          <p:nvSpPr>
+            <p:cNvPr id="63" name="Rectangle 11">
+              <a:extLst>
+                <a:ext uri="{FF2B5EF4-FFF2-40B4-BE49-F238E27FC236}">
+                  <a16:creationId xmlns:a16="http://schemas.microsoft.com/office/drawing/2014/main" id="{85BB560E-2FA9-451C-9EED-91E411602686}"/>
+                </a:ext>
+              </a:extLst>
+            </p:cNvPr>
+            <p:cNvSpPr/>
+            <p:nvPr/>
+          </p:nvSpPr>
+          <p:spPr>
+            <a:xfrm>
+              <a:off x="7028040" y="3629607"/>
+              <a:ext cx="1277760" cy="312026"/>
+            </a:xfrm>
+            <a:prstGeom prst="rect">
+              <a:avLst/>
+            </a:prstGeom>
+            <a:ln w="19050">
+              <a:solidFill>
+                <a:schemeClr val="accent3"/>
+              </a:solidFill>
+            </a:ln>
+            <a:effectLst/>
+          </p:spPr>
+          <p:style>
+            <a:lnRef idx="1">
+              <a:schemeClr val="accent3"/>
+            </a:lnRef>
+            <a:fillRef idx="2">
+              <a:schemeClr val="accent3"/>
+            </a:fillRef>
+            <a:effectRef idx="1">
+              <a:schemeClr val="accent3"/>
+            </a:effectRef>
+            <a:fontRef idx="minor">
+              <a:schemeClr val="dk1"/>
+            </a:fontRef>
+          </p:style>
+          <p:txBody>
+            <a:bodyPr rtlCol="0" anchor="ctr"/>
+            <a:lstStyle/>
+            <a:p>
+              <a:pPr algn="ctr"/>
+              <a:r>
+                <a:rPr lang="en-US" sz="1600" dirty="0" err="1">
+                  <a:solidFill>
+                    <a:schemeClr val="accent3">
+                      <a:lumMod val="75000"/>
+                    </a:schemeClr>
+                  </a:solidFill>
+                </a:rPr>
+                <a:t>EventsCenter</a:t>
+              </a:r>
+              <a:endParaRPr lang="en-SG" sz="1600" dirty="0">
+                <a:solidFill>
+                  <a:schemeClr val="accent3">
+                    <a:lumMod val="75000"/>
+                  </a:schemeClr>
+                </a:solidFill>
+              </a:endParaRPr>
+            </a:p>
+          </p:txBody>
+        </p:sp>
+        <p:sp>
+          <p:nvSpPr>
+            <p:cNvPr id="66" name="Rectangle 65">
+              <a:extLst>
+                <a:ext uri="{FF2B5EF4-FFF2-40B4-BE49-F238E27FC236}">
+                  <a16:creationId xmlns:a16="http://schemas.microsoft.com/office/drawing/2014/main" id="{AA064AB3-268F-4370-90D5-C3BBA8F3024C}"/>
+                </a:ext>
+              </a:extLst>
+            </p:cNvPr>
+            <p:cNvSpPr/>
+            <p:nvPr/>
+          </p:nvSpPr>
+          <p:spPr>
+            <a:xfrm>
+              <a:off x="7585296" y="4419601"/>
+              <a:ext cx="216376" cy="312026"/>
+            </a:xfrm>
+            <a:prstGeom prst="rect">
+              <a:avLst/>
+            </a:prstGeom>
+            <a:solidFill>
+              <a:schemeClr val="accent3">
+                <a:lumMod val="60000"/>
+                <a:lumOff val="40000"/>
+              </a:schemeClr>
+            </a:solidFill>
+            <a:ln>
+              <a:solidFill>
+                <a:schemeClr val="accent3">
+                  <a:lumMod val="60000"/>
+                  <a:lumOff val="40000"/>
+                </a:schemeClr>
+              </a:solidFill>
+            </a:ln>
+            <a:effectLst/>
+          </p:spPr>
+          <p:style>
+            <a:lnRef idx="1">
+              <a:schemeClr val="accent3"/>
+            </a:lnRef>
+            <a:fillRef idx="2">
+              <a:schemeClr val="accent3"/>
+            </a:fillRef>
+            <a:effectRef idx="1">
+              <a:schemeClr val="accent3"/>
+            </a:effectRef>
+            <a:fontRef idx="minor">
+              <a:schemeClr val="dk1"/>
+            </a:fontRef>
+          </p:style>
+          <p:txBody>
+            <a:bodyPr rtlCol="0" anchor="ctr"/>
+            <a:lstStyle/>
+            <a:p>
+              <a:pPr algn="ctr"/>
+              <a:endParaRPr lang="en-SG" sz="1400">
+                <a:solidFill>
+                  <a:schemeClr val="dk1"/>
+                </a:solidFill>
+              </a:endParaRPr>
+            </a:p>
+          </p:txBody>
+        </p:sp>
+        <p:cxnSp>
+          <p:nvCxnSpPr>
+            <p:cNvPr id="67" name="Straight Connector 66">
+              <a:extLst>
+                <a:ext uri="{FF2B5EF4-FFF2-40B4-BE49-F238E27FC236}">
+                  <a16:creationId xmlns:a16="http://schemas.microsoft.com/office/drawing/2014/main" id="{6D1C2105-046F-4DB6-A5B3-3EB880BDB709}"/>
+                </a:ext>
+              </a:extLst>
+            </p:cNvPr>
+            <p:cNvCxnSpPr>
+              <a:cxnSpLocks/>
+            </p:cNvCxnSpPr>
+            <p:nvPr/>
+          </p:nvCxnSpPr>
+          <p:spPr>
+            <a:xfrm>
+              <a:off x="7680292" y="3962400"/>
+              <a:ext cx="11798" cy="1021537"/>
+            </a:xfrm>
+            <a:prstGeom prst="line">
+              <a:avLst/>
+            </a:prstGeom>
+            <a:ln w="19050">
+              <a:solidFill>
+                <a:schemeClr val="accent3">
+                  <a:lumMod val="60000"/>
+                  <a:lumOff val="40000"/>
+                </a:schemeClr>
+              </a:solidFill>
+              <a:prstDash val="sysDash"/>
+            </a:ln>
+            <a:effectLst/>
+          </p:spPr>
+          <p:style>
+            <a:lnRef idx="1">
+              <a:schemeClr val="accent1"/>
+            </a:lnRef>
+            <a:fillRef idx="2">
+              <a:schemeClr val="accent1"/>
+            </a:fillRef>
+            <a:effectRef idx="1">
+              <a:schemeClr val="accent1"/>
+            </a:effectRef>
+            <a:fontRef idx="minor">
+              <a:schemeClr val="dk1"/>
+            </a:fontRef>
+          </p:style>
+        </p:cxnSp>
+        <p:sp>
+          <p:nvSpPr>
+            <p:cNvPr id="74" name="TextBox 73">
+              <a:extLst>
+                <a:ext uri="{FF2B5EF4-FFF2-40B4-BE49-F238E27FC236}">
+                  <a16:creationId xmlns:a16="http://schemas.microsoft.com/office/drawing/2014/main" id="{C950B381-73E9-4F4C-BC72-8D6B40E57FB1}"/>
+                </a:ext>
+              </a:extLst>
+            </p:cNvPr>
+            <p:cNvSpPr txBox="1"/>
+            <p:nvPr/>
+          </p:nvSpPr>
+          <p:spPr>
+            <a:xfrm>
+              <a:off x="4852827" y="4185272"/>
+              <a:ext cx="343788" cy="220983"/>
+            </a:xfrm>
+            <a:prstGeom prst="rect">
+              <a:avLst/>
+            </a:prstGeom>
+            <a:noFill/>
+          </p:spPr>
+          <p:txBody>
+            <a:bodyPr wrap="square" lIns="0" tIns="0" rIns="0" bIns="0" rtlCol="0">
+              <a:spAutoFit/>
+            </a:bodyPr>
+            <a:lstStyle/>
+            <a:p>
+              <a:r>
+                <a:rPr lang="en-US" sz="1400" dirty="0">
+                  <a:solidFill>
+                    <a:srgbClr val="0070C0"/>
+                  </a:solidFill>
+                </a:rPr>
+                <a:t>post</a:t>
+              </a:r>
+            </a:p>
+          </p:txBody>
+        </p:sp>
+      </p:grpSp>
+    </p:spTree>
+    <p:extLst>
+      <p:ext uri="{BB962C8B-B14F-4D97-AF65-F5344CB8AC3E}">
+        <p14:creationId xmlns:p14="http://schemas.microsoft.com/office/powerpoint/2010/main" val="505694238"/>
       </p:ext>
     </p:extLst>
   </p:cSld>

</xml_diff>